<commit_message>
Edit slides based on Dev call's discussion
</commit_message>
<xml_diff>
--- a/docs/presentations/OBI tutorial July 2011 ICBO/EuPathDB.pptx
+++ b/docs/presentations/OBI tutorial July 2011 ICBO/EuPathDB.pptx
@@ -1,6 +1,6 @@
 
 <file path=ppt/presentation.xml><?xml version="1.0" encoding="utf-8"?>
-<p:presentation xmlns:a="http://schemas.openxmlformats.org/drawingml/2006/main" xmlns:r="http://schemas.openxmlformats.org/officeDocument/2006/relationships" xmlns:mc="http://schemas.openxmlformats.org/markup-compatibility/2006" xmlns:mv="urn:schemas-microsoft-com:mac:vml" xmlns:p="http://schemas.openxmlformats.org/presentationml/2006/main" mc:Ignorable="mv" mc:PreserveAttributes="mv:*" showSpecialPlsOnTitleSld="0" saveSubsetFonts="1">
+<p:presentation xmlns:a="http://schemas.openxmlformats.org/drawingml/2006/main" xmlns:r="http://schemas.openxmlformats.org/officeDocument/2006/relationships" xmlns:p="http://schemas.openxmlformats.org/presentationml/2006/main" showSpecialPlsOnTitleSld="0" saveSubsetFonts="1">
   <p:sldMasterIdLst>
     <p:sldMasterId id="2147483960" r:id="rId1"/>
   </p:sldMasterIdLst>
@@ -162,7 +162,7 @@
 </file>
 
 <file path=ppt/notesMasters/notesMaster1.xml><?xml version="1.0" encoding="utf-8"?>
-<p:notesMaster xmlns:a="http://schemas.openxmlformats.org/drawingml/2006/main" xmlns:r="http://schemas.openxmlformats.org/officeDocument/2006/relationships" xmlns:mc="http://schemas.openxmlformats.org/markup-compatibility/2006" xmlns:mv="urn:schemas-microsoft-com:mac:vml" xmlns:p="http://schemas.openxmlformats.org/presentationml/2006/main" mc:Ignorable="mv" mc:PreserveAttributes="mv:*">
+<p:notesMaster xmlns:a="http://schemas.openxmlformats.org/drawingml/2006/main" xmlns:r="http://schemas.openxmlformats.org/officeDocument/2006/relationships" xmlns:p="http://schemas.openxmlformats.org/presentationml/2006/main">
   <p:cSld>
     <p:bg>
       <p:bgRef idx="1001">
@@ -270,7 +270,7 @@
               <a:pPr>
                 <a:defRPr/>
               </a:pPr>
-              <a:t>7/14/11</a:t>
+              <a:t>7/21/2011</a:t>
             </a:fld>
             <a:endParaRPr lang="en-US"/>
           </a:p>
@@ -596,7 +596,7 @@
 </file>
 
 <file path=ppt/notesSlides/notesSlide1.xml><?xml version="1.0" encoding="utf-8"?>
-<p:notes xmlns:a="http://schemas.openxmlformats.org/drawingml/2006/main" xmlns:r="http://schemas.openxmlformats.org/officeDocument/2006/relationships" xmlns:mc="http://schemas.openxmlformats.org/markup-compatibility/2006" xmlns:mv="urn:schemas-microsoft-com:mac:vml" xmlns:p="http://schemas.openxmlformats.org/presentationml/2006/main" mc:Ignorable="mv" mc:PreserveAttributes="mv:*">
+<p:notes xmlns:a="http://schemas.openxmlformats.org/drawingml/2006/main" xmlns:r="http://schemas.openxmlformats.org/officeDocument/2006/relationships" xmlns:p="http://schemas.openxmlformats.org/presentationml/2006/main">
   <p:cSld>
     <p:spTree>
       <p:nvGrpSpPr>
@@ -683,7 +683,7 @@
 </file>
 
 <file path=ppt/notesSlides/notesSlide10.xml><?xml version="1.0" encoding="utf-8"?>
-<p:notes xmlns:a="http://schemas.openxmlformats.org/drawingml/2006/main" xmlns:r="http://schemas.openxmlformats.org/officeDocument/2006/relationships" xmlns:mc="http://schemas.openxmlformats.org/markup-compatibility/2006" xmlns:mv="urn:schemas-microsoft-com:mac:vml" xmlns:p="http://schemas.openxmlformats.org/presentationml/2006/main" mc:Ignorable="mv" mc:PreserveAttributes="mv:*">
+<p:notes xmlns:a="http://schemas.openxmlformats.org/drawingml/2006/main" xmlns:r="http://schemas.openxmlformats.org/officeDocument/2006/relationships" xmlns:p="http://schemas.openxmlformats.org/presentationml/2006/main">
   <p:cSld>
     <p:spTree>
       <p:nvGrpSpPr>
@@ -816,7 +816,7 @@
 </file>
 
 <file path=ppt/notesSlides/notesSlide2.xml><?xml version="1.0" encoding="utf-8"?>
-<p:notes xmlns:a="http://schemas.openxmlformats.org/drawingml/2006/main" xmlns:r="http://schemas.openxmlformats.org/officeDocument/2006/relationships" xmlns:mc="http://schemas.openxmlformats.org/markup-compatibility/2006" xmlns:mv="urn:schemas-microsoft-com:mac:vml" xmlns:p="http://schemas.openxmlformats.org/presentationml/2006/main" mc:Ignorable="mv" mc:PreserveAttributes="mv:*">
+<p:notes xmlns:a="http://schemas.openxmlformats.org/drawingml/2006/main" xmlns:r="http://schemas.openxmlformats.org/officeDocument/2006/relationships" xmlns:p="http://schemas.openxmlformats.org/presentationml/2006/main">
   <p:cSld>
     <p:spTree>
       <p:nvGrpSpPr>
@@ -960,7 +960,7 @@
 </file>
 
 <file path=ppt/notesSlides/notesSlide3.xml><?xml version="1.0" encoding="utf-8"?>
-<p:notes xmlns:a="http://schemas.openxmlformats.org/drawingml/2006/main" xmlns:r="http://schemas.openxmlformats.org/officeDocument/2006/relationships" xmlns:mc="http://schemas.openxmlformats.org/markup-compatibility/2006" xmlns:mv="urn:schemas-microsoft-com:mac:vml" xmlns:p="http://schemas.openxmlformats.org/presentationml/2006/main" mc:Ignorable="mv" mc:PreserveAttributes="mv:*">
+<p:notes xmlns:a="http://schemas.openxmlformats.org/drawingml/2006/main" xmlns:r="http://schemas.openxmlformats.org/officeDocument/2006/relationships" xmlns:p="http://schemas.openxmlformats.org/presentationml/2006/main">
   <p:cSld>
     <p:spTree>
       <p:nvGrpSpPr>
@@ -1090,7 +1090,7 @@
 </file>
 
 <file path=ppt/notesSlides/notesSlide4.xml><?xml version="1.0" encoding="utf-8"?>
-<p:notes xmlns:a="http://schemas.openxmlformats.org/drawingml/2006/main" xmlns:r="http://schemas.openxmlformats.org/officeDocument/2006/relationships" xmlns:mc="http://schemas.openxmlformats.org/markup-compatibility/2006" xmlns:mv="urn:schemas-microsoft-com:mac:vml" xmlns:p="http://schemas.openxmlformats.org/presentationml/2006/main" mc:Ignorable="mv" mc:PreserveAttributes="mv:*">
+<p:notes xmlns:a="http://schemas.openxmlformats.org/drawingml/2006/main" xmlns:r="http://schemas.openxmlformats.org/officeDocument/2006/relationships" xmlns:p="http://schemas.openxmlformats.org/presentationml/2006/main">
   <p:cSld>
     <p:spTree>
       <p:nvGrpSpPr>
@@ -1223,7 +1223,7 @@
 </file>
 
 <file path=ppt/notesSlides/notesSlide5.xml><?xml version="1.0" encoding="utf-8"?>
-<p:notes xmlns:a="http://schemas.openxmlformats.org/drawingml/2006/main" xmlns:r="http://schemas.openxmlformats.org/officeDocument/2006/relationships" xmlns:mc="http://schemas.openxmlformats.org/markup-compatibility/2006" xmlns:mv="urn:schemas-microsoft-com:mac:vml" xmlns:p="http://schemas.openxmlformats.org/presentationml/2006/main" mc:Ignorable="mv" mc:PreserveAttributes="mv:*">
+<p:notes xmlns:a="http://schemas.openxmlformats.org/drawingml/2006/main" xmlns:r="http://schemas.openxmlformats.org/officeDocument/2006/relationships" xmlns:p="http://schemas.openxmlformats.org/presentationml/2006/main">
   <p:cSld>
     <p:spTree>
       <p:nvGrpSpPr>
@@ -1493,7 +1493,7 @@
 </file>
 
 <file path=ppt/notesSlides/notesSlide6.xml><?xml version="1.0" encoding="utf-8"?>
-<p:notes xmlns:a="http://schemas.openxmlformats.org/drawingml/2006/main" xmlns:r="http://schemas.openxmlformats.org/officeDocument/2006/relationships" xmlns:mc="http://schemas.openxmlformats.org/markup-compatibility/2006" xmlns:mv="urn:schemas-microsoft-com:mac:vml" xmlns:p="http://schemas.openxmlformats.org/presentationml/2006/main" mc:Ignorable="mv" mc:PreserveAttributes="mv:*">
+<p:notes xmlns:a="http://schemas.openxmlformats.org/drawingml/2006/main" xmlns:r="http://schemas.openxmlformats.org/officeDocument/2006/relationships" xmlns:p="http://schemas.openxmlformats.org/presentationml/2006/main">
   <p:cSld>
     <p:spTree>
       <p:nvGrpSpPr>
@@ -1721,7 +1721,7 @@
 </file>
 
 <file path=ppt/notesSlides/notesSlide7.xml><?xml version="1.0" encoding="utf-8"?>
-<p:notes xmlns:a="http://schemas.openxmlformats.org/drawingml/2006/main" xmlns:r="http://schemas.openxmlformats.org/officeDocument/2006/relationships" xmlns:mc="http://schemas.openxmlformats.org/markup-compatibility/2006" xmlns:mv="urn:schemas-microsoft-com:mac:vml" xmlns:p="http://schemas.openxmlformats.org/presentationml/2006/main" mc:Ignorable="mv" mc:PreserveAttributes="mv:*">
+<p:notes xmlns:a="http://schemas.openxmlformats.org/drawingml/2006/main" xmlns:r="http://schemas.openxmlformats.org/officeDocument/2006/relationships" xmlns:p="http://schemas.openxmlformats.org/presentationml/2006/main">
   <p:cSld>
     <p:spTree>
       <p:nvGrpSpPr>
@@ -1825,7 +1825,51 @@
                 <a:ea typeface="+mn-ea"/>
                 <a:cs typeface="+mn-cs"/>
               </a:rPr>
-              <a:t>Trypanosoma</a:t>
+              <a:t>Trypanosomabrucei</a:t>
+            </a:r>
+            <a:r>
+              <a:rPr lang="en-US" sz="1200" kern="1200" dirty="0" smtClean="0">
+                <a:solidFill>
+                  <a:schemeClr val="tx1"/>
+                </a:solidFill>
+                <a:latin typeface="+mn-lt"/>
+                <a:ea typeface="+mn-ea"/>
+                <a:cs typeface="+mn-cs"/>
+              </a:rPr>
+              <a:t>, </a:t>
+            </a:r>
+            <a:r>
+              <a:rPr lang="en-US" sz="1200" i="1" kern="1200" dirty="0" err="1" smtClean="0">
+                <a:solidFill>
+                  <a:schemeClr val="tx1"/>
+                </a:solidFill>
+                <a:latin typeface="+mn-lt"/>
+                <a:ea typeface="+mn-ea"/>
+                <a:cs typeface="+mn-cs"/>
+              </a:rPr>
+              <a:t>Trypanosomacruzi</a:t>
+            </a:r>
+            <a:r>
+              <a:rPr lang="en-US" sz="1200" kern="1200" dirty="0" smtClean="0">
+                <a:solidFill>
+                  <a:schemeClr val="tx1"/>
+                </a:solidFill>
+                <a:latin typeface="+mn-lt"/>
+                <a:ea typeface="+mn-ea"/>
+                <a:cs typeface="+mn-cs"/>
+              </a:rPr>
+              <a:t>, </a:t>
+            </a:r>
+            <a:r>
+              <a:rPr lang="en-US" sz="1200" i="1" kern="1200" dirty="0" err="1" smtClean="0">
+                <a:solidFill>
+                  <a:schemeClr val="tx1"/>
+                </a:solidFill>
+                <a:latin typeface="+mn-lt"/>
+                <a:ea typeface="+mn-ea"/>
+                <a:cs typeface="+mn-cs"/>
+              </a:rPr>
+              <a:t>Leishmania</a:t>
             </a:r>
             <a:r>
               <a:rPr lang="en-US" sz="1200" i="1" kern="1200" dirty="0" smtClean="0">
@@ -1836,7 +1880,29 @@
                 <a:ea typeface="+mn-ea"/>
                 <a:cs typeface="+mn-cs"/>
               </a:rPr>
-              <a:t> </a:t>
+              <a:t> major</a:t>
+            </a:r>
+            <a:r>
+              <a:rPr lang="en-US" sz="1200" kern="1200" dirty="0" smtClean="0">
+                <a:solidFill>
+                  <a:schemeClr val="tx1"/>
+                </a:solidFill>
+                <a:latin typeface="+mn-lt"/>
+                <a:ea typeface="+mn-ea"/>
+                <a:cs typeface="+mn-cs"/>
+              </a:rPr>
+              <a:t>, </a:t>
+            </a:r>
+            <a:r>
+              <a:rPr lang="en-US" sz="1200" i="1" kern="1200" dirty="0" smtClean="0">
+                <a:solidFill>
+                  <a:schemeClr val="tx1"/>
+                </a:solidFill>
+                <a:latin typeface="+mn-lt"/>
+                <a:ea typeface="+mn-ea"/>
+                <a:cs typeface="+mn-cs"/>
+              </a:rPr>
+              <a:t>Plasmodium </a:t>
             </a:r>
             <a:r>
               <a:rPr lang="en-US" sz="1200" i="1" kern="1200" dirty="0" err="1" smtClean="0">
@@ -1847,7 +1913,7 @@
                 <a:ea typeface="+mn-ea"/>
                 <a:cs typeface="+mn-cs"/>
               </a:rPr>
-              <a:t>brucei</a:t>
+              <a:t>falciparum</a:t>
             </a:r>
             <a:r>
               <a:rPr lang="en-US" sz="1200" kern="1200" dirty="0" smtClean="0">
@@ -1858,7 +1924,7 @@
                 <a:ea typeface="+mn-ea"/>
                 <a:cs typeface="+mn-cs"/>
               </a:rPr>
-              <a:t>, </a:t>
+              <a:t>, and </a:t>
             </a:r>
             <a:r>
               <a:rPr lang="en-US" sz="1200" i="1" kern="1200" dirty="0" err="1" smtClean="0">
@@ -1869,139 +1935,7 @@
                 <a:ea typeface="+mn-ea"/>
                 <a:cs typeface="+mn-cs"/>
               </a:rPr>
-              <a:t>Trypanosoma</a:t>
-            </a:r>
-            <a:r>
-              <a:rPr lang="en-US" sz="1200" i="1" kern="1200" dirty="0" smtClean="0">
-                <a:solidFill>
-                  <a:schemeClr val="tx1"/>
-                </a:solidFill>
-                <a:latin typeface="+mn-lt"/>
-                <a:ea typeface="+mn-ea"/>
-                <a:cs typeface="+mn-cs"/>
-              </a:rPr>
-              <a:t> </a:t>
-            </a:r>
-            <a:r>
-              <a:rPr lang="en-US" sz="1200" i="1" kern="1200" dirty="0" err="1" smtClean="0">
-                <a:solidFill>
-                  <a:schemeClr val="tx1"/>
-                </a:solidFill>
-                <a:latin typeface="+mn-lt"/>
-                <a:ea typeface="+mn-ea"/>
-                <a:cs typeface="+mn-cs"/>
-              </a:rPr>
-              <a:t>cruzi</a:t>
-            </a:r>
-            <a:r>
-              <a:rPr lang="en-US" sz="1200" kern="1200" dirty="0" smtClean="0">
-                <a:solidFill>
-                  <a:schemeClr val="tx1"/>
-                </a:solidFill>
-                <a:latin typeface="+mn-lt"/>
-                <a:ea typeface="+mn-ea"/>
-                <a:cs typeface="+mn-cs"/>
-              </a:rPr>
-              <a:t>, </a:t>
-            </a:r>
-            <a:r>
-              <a:rPr lang="en-US" sz="1200" i="1" kern="1200" dirty="0" err="1" smtClean="0">
-                <a:solidFill>
-                  <a:schemeClr val="tx1"/>
-                </a:solidFill>
-                <a:latin typeface="+mn-lt"/>
-                <a:ea typeface="+mn-ea"/>
-                <a:cs typeface="+mn-cs"/>
-              </a:rPr>
-              <a:t>Leishmania</a:t>
-            </a:r>
-            <a:r>
-              <a:rPr lang="en-US" sz="1200" i="1" kern="1200" dirty="0" smtClean="0">
-                <a:solidFill>
-                  <a:schemeClr val="tx1"/>
-                </a:solidFill>
-                <a:latin typeface="+mn-lt"/>
-                <a:ea typeface="+mn-ea"/>
-                <a:cs typeface="+mn-cs"/>
-              </a:rPr>
-              <a:t> major</a:t>
-            </a:r>
-            <a:r>
-              <a:rPr lang="en-US" sz="1200" kern="1200" dirty="0" smtClean="0">
-                <a:solidFill>
-                  <a:schemeClr val="tx1"/>
-                </a:solidFill>
-                <a:latin typeface="+mn-lt"/>
-                <a:ea typeface="+mn-ea"/>
-                <a:cs typeface="+mn-cs"/>
-              </a:rPr>
-              <a:t>, </a:t>
-            </a:r>
-            <a:r>
-              <a:rPr lang="en-US" sz="1200" i="1" kern="1200" dirty="0" smtClean="0">
-                <a:solidFill>
-                  <a:schemeClr val="tx1"/>
-                </a:solidFill>
-                <a:latin typeface="+mn-lt"/>
-                <a:ea typeface="+mn-ea"/>
-                <a:cs typeface="+mn-cs"/>
-              </a:rPr>
-              <a:t>Plasmodium </a:t>
-            </a:r>
-            <a:r>
-              <a:rPr lang="en-US" sz="1200" i="1" kern="1200" dirty="0" err="1" smtClean="0">
-                <a:solidFill>
-                  <a:schemeClr val="tx1"/>
-                </a:solidFill>
-                <a:latin typeface="+mn-lt"/>
-                <a:ea typeface="+mn-ea"/>
-                <a:cs typeface="+mn-cs"/>
-              </a:rPr>
-              <a:t>falciparum</a:t>
-            </a:r>
-            <a:r>
-              <a:rPr lang="en-US" sz="1200" kern="1200" dirty="0" smtClean="0">
-                <a:solidFill>
-                  <a:schemeClr val="tx1"/>
-                </a:solidFill>
-                <a:latin typeface="+mn-lt"/>
-                <a:ea typeface="+mn-ea"/>
-                <a:cs typeface="+mn-cs"/>
-              </a:rPr>
-              <a:t>, and </a:t>
-            </a:r>
-            <a:r>
-              <a:rPr lang="en-US" sz="1200" i="1" kern="1200" dirty="0" err="1" smtClean="0">
-                <a:solidFill>
-                  <a:schemeClr val="tx1"/>
-                </a:solidFill>
-                <a:latin typeface="+mn-lt"/>
-                <a:ea typeface="+mn-ea"/>
-                <a:cs typeface="+mn-cs"/>
-              </a:rPr>
-              <a:t>Schistosoma</a:t>
-            </a:r>
-            <a:r>
-              <a:rPr lang="en-US" sz="1200" i="1" kern="1200" dirty="0" smtClean="0">
-                <a:solidFill>
-                  <a:schemeClr val="tx1"/>
-                </a:solidFill>
-                <a:latin typeface="+mn-lt"/>
-                <a:ea typeface="+mn-ea"/>
-                <a:cs typeface="+mn-cs"/>
-              </a:rPr>
-              <a:t> </a:t>
-            </a:r>
-            <a:r>
-              <a:rPr lang="en-US" sz="1200" i="1" kern="1200" dirty="0" err="1" smtClean="0">
-                <a:solidFill>
-                  <a:schemeClr val="tx1"/>
-                </a:solidFill>
-                <a:latin typeface="+mn-lt"/>
-                <a:ea typeface="+mn-ea"/>
-                <a:cs typeface="+mn-cs"/>
-              </a:rPr>
-              <a:t>mansoni</a:t>
+              <a:t>Schistosomamansoni</a:t>
             </a:r>
             <a:r>
               <a:rPr lang="en-US" sz="1200" kern="1200" dirty="0" smtClean="0">
@@ -2101,7 +2035,7 @@
 </file>
 
 <file path=ppt/notesSlides/notesSlide8.xml><?xml version="1.0" encoding="utf-8"?>
-<p:notes xmlns:a="http://schemas.openxmlformats.org/drawingml/2006/main" xmlns:r="http://schemas.openxmlformats.org/officeDocument/2006/relationships" xmlns:mc="http://schemas.openxmlformats.org/markup-compatibility/2006" xmlns:mv="urn:schemas-microsoft-com:mac:vml" xmlns:p="http://schemas.openxmlformats.org/presentationml/2006/main" mc:Ignorable="mv" mc:PreserveAttributes="mv:*">
+<p:notes xmlns:a="http://schemas.openxmlformats.org/drawingml/2006/main" xmlns:r="http://schemas.openxmlformats.org/officeDocument/2006/relationships" xmlns:p="http://schemas.openxmlformats.org/presentationml/2006/main">
   <p:cSld>
     <p:spTree>
       <p:nvGrpSpPr>
@@ -2209,30 +2143,7 @@
                 <a:cs typeface="+mn-cs"/>
                 <a:hlinkClick r:id="rId3"/>
               </a:rPr>
-              <a:t>Life Cycle of a Parasite | eHow.com</a:t>
-            </a:r>
-            <a:r>
-              <a:rPr lang="en-US" sz="1200" u="none" strike="noStrike" kern="1200" dirty="0" smtClean="0">
-                <a:solidFill>
-                  <a:schemeClr val="tx1"/>
-                </a:solidFill>
-                <a:latin typeface="+mn-lt"/>
-                <a:ea typeface="+mn-ea"/>
-                <a:cs typeface="+mn-cs"/>
-              </a:rPr>
-              <a:t> </a:t>
-            </a:r>
-            <a:r>
-              <a:rPr lang="en-US" sz="1200" u="none" strike="noStrike" kern="1200" dirty="0" smtClean="0">
-                <a:solidFill>
-                  <a:schemeClr val="tx1"/>
-                </a:solidFill>
-                <a:latin typeface="+mn-lt"/>
-                <a:ea typeface="+mn-ea"/>
-                <a:cs typeface="+mn-cs"/>
-                <a:hlinkClick r:id="rId3"/>
-              </a:rPr>
-              <a:t>http://www.ehow.com/about_5339802_life-cycle-parasite.html#ixzz1S1N345mM</a:t>
+              <a:t>Life Cycle of a Parasite | eHow.comhttp://www.ehow.com/about_5339802_life-cycle-parasite.html#ixzz1S1N345mM</a:t>
             </a:r>
             <a:endParaRPr lang="en-US" sz="1200" u="none" strike="noStrike" kern="1200" dirty="0" smtClean="0">
               <a:solidFill>
@@ -2332,11 +2243,11 @@
             </a:r>
             <a:r>
               <a:rPr lang="en-US" dirty="0" err="1" smtClean="0"/>
-              <a:t>metacyclic</a:t>
+              <a:t>metacyclictrypomastigotes</a:t>
             </a:r>
             <a:r>
               <a:rPr lang="en-US" dirty="0" smtClean="0"/>
-              <a:t> </a:t>
+              <a:t> into skin tissue.  The parasites enter the lymphatic system and pass into the bloodstream (1) .  Inside the host, they transform into bloodstream </a:t>
             </a:r>
             <a:r>
               <a:rPr lang="en-US" dirty="0" err="1" smtClean="0"/>
@@ -2344,7 +2255,7 @@
             </a:r>
             <a:r>
               <a:rPr lang="en-US" dirty="0" smtClean="0"/>
-              <a:t> into skin tissue.  The parasites enter the lymphatic system and pass into the bloodstream (1) .  Inside the host, they transform into bloodstream </a:t>
+              <a:t>  (2), are carried to other sites throughout the body, reach other blood fluids (e.g., lymph, spinal fluid), and continue the replication by binary fission (3).  The entire life cycle of African Trypanosomes is represented by extracellular stages.  The tsetse fly becomes infected with bloodstream </a:t>
             </a:r>
             <a:r>
               <a:rPr lang="en-US" dirty="0" err="1" smtClean="0"/>
@@ -2352,14 +2263,6 @@
             </a:r>
             <a:r>
               <a:rPr lang="en-US" dirty="0" smtClean="0"/>
-              <a:t>  (2), are carried to other sites throughout the body, reach other blood fluids (e.g., lymph, spinal fluid), and continue the replication by binary fission (3).  The entire life cycle of African Trypanosomes is represented by extracellular stages.  The tsetse fly becomes infected with bloodstream </a:t>
-            </a:r>
-            <a:r>
-              <a:rPr lang="en-US" dirty="0" err="1" smtClean="0"/>
-              <a:t>trypomastigotes</a:t>
-            </a:r>
-            <a:r>
-              <a:rPr lang="en-US" dirty="0" smtClean="0"/>
               <a:t> when taking a blood meal on an infected mammalian host (4,5).  In the fly’s </a:t>
             </a:r>
             <a:r>
@@ -2372,15 +2275,7 @@
             </a:r>
             <a:r>
               <a:rPr lang="en-US" dirty="0" err="1" smtClean="0"/>
-              <a:t>procyclic</a:t>
-            </a:r>
-            <a:r>
-              <a:rPr lang="en-US" dirty="0" smtClean="0"/>
-              <a:t> </a:t>
-            </a:r>
-            <a:r>
-              <a:rPr lang="en-US" dirty="0" err="1" smtClean="0"/>
-              <a:t>trypomastigotes</a:t>
+              <a:t>procyclictrypomastigotes</a:t>
             </a:r>
             <a:r>
               <a:rPr lang="en-US" dirty="0" smtClean="0"/>
@@ -2412,23 +2307,7 @@
             </a:r>
             <a:r>
               <a:rPr lang="en-US" i="1" dirty="0" err="1" smtClean="0"/>
-              <a:t>Trypanosoma</a:t>
-            </a:r>
-            <a:r>
-              <a:rPr lang="en-US" i="1" dirty="0" smtClean="0"/>
-              <a:t> </a:t>
-            </a:r>
-            <a:r>
-              <a:rPr lang="en-US" i="1" dirty="0" err="1" smtClean="0"/>
-              <a:t>brucei</a:t>
-            </a:r>
-            <a:r>
-              <a:rPr lang="en-US" i="1" dirty="0" smtClean="0"/>
-              <a:t> </a:t>
-            </a:r>
-            <a:r>
-              <a:rPr lang="en-US" i="1" dirty="0" err="1" smtClean="0"/>
-              <a:t>gambiense</a:t>
+              <a:t>Trypanosomabruceigambiense</a:t>
             </a:r>
             <a:r>
               <a:rPr lang="en-US" dirty="0" smtClean="0"/>
@@ -2523,7 +2402,205 @@
                 <a:ea typeface="+mn-ea"/>
                 <a:cs typeface="+mn-cs"/>
               </a:rPr>
-              <a:t>Trypanosoma</a:t>
+              <a:t>Trypanosomacruzi</a:t>
+            </a:r>
+            <a:r>
+              <a:rPr lang="en-US" sz="1200" kern="1200" dirty="0" err="1" smtClean="0">
+                <a:solidFill>
+                  <a:schemeClr val="tx1"/>
+                </a:solidFill>
+                <a:latin typeface="+mn-lt"/>
+                <a:ea typeface="+mn-ea"/>
+                <a:cs typeface="+mn-cs"/>
+              </a:rPr>
+              <a:t>parasite</a:t>
+            </a:r>
+            <a:r>
+              <a:rPr lang="en-US" sz="1200" kern="1200" dirty="0" smtClean="0">
+                <a:solidFill>
+                  <a:schemeClr val="tx1"/>
+                </a:solidFill>
+                <a:latin typeface="+mn-lt"/>
+                <a:ea typeface="+mn-ea"/>
+                <a:cs typeface="+mn-cs"/>
+              </a:rPr>
+              <a:t>, which has three stages, namely </a:t>
+            </a:r>
+            <a:r>
+              <a:rPr lang="en-US" sz="1200" kern="1200" dirty="0" err="1" smtClean="0">
+                <a:solidFill>
+                  <a:schemeClr val="tx1"/>
+                </a:solidFill>
+                <a:latin typeface="+mn-lt"/>
+                <a:ea typeface="+mn-ea"/>
+                <a:cs typeface="+mn-cs"/>
+              </a:rPr>
+              <a:t>amastigote</a:t>
+            </a:r>
+            <a:r>
+              <a:rPr lang="en-US" sz="1200" kern="1200" dirty="0" smtClean="0">
+                <a:solidFill>
+                  <a:schemeClr val="tx1"/>
+                </a:solidFill>
+                <a:latin typeface="+mn-lt"/>
+                <a:ea typeface="+mn-ea"/>
+                <a:cs typeface="+mn-cs"/>
+              </a:rPr>
+              <a:t>, </a:t>
+            </a:r>
+            <a:r>
+              <a:rPr lang="en-US" sz="1200" kern="1200" dirty="0" err="1" smtClean="0">
+                <a:solidFill>
+                  <a:schemeClr val="tx1"/>
+                </a:solidFill>
+                <a:latin typeface="+mn-lt"/>
+                <a:ea typeface="+mn-ea"/>
+                <a:cs typeface="+mn-cs"/>
+              </a:rPr>
+              <a:t>epimastigote</a:t>
+            </a:r>
+            <a:r>
+              <a:rPr lang="en-US" sz="1200" kern="1200" dirty="0" smtClean="0">
+                <a:solidFill>
+                  <a:schemeClr val="tx1"/>
+                </a:solidFill>
+                <a:latin typeface="+mn-lt"/>
+                <a:ea typeface="+mn-ea"/>
+                <a:cs typeface="+mn-cs"/>
+              </a:rPr>
+              <a:t>, and </a:t>
+            </a:r>
+            <a:r>
+              <a:rPr lang="en-US" sz="1200" kern="1200" dirty="0" err="1" smtClean="0">
+                <a:solidFill>
+                  <a:schemeClr val="tx1"/>
+                </a:solidFill>
+                <a:latin typeface="+mn-lt"/>
+                <a:ea typeface="+mn-ea"/>
+                <a:cs typeface="+mn-cs"/>
+              </a:rPr>
+              <a:t>trypomastigote</a:t>
+            </a:r>
+            <a:r>
+              <a:rPr lang="en-US" sz="1200" kern="1200" dirty="0" smtClean="0">
+                <a:solidFill>
+                  <a:schemeClr val="tx1"/>
+                </a:solidFill>
+                <a:latin typeface="+mn-lt"/>
+                <a:ea typeface="+mn-ea"/>
+                <a:cs typeface="+mn-cs"/>
+              </a:rPr>
+              <a:t>.  The </a:t>
+            </a:r>
+            <a:r>
+              <a:rPr lang="en-US" sz="1200" kern="1200" dirty="0" err="1" smtClean="0">
+                <a:solidFill>
+                  <a:schemeClr val="tx1"/>
+                </a:solidFill>
+                <a:latin typeface="+mn-lt"/>
+                <a:ea typeface="+mn-ea"/>
+                <a:cs typeface="+mn-cs"/>
+              </a:rPr>
+              <a:t>amastigote</a:t>
+            </a:r>
+            <a:r>
+              <a:rPr lang="en-US" sz="1200" kern="1200" dirty="0" smtClean="0">
+                <a:solidFill>
+                  <a:schemeClr val="tx1"/>
+                </a:solidFill>
+                <a:latin typeface="+mn-lt"/>
+                <a:ea typeface="+mn-ea"/>
+                <a:cs typeface="+mn-cs"/>
+              </a:rPr>
+              <a:t> is an intracellular form that is found in humans/vertebrate hosts of the parasite, the </a:t>
+            </a:r>
+            <a:r>
+              <a:rPr lang="en-US" sz="1200" kern="1200" dirty="0" err="1" smtClean="0">
+                <a:solidFill>
+                  <a:schemeClr val="tx1"/>
+                </a:solidFill>
+                <a:latin typeface="+mn-lt"/>
+                <a:ea typeface="+mn-ea"/>
+                <a:cs typeface="+mn-cs"/>
+              </a:rPr>
+              <a:t>epimastigote</a:t>
+            </a:r>
+            <a:r>
+              <a:rPr lang="en-US" sz="1200" kern="1200" dirty="0" smtClean="0">
+                <a:solidFill>
+                  <a:schemeClr val="tx1"/>
+                </a:solidFill>
+                <a:latin typeface="+mn-lt"/>
+                <a:ea typeface="+mn-ea"/>
+                <a:cs typeface="+mn-cs"/>
+              </a:rPr>
+              <a:t> is found in the </a:t>
+            </a:r>
+            <a:r>
+              <a:rPr lang="en-US" sz="1200" kern="1200" dirty="0" err="1" smtClean="0">
+                <a:solidFill>
+                  <a:schemeClr val="tx1"/>
+                </a:solidFill>
+                <a:latin typeface="+mn-lt"/>
+                <a:ea typeface="+mn-ea"/>
+                <a:cs typeface="+mn-cs"/>
+              </a:rPr>
+              <a:t>midgut</a:t>
+            </a:r>
+            <a:r>
+              <a:rPr lang="en-US" sz="1200" kern="1200" dirty="0" smtClean="0">
+                <a:solidFill>
+                  <a:schemeClr val="tx1"/>
+                </a:solidFill>
+                <a:latin typeface="+mn-lt"/>
+                <a:ea typeface="+mn-ea"/>
+                <a:cs typeface="+mn-cs"/>
+              </a:rPr>
+              <a:t> of an insect vector and the </a:t>
+            </a:r>
+            <a:r>
+              <a:rPr lang="en-US" sz="1200" kern="1200" dirty="0" err="1" smtClean="0">
+                <a:solidFill>
+                  <a:schemeClr val="tx1"/>
+                </a:solidFill>
+                <a:latin typeface="+mn-lt"/>
+                <a:ea typeface="+mn-ea"/>
+                <a:cs typeface="+mn-cs"/>
+              </a:rPr>
+              <a:t>trypomastigote</a:t>
+            </a:r>
+            <a:r>
+              <a:rPr lang="en-US" sz="1200" kern="1200" dirty="0" smtClean="0">
+                <a:solidFill>
+                  <a:schemeClr val="tx1"/>
+                </a:solidFill>
+                <a:latin typeface="+mn-lt"/>
+                <a:ea typeface="+mn-ea"/>
+                <a:cs typeface="+mn-cs"/>
+              </a:rPr>
+              <a:t> is found in the bloodstream of a vertebrate host.  Further, the similar lifecycle stage in different organisms may have different locations and vectors.  For example, the </a:t>
+            </a:r>
+            <a:r>
+              <a:rPr lang="en-US" sz="1200" kern="1200" dirty="0" err="1" smtClean="0">
+                <a:solidFill>
+                  <a:schemeClr val="tx1"/>
+                </a:solidFill>
+                <a:latin typeface="+mn-lt"/>
+                <a:ea typeface="+mn-ea"/>
+                <a:cs typeface="+mn-cs"/>
+              </a:rPr>
+              <a:t>epimastigote</a:t>
+            </a:r>
+            <a:r>
+              <a:rPr lang="en-US" sz="1200" kern="1200" dirty="0" smtClean="0">
+                <a:solidFill>
+                  <a:schemeClr val="tx1"/>
+                </a:solidFill>
+                <a:latin typeface="+mn-lt"/>
+                <a:ea typeface="+mn-ea"/>
+                <a:cs typeface="+mn-cs"/>
+              </a:rPr>
+              <a:t> stage of </a:t>
             </a:r>
             <a:r>
               <a:rPr lang="en-US" sz="1200" i="1" kern="1200" dirty="0" smtClean="0">
@@ -2534,7 +2611,7 @@
                 <a:ea typeface="+mn-ea"/>
                 <a:cs typeface="+mn-cs"/>
               </a:rPr>
-              <a:t> </a:t>
+              <a:t>T. </a:t>
             </a:r>
             <a:r>
               <a:rPr lang="en-US" sz="1200" i="1" kern="1200" dirty="0" err="1" smtClean="0">
@@ -2548,6 +2625,17 @@
               <a:t>cruzi</a:t>
             </a:r>
             <a:r>
+              <a:rPr lang="en-US" sz="1200" kern="1200" dirty="0" smtClean="0">
+                <a:solidFill>
+                  <a:schemeClr val="tx1"/>
+                </a:solidFill>
+                <a:latin typeface="+mn-lt"/>
+                <a:ea typeface="+mn-ea"/>
+                <a:cs typeface="+mn-cs"/>
+              </a:rPr>
+              <a:t> occurs in the </a:t>
+            </a:r>
+            <a:r>
               <a:rPr lang="en-US" sz="1200" kern="1200" dirty="0" err="1" smtClean="0">
                 <a:solidFill>
                   <a:schemeClr val="tx1"/>
@@ -2556,7 +2644,7 @@
                 <a:ea typeface="+mn-ea"/>
                 <a:cs typeface="+mn-cs"/>
               </a:rPr>
-              <a:t>parasite</a:t>
+              <a:t>midgut</a:t>
             </a:r>
             <a:r>
               <a:rPr lang="en-US" sz="1200" kern="1200" dirty="0" smtClean="0">
@@ -2567,7 +2655,7 @@
                 <a:ea typeface="+mn-ea"/>
                 <a:cs typeface="+mn-cs"/>
               </a:rPr>
-              <a:t>, which has three stages, namely </a:t>
+              <a:t> of the </a:t>
             </a:r>
             <a:r>
               <a:rPr lang="en-US" sz="1200" kern="1200" dirty="0" err="1" smtClean="0">
@@ -2578,7 +2666,7 @@
                 <a:ea typeface="+mn-ea"/>
                 <a:cs typeface="+mn-cs"/>
               </a:rPr>
-              <a:t>amastigote</a:t>
+              <a:t>triatomine</a:t>
             </a:r>
             <a:r>
               <a:rPr lang="en-US" sz="1200" kern="1200" dirty="0" smtClean="0">
@@ -2589,10 +2677,10 @@
                 <a:ea typeface="+mn-ea"/>
                 <a:cs typeface="+mn-cs"/>
               </a:rPr>
-              <a:t>, </a:t>
-            </a:r>
-            <a:r>
-              <a:rPr lang="en-US" sz="1200" kern="1200" dirty="0" err="1" smtClean="0">
+              <a:t> kissing bug, but in </a:t>
+            </a:r>
+            <a:r>
+              <a:rPr lang="en-US" sz="1200" i="1" kern="1200" dirty="0" smtClean="0">
                 <a:solidFill>
                   <a:schemeClr val="tx1"/>
                 </a:solidFill>
@@ -2600,7 +2688,18 @@
                 <a:ea typeface="+mn-ea"/>
                 <a:cs typeface="+mn-cs"/>
               </a:rPr>
-              <a:t>epimastigote</a:t>
+              <a:t>T. </a:t>
+            </a:r>
+            <a:r>
+              <a:rPr lang="en-US" sz="1200" i="1" kern="1200" dirty="0" err="1" smtClean="0">
+                <a:solidFill>
+                  <a:schemeClr val="tx1"/>
+                </a:solidFill>
+                <a:latin typeface="+mn-lt"/>
+                <a:ea typeface="+mn-ea"/>
+                <a:cs typeface="+mn-cs"/>
+              </a:rPr>
+              <a:t>brucei</a:t>
             </a:r>
             <a:r>
               <a:rPr lang="en-US" sz="1200" kern="1200" dirty="0" smtClean="0">
@@ -2611,150 +2710,7 @@
                 <a:ea typeface="+mn-ea"/>
                 <a:cs typeface="+mn-cs"/>
               </a:rPr>
-              <a:t>, and </a:t>
-            </a:r>
-            <a:r>
-              <a:rPr lang="en-US" sz="1200" kern="1200" dirty="0" err="1" smtClean="0">
-                <a:solidFill>
-                  <a:schemeClr val="tx1"/>
-                </a:solidFill>
-                <a:latin typeface="+mn-lt"/>
-                <a:ea typeface="+mn-ea"/>
-                <a:cs typeface="+mn-cs"/>
-              </a:rPr>
-              <a:t>trypomastigote</a:t>
-            </a:r>
-            <a:r>
-              <a:rPr lang="en-US" sz="1200" kern="1200" dirty="0" smtClean="0">
-                <a:solidFill>
-                  <a:schemeClr val="tx1"/>
-                </a:solidFill>
-                <a:latin typeface="+mn-lt"/>
-                <a:ea typeface="+mn-ea"/>
-                <a:cs typeface="+mn-cs"/>
-              </a:rPr>
-              <a:t>.  The </a:t>
-            </a:r>
-            <a:r>
-              <a:rPr lang="en-US" sz="1200" kern="1200" dirty="0" err="1" smtClean="0">
-                <a:solidFill>
-                  <a:schemeClr val="tx1"/>
-                </a:solidFill>
-                <a:latin typeface="+mn-lt"/>
-                <a:ea typeface="+mn-ea"/>
-                <a:cs typeface="+mn-cs"/>
-              </a:rPr>
-              <a:t>amastigote</a:t>
-            </a:r>
-            <a:r>
-              <a:rPr lang="en-US" sz="1200" kern="1200" dirty="0" smtClean="0">
-                <a:solidFill>
-                  <a:schemeClr val="tx1"/>
-                </a:solidFill>
-                <a:latin typeface="+mn-lt"/>
-                <a:ea typeface="+mn-ea"/>
-                <a:cs typeface="+mn-cs"/>
-              </a:rPr>
-              <a:t> is an intracellular form that is found in humans/vertebrate hosts of the parasite, the </a:t>
-            </a:r>
-            <a:r>
-              <a:rPr lang="en-US" sz="1200" kern="1200" dirty="0" err="1" smtClean="0">
-                <a:solidFill>
-                  <a:schemeClr val="tx1"/>
-                </a:solidFill>
-                <a:latin typeface="+mn-lt"/>
-                <a:ea typeface="+mn-ea"/>
-                <a:cs typeface="+mn-cs"/>
-              </a:rPr>
-              <a:t>epimastigote</a:t>
-            </a:r>
-            <a:r>
-              <a:rPr lang="en-US" sz="1200" kern="1200" dirty="0" smtClean="0">
-                <a:solidFill>
-                  <a:schemeClr val="tx1"/>
-                </a:solidFill>
-                <a:latin typeface="+mn-lt"/>
-                <a:ea typeface="+mn-ea"/>
-                <a:cs typeface="+mn-cs"/>
-              </a:rPr>
-              <a:t> is found in the </a:t>
-            </a:r>
-            <a:r>
-              <a:rPr lang="en-US" sz="1200" kern="1200" dirty="0" err="1" smtClean="0">
-                <a:solidFill>
-                  <a:schemeClr val="tx1"/>
-                </a:solidFill>
-                <a:latin typeface="+mn-lt"/>
-                <a:ea typeface="+mn-ea"/>
-                <a:cs typeface="+mn-cs"/>
-              </a:rPr>
-              <a:t>midgut</a:t>
-            </a:r>
-            <a:r>
-              <a:rPr lang="en-US" sz="1200" kern="1200" dirty="0" smtClean="0">
-                <a:solidFill>
-                  <a:schemeClr val="tx1"/>
-                </a:solidFill>
-                <a:latin typeface="+mn-lt"/>
-                <a:ea typeface="+mn-ea"/>
-                <a:cs typeface="+mn-cs"/>
-              </a:rPr>
-              <a:t> of an insect vector and the </a:t>
-            </a:r>
-            <a:r>
-              <a:rPr lang="en-US" sz="1200" kern="1200" dirty="0" err="1" smtClean="0">
-                <a:solidFill>
-                  <a:schemeClr val="tx1"/>
-                </a:solidFill>
-                <a:latin typeface="+mn-lt"/>
-                <a:ea typeface="+mn-ea"/>
-                <a:cs typeface="+mn-cs"/>
-              </a:rPr>
-              <a:t>trypomastigote</a:t>
-            </a:r>
-            <a:r>
-              <a:rPr lang="en-US" sz="1200" kern="1200" dirty="0" smtClean="0">
-                <a:solidFill>
-                  <a:schemeClr val="tx1"/>
-                </a:solidFill>
-                <a:latin typeface="+mn-lt"/>
-                <a:ea typeface="+mn-ea"/>
-                <a:cs typeface="+mn-cs"/>
-              </a:rPr>
-              <a:t> is found in the bloodstream of a vertebrate host.  Further, the similar lifecycle stage in different organisms may have different locations and vectors.  For example, the </a:t>
-            </a:r>
-            <a:r>
-              <a:rPr lang="en-US" sz="1200" kern="1200" dirty="0" err="1" smtClean="0">
-                <a:solidFill>
-                  <a:schemeClr val="tx1"/>
-                </a:solidFill>
-                <a:latin typeface="+mn-lt"/>
-                <a:ea typeface="+mn-ea"/>
-                <a:cs typeface="+mn-cs"/>
-              </a:rPr>
-              <a:t>epimastigote</a:t>
-            </a:r>
-            <a:r>
-              <a:rPr lang="en-US" sz="1200" kern="1200" dirty="0" smtClean="0">
-                <a:solidFill>
-                  <a:schemeClr val="tx1"/>
-                </a:solidFill>
-                <a:latin typeface="+mn-lt"/>
-                <a:ea typeface="+mn-ea"/>
-                <a:cs typeface="+mn-cs"/>
-              </a:rPr>
-              <a:t> stage of </a:t>
-            </a:r>
-            <a:r>
-              <a:rPr lang="en-US" sz="1200" i="1" kern="1200" dirty="0" smtClean="0">
-                <a:solidFill>
-                  <a:schemeClr val="tx1"/>
-                </a:solidFill>
-                <a:latin typeface="+mn-lt"/>
-                <a:ea typeface="+mn-ea"/>
-                <a:cs typeface="+mn-cs"/>
-              </a:rPr>
-              <a:t>T. </a:t>
+              <a:t> it occurs in the salivary gland of the tsetse fly, </a:t>
             </a:r>
             <a:r>
               <a:rPr lang="en-US" sz="1200" i="1" kern="1200" dirty="0" err="1" smtClean="0">
@@ -2765,128 +2721,7 @@
                 <a:ea typeface="+mn-ea"/>
                 <a:cs typeface="+mn-cs"/>
               </a:rPr>
-              <a:t>cruzi</a:t>
-            </a:r>
-            <a:r>
-              <a:rPr lang="en-US" sz="1200" kern="1200" dirty="0" smtClean="0">
-                <a:solidFill>
-                  <a:schemeClr val="tx1"/>
-                </a:solidFill>
-                <a:latin typeface="+mn-lt"/>
-                <a:ea typeface="+mn-ea"/>
-                <a:cs typeface="+mn-cs"/>
-              </a:rPr>
-              <a:t> occurs in the </a:t>
-            </a:r>
-            <a:r>
-              <a:rPr lang="en-US" sz="1200" kern="1200" dirty="0" err="1" smtClean="0">
-                <a:solidFill>
-                  <a:schemeClr val="tx1"/>
-                </a:solidFill>
-                <a:latin typeface="+mn-lt"/>
-                <a:ea typeface="+mn-ea"/>
-                <a:cs typeface="+mn-cs"/>
-              </a:rPr>
-              <a:t>midgut</a:t>
-            </a:r>
-            <a:r>
-              <a:rPr lang="en-US" sz="1200" kern="1200" dirty="0" smtClean="0">
-                <a:solidFill>
-                  <a:schemeClr val="tx1"/>
-                </a:solidFill>
-                <a:latin typeface="+mn-lt"/>
-                <a:ea typeface="+mn-ea"/>
-                <a:cs typeface="+mn-cs"/>
-              </a:rPr>
-              <a:t> of the </a:t>
-            </a:r>
-            <a:r>
-              <a:rPr lang="en-US" sz="1200" kern="1200" dirty="0" err="1" smtClean="0">
-                <a:solidFill>
-                  <a:schemeClr val="tx1"/>
-                </a:solidFill>
-                <a:latin typeface="+mn-lt"/>
-                <a:ea typeface="+mn-ea"/>
-                <a:cs typeface="+mn-cs"/>
-              </a:rPr>
-              <a:t>triatomine</a:t>
-            </a:r>
-            <a:r>
-              <a:rPr lang="en-US" sz="1200" kern="1200" dirty="0" smtClean="0">
-                <a:solidFill>
-                  <a:schemeClr val="tx1"/>
-                </a:solidFill>
-                <a:latin typeface="+mn-lt"/>
-                <a:ea typeface="+mn-ea"/>
-                <a:cs typeface="+mn-cs"/>
-              </a:rPr>
-              <a:t> kissing bug, but in </a:t>
-            </a:r>
-            <a:r>
-              <a:rPr lang="en-US" sz="1200" i="1" kern="1200" dirty="0" smtClean="0">
-                <a:solidFill>
-                  <a:schemeClr val="tx1"/>
-                </a:solidFill>
-                <a:latin typeface="+mn-lt"/>
-                <a:ea typeface="+mn-ea"/>
-                <a:cs typeface="+mn-cs"/>
-              </a:rPr>
-              <a:t>T. </a:t>
-            </a:r>
-            <a:r>
-              <a:rPr lang="en-US" sz="1200" i="1" kern="1200" dirty="0" err="1" smtClean="0">
-                <a:solidFill>
-                  <a:schemeClr val="tx1"/>
-                </a:solidFill>
-                <a:latin typeface="+mn-lt"/>
-                <a:ea typeface="+mn-ea"/>
-                <a:cs typeface="+mn-cs"/>
-              </a:rPr>
-              <a:t>brucei</a:t>
-            </a:r>
-            <a:r>
-              <a:rPr lang="en-US" sz="1200" kern="1200" dirty="0" smtClean="0">
-                <a:solidFill>
-                  <a:schemeClr val="tx1"/>
-                </a:solidFill>
-                <a:latin typeface="+mn-lt"/>
-                <a:ea typeface="+mn-ea"/>
-                <a:cs typeface="+mn-cs"/>
-              </a:rPr>
-              <a:t> it occurs in the salivary gland of the tsetse fly, </a:t>
-            </a:r>
-            <a:r>
-              <a:rPr lang="en-US" sz="1200" i="1" kern="1200" dirty="0" err="1" smtClean="0">
-                <a:solidFill>
-                  <a:schemeClr val="tx1"/>
-                </a:solidFill>
-                <a:latin typeface="+mn-lt"/>
-                <a:ea typeface="+mn-ea"/>
-                <a:cs typeface="+mn-cs"/>
-              </a:rPr>
-              <a:t>Glossina</a:t>
-            </a:r>
-            <a:r>
-              <a:rPr lang="en-US" sz="1200" i="1" kern="1200" dirty="0" smtClean="0">
-                <a:solidFill>
-                  <a:schemeClr val="tx1"/>
-                </a:solidFill>
-                <a:latin typeface="+mn-lt"/>
-                <a:ea typeface="+mn-ea"/>
-                <a:cs typeface="+mn-cs"/>
-              </a:rPr>
-              <a:t> </a:t>
-            </a:r>
-            <a:r>
-              <a:rPr lang="en-US" sz="1200" i="1" kern="1200" dirty="0" err="1" smtClean="0">
-                <a:solidFill>
-                  <a:schemeClr val="tx1"/>
-                </a:solidFill>
-                <a:latin typeface="+mn-lt"/>
-                <a:ea typeface="+mn-ea"/>
-                <a:cs typeface="+mn-cs"/>
-              </a:rPr>
-              <a:t>morsitans</a:t>
+              <a:t>Glossinamorsitans</a:t>
             </a:r>
             <a:r>
               <a:rPr lang="en-US" sz="1200" kern="1200" dirty="0" smtClean="0">
@@ -2994,7 +2829,7 @@
 </file>
 
 <file path=ppt/notesSlides/notesSlide9.xml><?xml version="1.0" encoding="utf-8"?>
-<p:notes xmlns:a="http://schemas.openxmlformats.org/drawingml/2006/main" xmlns:r="http://schemas.openxmlformats.org/officeDocument/2006/relationships" xmlns:mc="http://schemas.openxmlformats.org/markup-compatibility/2006" xmlns:mv="urn:schemas-microsoft-com:mac:vml" xmlns:p="http://schemas.openxmlformats.org/presentationml/2006/main" mc:Ignorable="mv" mc:PreserveAttributes="mv:*">
+<p:notes xmlns:a="http://schemas.openxmlformats.org/drawingml/2006/main" xmlns:r="http://schemas.openxmlformats.org/officeDocument/2006/relationships" xmlns:p="http://schemas.openxmlformats.org/presentationml/2006/main">
   <p:cSld>
     <p:spTree>
       <p:nvGrpSpPr>
@@ -3089,7 +2924,7 @@
 </file>
 
 <file path=ppt/slideLayouts/slideLayout1.xml><?xml version="1.0" encoding="utf-8"?>
-<p:sldLayout xmlns:a="http://schemas.openxmlformats.org/drawingml/2006/main" xmlns:r="http://schemas.openxmlformats.org/officeDocument/2006/relationships" xmlns:mc="http://schemas.openxmlformats.org/markup-compatibility/2006" xmlns:mv="urn:schemas-microsoft-com:mac:vml" xmlns:p="http://schemas.openxmlformats.org/presentationml/2006/main" mc:Ignorable="mv" mc:PreserveAttributes="mv:*" type="title" preserve="1">
+<p:sldLayout xmlns:a="http://schemas.openxmlformats.org/drawingml/2006/main" xmlns:r="http://schemas.openxmlformats.org/officeDocument/2006/relationships" xmlns:p="http://schemas.openxmlformats.org/presentationml/2006/main" type="title" preserve="1">
   <p:cSld name="Title Slide">
     <p:spTree>
       <p:nvGrpSpPr>
@@ -4130,7 +3965,7 @@
               <a:pPr>
                 <a:defRPr/>
               </a:pPr>
-              <a:t>7/14/11</a:t>
+              <a:t>7/21/2011</a:t>
             </a:fld>
             <a:endParaRPr lang="en-US"/>
           </a:p>
@@ -4214,7 +4049,7 @@
 </file>
 
 <file path=ppt/slideLayouts/slideLayout2.xml><?xml version="1.0" encoding="utf-8"?>
-<p:sldLayout xmlns:a="http://schemas.openxmlformats.org/drawingml/2006/main" xmlns:r="http://schemas.openxmlformats.org/officeDocument/2006/relationships" xmlns:mc="http://schemas.openxmlformats.org/markup-compatibility/2006" xmlns:mv="urn:schemas-microsoft-com:mac:vml" xmlns:p="http://schemas.openxmlformats.org/presentationml/2006/main" mc:Ignorable="mv" mc:PreserveAttributes="mv:*" type="obj" preserve="1">
+<p:sldLayout xmlns:a="http://schemas.openxmlformats.org/drawingml/2006/main" xmlns:r="http://schemas.openxmlformats.org/officeDocument/2006/relationships" xmlns:p="http://schemas.openxmlformats.org/presentationml/2006/main" type="obj" preserve="1">
   <p:cSld name="Title and Content">
     <p:spTree>
       <p:nvGrpSpPr>
@@ -4695,7 +4530,7 @@
               <a:pPr>
                 <a:defRPr/>
               </a:pPr>
-              <a:t>7/14/11</a:t>
+              <a:t>7/21/2011</a:t>
             </a:fld>
             <a:endParaRPr lang="en-US"/>
           </a:p>
@@ -4769,7 +4604,7 @@
 </file>
 
 <file path=ppt/slideMasters/slideMaster1.xml><?xml version="1.0" encoding="utf-8"?>
-<p:sldMaster xmlns:a="http://schemas.openxmlformats.org/drawingml/2006/main" xmlns:r="http://schemas.openxmlformats.org/officeDocument/2006/relationships" xmlns:mc="http://schemas.openxmlformats.org/markup-compatibility/2006" xmlns:mv="urn:schemas-microsoft-com:mac:vml" xmlns:p="http://schemas.openxmlformats.org/presentationml/2006/main" mc:Ignorable="mv" mc:PreserveAttributes="mv:*">
+<p:sldMaster xmlns:a="http://schemas.openxmlformats.org/drawingml/2006/main" xmlns:r="http://schemas.openxmlformats.org/officeDocument/2006/relationships" xmlns:p="http://schemas.openxmlformats.org/presentationml/2006/main">
   <p:cSld>
     <p:bg>
       <p:bgRef idx="1001">
@@ -4940,7 +4775,7 @@
               <a:pPr>
                 <a:defRPr/>
               </a:pPr>
-              <a:t>7/14/11</a:t>
+              <a:t>7/21/2011</a:t>
             </a:fld>
             <a:endParaRPr lang="en-US"/>
           </a:p>
@@ -5473,7 +5308,7 @@
 </file>
 
 <file path=ppt/slides/slide1.xml><?xml version="1.0" encoding="utf-8"?>
-<p:sld xmlns:a="http://schemas.openxmlformats.org/drawingml/2006/main" xmlns:r="http://schemas.openxmlformats.org/officeDocument/2006/relationships" xmlns:mc="http://schemas.openxmlformats.org/markup-compatibility/2006" xmlns:mv="urn:schemas-microsoft-com:mac:vml" xmlns:p="http://schemas.openxmlformats.org/presentationml/2006/main" mc:Ignorable="mv" mc:PreserveAttributes="mv:*">
+<p:sld xmlns:a="http://schemas.openxmlformats.org/drawingml/2006/main" xmlns:r="http://schemas.openxmlformats.org/officeDocument/2006/relationships" xmlns:p="http://schemas.openxmlformats.org/presentationml/2006/main">
   <p:cSld>
     <p:spTree>
       <p:nvGrpSpPr>
@@ -5679,7 +5514,7 @@
 </file>
 
 <file path=ppt/slides/slide10.xml><?xml version="1.0" encoding="utf-8"?>
-<p:sld xmlns:a="http://schemas.openxmlformats.org/drawingml/2006/main" xmlns:r="http://schemas.openxmlformats.org/officeDocument/2006/relationships" xmlns:mc="http://schemas.openxmlformats.org/markup-compatibility/2006" xmlns:mv="urn:schemas-microsoft-com:mac:vml" xmlns:p="http://schemas.openxmlformats.org/presentationml/2006/main" mc:Ignorable="mv" mc:PreserveAttributes="mv:*">
+<p:sld xmlns:a="http://schemas.openxmlformats.org/drawingml/2006/main" xmlns:r="http://schemas.openxmlformats.org/officeDocument/2006/relationships" xmlns:p="http://schemas.openxmlformats.org/presentationml/2006/main">
   <p:cSld>
     <p:spTree>
       <p:nvGrpSpPr>
@@ -5803,7 +5638,7 @@
 </file>
 
 <file path=ppt/slides/slide11.xml><?xml version="1.0" encoding="utf-8"?>
-<p:sld xmlns:a="http://schemas.openxmlformats.org/drawingml/2006/main" xmlns:r="http://schemas.openxmlformats.org/officeDocument/2006/relationships" xmlns:mc="http://schemas.openxmlformats.org/markup-compatibility/2006" xmlns:mv="urn:schemas-microsoft-com:mac:vml" xmlns:p="http://schemas.openxmlformats.org/presentationml/2006/main" mc:Ignorable="mv" mc:PreserveAttributes="mv:*">
+<p:sld xmlns:a="http://schemas.openxmlformats.org/drawingml/2006/main" xmlns:r="http://schemas.openxmlformats.org/officeDocument/2006/relationships" xmlns:p="http://schemas.openxmlformats.org/presentationml/2006/main">
   <p:cSld>
     <p:spTree>
       <p:nvGrpSpPr>
@@ -6176,7 +6011,27 @@
                 <a:latin typeface="Arial" charset="0"/>
                 <a:ea typeface="ＭＳ Ｐゴシック" pitchFamily="34" charset="-128"/>
               </a:rPr>
-              <a:t>is_aoccurrent</a:t>
+              <a:t>is_a</a:t>
+            </a:r>
+            <a:r>
+              <a:rPr lang="en-US" sz="1600" dirty="0" smtClean="0">
+                <a:solidFill>
+                  <a:schemeClr val="tx1"/>
+                </a:solidFill>
+                <a:latin typeface="Arial" charset="0"/>
+                <a:ea typeface="ＭＳ Ｐゴシック" pitchFamily="34" charset="-128"/>
+              </a:rPr>
+              <a:t> </a:t>
+            </a:r>
+            <a:r>
+              <a:rPr lang="en-US" sz="1600" dirty="0" err="1" smtClean="0">
+                <a:solidFill>
+                  <a:schemeClr val="tx1"/>
+                </a:solidFill>
+                <a:latin typeface="Arial" charset="0"/>
+                <a:ea typeface="ＭＳ Ｐゴシック" pitchFamily="34" charset="-128"/>
+              </a:rPr>
+              <a:t>occurrent</a:t>
             </a:r>
             <a:endParaRPr lang="en-US" sz="1600" dirty="0">
               <a:solidFill>
@@ -6508,21 +6363,19 @@
           <p:cNvPr id="22" name="Straight Arrow Connector 21"/>
           <p:cNvCxnSpPr>
             <a:cxnSpLocks noChangeShapeType="1"/>
-            <a:stCxn id="7" idx="1"/>
-            <a:endCxn id="5" idx="7"/>
           </p:cNvCxnSpPr>
           <p:nvPr/>
         </p:nvCxnSpPr>
         <p:spPr bwMode="auto">
           <a:xfrm rot="16200000" flipV="1">
-            <a:off x="4371856" y="1005981"/>
+            <a:off x="4371856" y="1010602"/>
             <a:ext cx="1588" cy="4530406"/>
           </a:xfrm>
           <a:prstGeom prst="straightConnector1">
             <a:avLst/>
           </a:prstGeom>
           <a:noFill/>
-          <a:ln w="28575">
+          <a:ln w="19050">
             <a:solidFill>
               <a:schemeClr val="tx1"/>
             </a:solidFill>
@@ -6551,7 +6404,7 @@
             <a:avLst/>
           </a:prstGeom>
           <a:noFill/>
-          <a:ln w="28575">
+          <a:ln w="19050">
             <a:solidFill>
               <a:schemeClr val="tx1"/>
             </a:solidFill>
@@ -6580,7 +6433,7 @@
             <a:avLst/>
           </a:prstGeom>
           <a:noFill/>
-          <a:ln w="28575">
+          <a:ln w="19050">
             <a:solidFill>
               <a:schemeClr val="tx1"/>
             </a:solidFill>
@@ -6609,7 +6462,7 @@
             <a:avLst/>
           </a:prstGeom>
           <a:noFill/>
-          <a:ln w="28575">
+          <a:ln w="19050">
             <a:solidFill>
               <a:schemeClr val="tx1"/>
             </a:solidFill>
@@ -6756,7 +6609,7 @@
           <a:prstGeom prst="straightConnector1">
             <a:avLst/>
           </a:prstGeom>
-          <a:ln w="25400">
+          <a:ln w="19050">
             <a:solidFill>
               <a:schemeClr val="tx1"/>
             </a:solidFill>
@@ -6795,7 +6648,7 @@
           <a:prstGeom prst="straightConnector1">
             <a:avLst/>
           </a:prstGeom>
-          <a:ln w="25400">
+          <a:ln w="19050">
             <a:solidFill>
               <a:schemeClr val="tx1"/>
             </a:solidFill>
@@ -6859,9 +6712,48 @@
           </a:p>
         </p:txBody>
       </p:sp>
+      <p:sp>
+        <p:nvSpPr>
+          <p:cNvPr id="243" name="TextBox 19"/>
+          <p:cNvSpPr txBox="1">
+            <a:spLocks noChangeArrowheads="1"/>
+          </p:cNvSpPr>
+          <p:nvPr/>
+        </p:nvSpPr>
+        <p:spPr bwMode="auto">
+          <a:xfrm rot="21076797">
+            <a:off x="2460510" y="5961596"/>
+            <a:ext cx="984250" cy="366713"/>
+          </a:xfrm>
+          <a:prstGeom prst="rect">
+            <a:avLst/>
+          </a:prstGeom>
+          <a:noFill/>
+          <a:ln w="9525">
+            <a:noFill/>
+            <a:miter lim="800000"/>
+            <a:headEnd/>
+            <a:tailEnd/>
+          </a:ln>
+        </p:spPr>
+        <p:txBody>
+          <a:bodyPr wrap="none">
+            <a:spAutoFit/>
+          </a:bodyPr>
+          <a:lstStyle/>
+          <a:p>
+            <a:r>
+              <a:rPr lang="en-US" dirty="0">
+                <a:latin typeface="Century Schoolbook" pitchFamily="18" charset="0"/>
+              </a:rPr>
+              <a:t>is about</a:t>
+            </a:r>
+          </a:p>
+        </p:txBody>
+      </p:sp>
       <p:cxnSp>
         <p:nvCxnSpPr>
-          <p:cNvPr id="237" name="Straight Arrow Connector 236"/>
+          <p:cNvPr id="28" name="Straight Arrow Connector 27"/>
           <p:cNvCxnSpPr>
             <a:stCxn id="6" idx="3"/>
             <a:endCxn id="10" idx="5"/>
@@ -6876,7 +6768,7 @@
           <a:prstGeom prst="straightConnector1">
             <a:avLst/>
           </a:prstGeom>
-          <a:ln w="25400">
+          <a:ln w="19050">
             <a:solidFill>
               <a:schemeClr val="tx1"/>
             </a:solidFill>
@@ -6898,45 +6790,6 @@
           </a:fontRef>
         </p:style>
       </p:cxnSp>
-      <p:sp>
-        <p:nvSpPr>
-          <p:cNvPr id="243" name="TextBox 19"/>
-          <p:cNvSpPr txBox="1">
-            <a:spLocks noChangeArrowheads="1"/>
-          </p:cNvSpPr>
-          <p:nvPr/>
-        </p:nvSpPr>
-        <p:spPr bwMode="auto">
-          <a:xfrm rot="21076797">
-            <a:off x="2460510" y="5961596"/>
-            <a:ext cx="984250" cy="366713"/>
-          </a:xfrm>
-          <a:prstGeom prst="rect">
-            <a:avLst/>
-          </a:prstGeom>
-          <a:noFill/>
-          <a:ln w="9525">
-            <a:noFill/>
-            <a:miter lim="800000"/>
-            <a:headEnd/>
-            <a:tailEnd/>
-          </a:ln>
-        </p:spPr>
-        <p:txBody>
-          <a:bodyPr wrap="none">
-            <a:spAutoFit/>
-          </a:bodyPr>
-          <a:lstStyle/>
-          <a:p>
-            <a:r>
-              <a:rPr lang="en-US" dirty="0">
-                <a:latin typeface="Century Schoolbook" pitchFamily="18" charset="0"/>
-              </a:rPr>
-              <a:t>is about</a:t>
-            </a:r>
-          </a:p>
-        </p:txBody>
-      </p:sp>
     </p:spTree>
   </p:cSld>
   <p:clrMapOvr>
@@ -6953,7 +6806,7 @@
 </file>
 
 <file path=ppt/slides/slide12.xml><?xml version="1.0" encoding="utf-8"?>
-<p:sld xmlns:a="http://schemas.openxmlformats.org/drawingml/2006/main" xmlns:r="http://schemas.openxmlformats.org/officeDocument/2006/relationships" xmlns:mc="http://schemas.openxmlformats.org/markup-compatibility/2006" xmlns:mv="urn:schemas-microsoft-com:mac:vml" xmlns:p="http://schemas.openxmlformats.org/presentationml/2006/main" mc:Ignorable="mv" mc:PreserveAttributes="mv:*">
+<p:sld xmlns:a="http://schemas.openxmlformats.org/drawingml/2006/main" xmlns:r="http://schemas.openxmlformats.org/officeDocument/2006/relationships" xmlns:p="http://schemas.openxmlformats.org/presentationml/2006/main">
   <p:cSld>
     <p:spTree>
       <p:nvGrpSpPr>
@@ -7598,15 +7451,6 @@
             </a:endParaRPr>
           </a:p>
           <a:p>
-            <a:r>
-              <a:rPr lang="en-US" sz="1600" b="1" dirty="0" smtClean="0">
-                <a:solidFill>
-                  <a:srgbClr val="C00000"/>
-                </a:solidFill>
-                <a:latin typeface="Century Schoolbook" pitchFamily="18" charset="0"/>
-              </a:rPr>
-              <a:t> </a:t>
-            </a:r>
             <a:r>
               <a:rPr lang="en-US" sz="1600" b="1" dirty="0">
                 <a:solidFill>
@@ -11051,7 +10895,7 @@
 </file>
 
 <file path=ppt/slides/slide13.xml><?xml version="1.0" encoding="utf-8"?>
-<p:sld xmlns:a="http://schemas.openxmlformats.org/drawingml/2006/main" xmlns:r="http://schemas.openxmlformats.org/officeDocument/2006/relationships" xmlns:mc="http://schemas.openxmlformats.org/markup-compatibility/2006" xmlns:mv="urn:schemas-microsoft-com:mac:vml" xmlns:p="http://schemas.openxmlformats.org/presentationml/2006/main" mc:Ignorable="mv" mc:PreserveAttributes="mv:*">
+<p:sld xmlns:a="http://schemas.openxmlformats.org/drawingml/2006/main" xmlns:r="http://schemas.openxmlformats.org/officeDocument/2006/relationships" xmlns:p="http://schemas.openxmlformats.org/presentationml/2006/main">
   <p:cSld>
     <p:spTree>
       <p:nvGrpSpPr>
@@ -11108,8 +10952,8 @@
         </p:nvSpPr>
         <p:spPr>
           <a:xfrm>
-            <a:off x="457200" y="5867400"/>
-            <a:ext cx="7467600" cy="838200"/>
+            <a:off x="152400" y="5867400"/>
+            <a:ext cx="8229600" cy="838200"/>
           </a:xfrm>
         </p:spPr>
         <p:txBody>
@@ -11117,19 +10961,37 @@
           <a:lstStyle/>
           <a:p>
             <a:r>
-              <a:rPr lang="en-US" dirty="0" smtClean="0">
+              <a:rPr lang="en-US" sz="2000" dirty="0" smtClean="0">
                 <a:latin typeface="Century Schoolbook" pitchFamily="18" charset="0"/>
-              </a:rPr>
-              <a:t>Support multiple sequences submission to </a:t>
-            </a:r>
-            <a:r>
-              <a:rPr lang="en-US" dirty="0" err="1" smtClean="0">
+                <a:hlinkClick r:id="rId4" action="ppaction://hlinkfile"/>
+              </a:rPr>
+              <a:t>Isolate submission form</a:t>
+            </a:r>
+            <a:endParaRPr lang="en-US" sz="2000" dirty="0" smtClean="0">
+              <a:latin typeface="Century Schoolbook" pitchFamily="18" charset="0"/>
+            </a:endParaRPr>
+          </a:p>
+          <a:p>
+            <a:r>
+              <a:rPr lang="en-US" sz="2000" dirty="0" smtClean="0">
                 <a:latin typeface="Century Schoolbook" pitchFamily="18" charset="0"/>
               </a:rPr>
+              <a:t>Support </a:t>
+            </a:r>
+            <a:r>
+              <a:rPr lang="en-US" sz="2000" dirty="0" smtClean="0">
+                <a:latin typeface="Century Schoolbook" pitchFamily="18" charset="0"/>
+              </a:rPr>
+              <a:t>multiple sequences submission to </a:t>
+            </a:r>
+            <a:r>
+              <a:rPr lang="en-US" sz="2000" dirty="0" err="1" smtClean="0">
+                <a:latin typeface="Century Schoolbook" pitchFamily="18" charset="0"/>
+              </a:rPr>
               <a:t>GenBank</a:t>
             </a:r>
             <a:r>
-              <a:rPr lang="en-US" dirty="0" smtClean="0">
+              <a:rPr lang="en-US" sz="2000" dirty="0" smtClean="0">
                 <a:latin typeface="Century Schoolbook" pitchFamily="18" charset="0"/>
               </a:rPr>
               <a:t> with a parser</a:t>
@@ -11207,7 +11069,7 @@
         </p:xfrm>
         <a:graphic>
           <a:graphicData uri="http://schemas.openxmlformats.org/presentationml/2006/ole">
-            <p:oleObj spid="_x0000_s109568" name="Worksheet" r:id="rId4" imgW="15265400" imgH="7645400" progId="Excel.Sheet.12">
+            <p:oleObj spid="_x0000_s109568" name="Worksheet" r:id="rId5" imgW="15267512" imgH="7652138" progId="Excel.Sheet.12">
               <p:embed/>
             </p:oleObj>
           </a:graphicData>
@@ -11229,7 +11091,7 @@
 </file>
 
 <file path=ppt/slides/slide14.xml><?xml version="1.0" encoding="utf-8"?>
-<p:sld xmlns:a="http://schemas.openxmlformats.org/drawingml/2006/main" xmlns:r="http://schemas.openxmlformats.org/officeDocument/2006/relationships" xmlns:mc="http://schemas.openxmlformats.org/markup-compatibility/2006" xmlns:mv="urn:schemas-microsoft-com:mac:vml" xmlns:p="http://schemas.openxmlformats.org/presentationml/2006/main" mc:Ignorable="mv" mc:PreserveAttributes="mv:*">
+<p:sld xmlns:a="http://schemas.openxmlformats.org/drawingml/2006/main" xmlns:r="http://schemas.openxmlformats.org/officeDocument/2006/relationships" xmlns:p="http://schemas.openxmlformats.org/presentationml/2006/main">
   <p:cSld>
     <p:spTree>
       <p:nvGrpSpPr>
@@ -11365,7 +11227,7 @@
 </file>
 
 <file path=ppt/slides/slide15.xml><?xml version="1.0" encoding="utf-8"?>
-<p:sld xmlns:a="http://schemas.openxmlformats.org/drawingml/2006/main" xmlns:r="http://schemas.openxmlformats.org/officeDocument/2006/relationships" xmlns:mc="http://schemas.openxmlformats.org/markup-compatibility/2006" xmlns:mv="urn:schemas-microsoft-com:mac:vml" xmlns:p="http://schemas.openxmlformats.org/presentationml/2006/main" mc:Ignorable="mv" mc:PreserveAttributes="mv:*">
+<p:sld xmlns:a="http://schemas.openxmlformats.org/drawingml/2006/main" xmlns:r="http://schemas.openxmlformats.org/officeDocument/2006/relationships" xmlns:p="http://schemas.openxmlformats.org/presentationml/2006/main">
   <p:cSld>
     <p:spTree>
       <p:nvGrpSpPr>
@@ -11479,7 +11341,7 @@
         </p:xfrm>
         <a:graphic>
           <a:graphicData uri="http://schemas.openxmlformats.org/presentationml/2006/ole">
-            <p:oleObj spid="_x0000_s110592" name="Worksheet" r:id="rId4" imgW="10795000" imgH="5842000" progId="Excel.Sheet.8">
+            <p:oleObj spid="_x0000_s110592" name="Worksheet" r:id="rId4" imgW="10743840" imgH="5816160" progId="Excel.Sheet.8">
               <p:embed/>
             </p:oleObj>
           </a:graphicData>
@@ -11501,7 +11363,7 @@
 </file>
 
 <file path=ppt/slides/slide16.xml><?xml version="1.0" encoding="utf-8"?>
-<p:sld xmlns:a="http://schemas.openxmlformats.org/drawingml/2006/main" xmlns:r="http://schemas.openxmlformats.org/officeDocument/2006/relationships" xmlns:mc="http://schemas.openxmlformats.org/markup-compatibility/2006" xmlns:mv="urn:schemas-microsoft-com:mac:vml" xmlns:p="http://schemas.openxmlformats.org/presentationml/2006/main" mc:Ignorable="mv" mc:PreserveAttributes="mv:*">
+<p:sld xmlns:a="http://schemas.openxmlformats.org/drawingml/2006/main" xmlns:r="http://schemas.openxmlformats.org/officeDocument/2006/relationships" xmlns:p="http://schemas.openxmlformats.org/presentationml/2006/main">
   <p:cSld>
     <p:spTree>
       <p:nvGrpSpPr>
@@ -11642,7 +11504,7 @@
 </file>
 
 <file path=ppt/slides/slide17.xml><?xml version="1.0" encoding="utf-8"?>
-<p:sld xmlns:a="http://schemas.openxmlformats.org/drawingml/2006/main" xmlns:r="http://schemas.openxmlformats.org/officeDocument/2006/relationships" xmlns:mc="http://schemas.openxmlformats.org/markup-compatibility/2006" xmlns:mv="urn:schemas-microsoft-com:mac:vml" xmlns:p="http://schemas.openxmlformats.org/presentationml/2006/main" mc:Ignorable="mv" mc:PreserveAttributes="mv:*">
+<p:sld xmlns:a="http://schemas.openxmlformats.org/drawingml/2006/main" xmlns:r="http://schemas.openxmlformats.org/officeDocument/2006/relationships" xmlns:p="http://schemas.openxmlformats.org/presentationml/2006/main">
   <p:cSld>
     <p:spTree>
       <p:nvGrpSpPr>
@@ -11894,7 +11756,7 @@
 </file>
 
 <file path=ppt/slides/slide18.xml><?xml version="1.0" encoding="utf-8"?>
-<p:sld xmlns:a="http://schemas.openxmlformats.org/drawingml/2006/main" xmlns:r="http://schemas.openxmlformats.org/officeDocument/2006/relationships" xmlns:mc="http://schemas.openxmlformats.org/markup-compatibility/2006" xmlns:mv="urn:schemas-microsoft-com:mac:vml" xmlns:p="http://schemas.openxmlformats.org/presentationml/2006/main" mc:Ignorable="mv" mc:PreserveAttributes="mv:*">
+<p:sld xmlns:a="http://schemas.openxmlformats.org/drawingml/2006/main" xmlns:r="http://schemas.openxmlformats.org/officeDocument/2006/relationships" xmlns:p="http://schemas.openxmlformats.org/presentationml/2006/main">
   <p:cSld>
     <p:spTree>
       <p:nvGrpSpPr>
@@ -11910,6 +11772,32 @@
           <a:chExt cx="0" cy="0"/>
         </a:xfrm>
       </p:grpSpPr>
+      <p:pic>
+        <p:nvPicPr>
+          <p:cNvPr id="12" name="Picture 12" descr="http://wiki.knoesis.org/images/0/0a/Trypanosoma_cruzi.gif"/>
+          <p:cNvPicPr>
+            <a:picLocks noChangeAspect="1" noChangeArrowheads="1"/>
+          </p:cNvPicPr>
+          <p:nvPr/>
+        </p:nvPicPr>
+        <p:blipFill>
+          <a:blip r:embed="rId3"/>
+          <a:srcRect/>
+          <a:stretch>
+            <a:fillRect/>
+          </a:stretch>
+        </p:blipFill>
+        <p:spPr bwMode="auto">
+          <a:xfrm>
+            <a:off x="4419600" y="2559050"/>
+            <a:ext cx="4343400" cy="3308350"/>
+          </a:xfrm>
+          <a:prstGeom prst="rect">
+            <a:avLst/>
+          </a:prstGeom>
+          <a:noFill/>
+        </p:spPr>
+      </p:pic>
       <p:sp>
         <p:nvSpPr>
           <p:cNvPr id="2" name="Title 1"/>
@@ -11952,19 +11840,7 @@
           <a:p>
             <a:r>
               <a:rPr lang="en-US" sz="1800" dirty="0" smtClean="0"/>
-              <a:t>Complexity</a:t>
-            </a:r>
-            <a:r>
-              <a:rPr lang="en-US" sz="1800" dirty="0" smtClean="0"/>
-              <a:t> – parasites </a:t>
-            </a:r>
-            <a:r>
-              <a:rPr lang="en-US" sz="1800" dirty="0" smtClean="0"/>
-              <a:t>may have multiple hosts and lifecycle stages which differ between</a:t>
-            </a:r>
-            <a:r>
-              <a:rPr lang="en-US" sz="1800" dirty="0" smtClean="0"/>
-              <a:t> parasite species</a:t>
+              <a:t>Complexity – parasites may have multiple hosts and lifecycle stages which differ between parasite species</a:t>
             </a:r>
           </a:p>
           <a:p>
@@ -11974,6 +11850,14 @@
             </a:r>
             <a:r>
               <a:rPr lang="en-US" sz="1800" i="1" dirty="0" err="1" smtClean="0"/>
+              <a:t>Trypanosomabrucei</a:t>
+            </a:r>
+            <a:r>
+              <a:rPr lang="en-US" sz="1800" dirty="0" smtClean="0"/>
+              <a:t>(causes African sleeping sickness), </a:t>
+            </a:r>
+            <a:r>
+              <a:rPr lang="en-US" sz="1800" i="1" dirty="0" err="1" smtClean="0"/>
               <a:t>Trypanosoma</a:t>
             </a:r>
             <a:r>
@@ -11982,23 +11866,19 @@
             </a:r>
             <a:r>
               <a:rPr lang="en-US" sz="1800" i="1" dirty="0" err="1" smtClean="0"/>
-              <a:t>brucei</a:t>
-            </a:r>
-            <a:r>
-              <a:rPr lang="en-US" sz="1800" i="1" dirty="0" smtClean="0"/>
-              <a:t> </a:t>
+              <a:t>cruzi</a:t>
             </a:r>
             <a:r>
               <a:rPr lang="en-US" sz="1800" dirty="0" smtClean="0"/>
-              <a:t>(</a:t>
+              <a:t> (causes </a:t>
+            </a:r>
+            <a:r>
+              <a:rPr lang="en-US" sz="1800" dirty="0" err="1" smtClean="0"/>
+              <a:t>Chagas</a:t>
             </a:r>
             <a:r>
               <a:rPr lang="en-US" sz="1800" dirty="0" smtClean="0"/>
-              <a:t>causes </a:t>
-            </a:r>
-            <a:r>
-              <a:rPr lang="en-US" sz="1800" dirty="0" smtClean="0"/>
-              <a:t>African sleeping sickness)</a:t>
+              <a:t> disease) </a:t>
             </a:r>
           </a:p>
           <a:p>
@@ -12043,8 +11923,8 @@
         </p:nvGrpSpPr>
         <p:grpSpPr>
           <a:xfrm>
-            <a:off x="1066800" y="2333625"/>
-            <a:ext cx="5715000" cy="4143375"/>
+            <a:off x="152400" y="2635250"/>
+            <a:ext cx="4038600" cy="3124200"/>
             <a:chOff x="1066800" y="2181225"/>
             <a:chExt cx="5715000" cy="4143375"/>
           </a:xfrm>
@@ -12058,7 +11938,7 @@
             <p:nvPr/>
           </p:nvPicPr>
           <p:blipFill>
-            <a:blip r:embed="rId3"/>
+            <a:blip r:embed="rId4"/>
             <a:srcRect/>
             <a:stretch>
               <a:fillRect/>
@@ -12258,16 +12138,108 @@
           </p:style>
         </p:cxnSp>
       </p:grpSp>
+      <p:sp>
+        <p:nvSpPr>
+          <p:cNvPr id="13" name="TextBox 24"/>
+          <p:cNvSpPr txBox="1">
+            <a:spLocks noChangeArrowheads="1"/>
+          </p:cNvSpPr>
+          <p:nvPr/>
+        </p:nvSpPr>
+        <p:spPr bwMode="auto">
+          <a:xfrm>
+            <a:off x="920750" y="6034088"/>
+            <a:ext cx="2432050" cy="366712"/>
+          </a:xfrm>
+          <a:prstGeom prst="rect">
+            <a:avLst/>
+          </a:prstGeom>
+          <a:noFill/>
+          <a:ln w="9525">
+            <a:noFill/>
+            <a:miter lim="800000"/>
+            <a:headEnd/>
+            <a:tailEnd/>
+          </a:ln>
+        </p:spPr>
+        <p:txBody>
+          <a:bodyPr wrap="none">
+            <a:spAutoFit/>
+          </a:bodyPr>
+          <a:lstStyle/>
+          <a:p>
+            <a:pPr algn="ctr"/>
+            <a:r>
+              <a:rPr lang="en-US" b="1" i="1" dirty="0" err="1"/>
+              <a:t>Trypanosoma</a:t>
+            </a:r>
+            <a:r>
+              <a:rPr lang="en-US" b="1" i="1" dirty="0"/>
+              <a:t> </a:t>
+            </a:r>
+            <a:r>
+              <a:rPr lang="en-US" b="1" i="1" dirty="0" err="1"/>
+              <a:t>brucei</a:t>
+            </a:r>
+            <a:endParaRPr lang="en-US" b="1" i="1" dirty="0"/>
+          </a:p>
+        </p:txBody>
+      </p:sp>
+      <p:sp>
+        <p:nvSpPr>
+          <p:cNvPr id="15" name="TextBox 24"/>
+          <p:cNvSpPr txBox="1">
+            <a:spLocks noChangeArrowheads="1"/>
+          </p:cNvSpPr>
+          <p:nvPr/>
+        </p:nvSpPr>
+        <p:spPr bwMode="auto">
+          <a:xfrm>
+            <a:off x="5257800" y="6034088"/>
+            <a:ext cx="2279650" cy="366712"/>
+          </a:xfrm>
+          <a:prstGeom prst="rect">
+            <a:avLst/>
+          </a:prstGeom>
+          <a:noFill/>
+          <a:ln w="9525">
+            <a:noFill/>
+            <a:miter lim="800000"/>
+            <a:headEnd/>
+            <a:tailEnd/>
+          </a:ln>
+        </p:spPr>
+        <p:txBody>
+          <a:bodyPr wrap="none">
+            <a:spAutoFit/>
+          </a:bodyPr>
+          <a:lstStyle/>
+          <a:p>
+            <a:pPr algn="ctr"/>
+            <a:r>
+              <a:rPr lang="en-US" b="1" i="1"/>
+              <a:t>Trypanosoma cruzi</a:t>
+            </a:r>
+          </a:p>
+        </p:txBody>
+      </p:sp>
     </p:spTree>
   </p:cSld>
   <p:clrMapOvr>
     <a:masterClrMapping/>
   </p:clrMapOvr>
+  <p:timing>
+    <p:tnLst>
+      <p:par>
+        <p:cTn id="1" dur="indefinite" restart="never" nodeType="tmRoot"/>
+      </p:par>
+    </p:tnLst>
+  </p:timing>
 </p:sld>
 </file>
 
 <file path=ppt/slides/slide19.xml><?xml version="1.0" encoding="utf-8"?>
-<p:sld xmlns:a="http://schemas.openxmlformats.org/drawingml/2006/main" xmlns:r="http://schemas.openxmlformats.org/officeDocument/2006/relationships" xmlns:mc="http://schemas.openxmlformats.org/markup-compatibility/2006" xmlns:mv="urn:schemas-microsoft-com:mac:vml" xmlns:p="http://schemas.openxmlformats.org/presentationml/2006/main" mc:Ignorable="mv" mc:PreserveAttributes="mv:*">
+<p:sld xmlns:a="http://schemas.openxmlformats.org/drawingml/2006/main" xmlns:r="http://schemas.openxmlformats.org/officeDocument/2006/relationships" xmlns:p="http://schemas.openxmlformats.org/presentationml/2006/main">
   <p:cSld>
     <p:spTree>
       <p:nvGrpSpPr>
@@ -12314,15 +12286,7 @@
             </a:r>
             <a:r>
               <a:rPr lang="en-US" sz="2000" b="0" dirty="0" err="1" smtClean="0"/>
-              <a:t>Jie</a:t>
-            </a:r>
-            <a:r>
-              <a:rPr lang="en-US" sz="2000" b="0" dirty="0" smtClean="0"/>
-              <a:t> </a:t>
-            </a:r>
-            <a:r>
-              <a:rPr lang="en-US" sz="2000" b="0" dirty="0" err="1" smtClean="0"/>
-              <a:t>Zheng</a:t>
+              <a:t>JieZheng</a:t>
             </a:r>
             <a:r>
               <a:rPr lang="en-US" sz="2000" b="0" dirty="0" smtClean="0"/>
@@ -12346,15 +12310,7 @@
             </a:r>
             <a:r>
               <a:rPr lang="en-US" sz="2000" b="0" dirty="0" err="1" smtClean="0"/>
-              <a:t>Amit</a:t>
-            </a:r>
-            <a:r>
-              <a:rPr lang="en-US" sz="2000" b="0" dirty="0" smtClean="0"/>
-              <a:t> </a:t>
-            </a:r>
-            <a:r>
-              <a:rPr lang="en-US" sz="2000" b="0" dirty="0" err="1" smtClean="0"/>
-              <a:t>Sheth</a:t>
+              <a:t>AmitSheth</a:t>
             </a:r>
             <a:r>
               <a:rPr lang="en-US" sz="2000" b="0" dirty="0" smtClean="0"/>
@@ -12426,7 +12382,7 @@
       </p:sp>
       <p:pic>
         <p:nvPicPr>
-          <p:cNvPr id="115714" name="Picture 2"/>
+          <p:cNvPr id="136195" name="Picture 3"/>
           <p:cNvPicPr>
             <a:picLocks noChangeAspect="1" noChangeArrowheads="1"/>
           </p:cNvPicPr>
@@ -12441,8 +12397,8 @@
         </p:blipFill>
         <p:spPr bwMode="auto">
           <a:xfrm>
-            <a:off x="457200" y="1066800"/>
-            <a:ext cx="7513637" cy="5534025"/>
+            <a:off x="457200" y="1143000"/>
+            <a:ext cx="7991475" cy="5514975"/>
           </a:xfrm>
           <a:prstGeom prst="rect">
             <a:avLst/>
@@ -12473,7 +12429,7 @@
 </file>
 
 <file path=ppt/slides/slide2.xml><?xml version="1.0" encoding="utf-8"?>
-<p:sld xmlns:a="http://schemas.openxmlformats.org/drawingml/2006/main" xmlns:r="http://schemas.openxmlformats.org/officeDocument/2006/relationships" xmlns:mc="http://schemas.openxmlformats.org/markup-compatibility/2006" xmlns:mv="urn:schemas-microsoft-com:mac:vml" xmlns:p="http://schemas.openxmlformats.org/presentationml/2006/main" mc:Ignorable="mv" mc:PreserveAttributes="mv:*">
+<p:sld xmlns:a="http://schemas.openxmlformats.org/drawingml/2006/main" xmlns:r="http://schemas.openxmlformats.org/officeDocument/2006/relationships" xmlns:p="http://schemas.openxmlformats.org/presentationml/2006/main">
   <p:cSld>
     <p:spTree>
       <p:nvGrpSpPr>
@@ -12506,11 +12462,7 @@
           <a:p>
             <a:r>
               <a:rPr lang="en-US" dirty="0" smtClean="0"/>
-              <a:t>Issues Associated with Data </a:t>
-            </a:r>
-            <a:r>
-              <a:rPr lang="en-US" dirty="0" smtClean="0"/>
-              <a:t>Collection</a:t>
+              <a:t>Issues Associated with Data Collection</a:t>
             </a:r>
             <a:endParaRPr lang="en-US" dirty="0"/>
           </a:p>
@@ -12598,7 +12550,7 @@
 </file>
 
 <file path=ppt/slides/slide20.xml><?xml version="1.0" encoding="utf-8"?>
-<p:sld xmlns:a="http://schemas.openxmlformats.org/drawingml/2006/main" xmlns:r="http://schemas.openxmlformats.org/officeDocument/2006/relationships" xmlns:mc="http://schemas.openxmlformats.org/markup-compatibility/2006" xmlns:mv="urn:schemas-microsoft-com:mac:vml" xmlns:p="http://schemas.openxmlformats.org/presentationml/2006/main" mc:Ignorable="mv" mc:PreserveAttributes="mv:*">
+<p:sld xmlns:a="http://schemas.openxmlformats.org/drawingml/2006/main" xmlns:r="http://schemas.openxmlformats.org/officeDocument/2006/relationships" xmlns:p="http://schemas.openxmlformats.org/presentationml/2006/main">
   <p:cSld>
     <p:spTree>
       <p:nvGrpSpPr>
@@ -12654,7 +12606,11 @@
           <a:p>
             <a:r>
               <a:rPr lang="en-US" dirty="0" smtClean="0"/>
-              <a:t>Over 100 terms -&gt; 5 terms</a:t>
+              <a:t>Over 100 terms -&gt; </a:t>
+            </a:r>
+            <a:r>
+              <a:rPr lang="en-US" dirty="0" smtClean="0"/>
+              <a:t>less than 10 terms</a:t>
             </a:r>
             <a:endParaRPr lang="en-US" dirty="0"/>
           </a:p>
@@ -12691,7 +12647,7 @@
       </p:sp>
       <p:pic>
         <p:nvPicPr>
-          <p:cNvPr id="116738" name="Picture 2"/>
+          <p:cNvPr id="136194" name="Picture 2"/>
           <p:cNvPicPr>
             <a:picLocks noChangeAspect="1" noChangeArrowheads="1"/>
           </p:cNvPicPr>
@@ -12706,8 +12662,8 @@
         </p:blipFill>
         <p:spPr bwMode="auto">
           <a:xfrm>
-            <a:off x="1447800" y="1676400"/>
-            <a:ext cx="5290786" cy="4343400"/>
+            <a:off x="152400" y="2514600"/>
+            <a:ext cx="4283242" cy="3657600"/>
           </a:xfrm>
           <a:prstGeom prst="rect">
             <a:avLst/>
@@ -12722,6 +12678,124 @@
           <a:effectLst/>
         </p:spPr>
       </p:pic>
+      <p:pic>
+        <p:nvPicPr>
+          <p:cNvPr id="136195" name="Picture 3"/>
+          <p:cNvPicPr>
+            <a:picLocks noChangeAspect="1" noChangeArrowheads="1"/>
+          </p:cNvPicPr>
+          <p:nvPr/>
+        </p:nvPicPr>
+        <p:blipFill>
+          <a:blip r:embed="rId3"/>
+          <a:srcRect/>
+          <a:stretch>
+            <a:fillRect/>
+          </a:stretch>
+        </p:blipFill>
+        <p:spPr bwMode="auto">
+          <a:xfrm>
+            <a:off x="4495800" y="2514600"/>
+            <a:ext cx="4150206" cy="3657600"/>
+          </a:xfrm>
+          <a:prstGeom prst="rect">
+            <a:avLst/>
+          </a:prstGeom>
+          <a:noFill/>
+          <a:ln w="9525">
+            <a:noFill/>
+            <a:miter lim="800000"/>
+            <a:headEnd/>
+            <a:tailEnd/>
+          </a:ln>
+          <a:effectLst/>
+        </p:spPr>
+      </p:pic>
+      <p:sp>
+        <p:nvSpPr>
+          <p:cNvPr id="8" name="TextBox 24"/>
+          <p:cNvSpPr txBox="1">
+            <a:spLocks noChangeArrowheads="1"/>
+          </p:cNvSpPr>
+          <p:nvPr/>
+        </p:nvSpPr>
+        <p:spPr bwMode="auto">
+          <a:xfrm>
+            <a:off x="990600" y="1905000"/>
+            <a:ext cx="2432050" cy="366712"/>
+          </a:xfrm>
+          <a:prstGeom prst="rect">
+            <a:avLst/>
+          </a:prstGeom>
+          <a:noFill/>
+          <a:ln w="9525">
+            <a:noFill/>
+            <a:miter lim="800000"/>
+            <a:headEnd/>
+            <a:tailEnd/>
+          </a:ln>
+        </p:spPr>
+        <p:txBody>
+          <a:bodyPr wrap="none">
+            <a:spAutoFit/>
+          </a:bodyPr>
+          <a:lstStyle/>
+          <a:p>
+            <a:pPr algn="ctr"/>
+            <a:r>
+              <a:rPr lang="en-US" b="1" i="1" dirty="0" err="1"/>
+              <a:t>Trypanosoma</a:t>
+            </a:r>
+            <a:r>
+              <a:rPr lang="en-US" b="1" i="1" dirty="0"/>
+              <a:t> </a:t>
+            </a:r>
+            <a:r>
+              <a:rPr lang="en-US" b="1" i="1" dirty="0" err="1"/>
+              <a:t>brucei</a:t>
+            </a:r>
+            <a:endParaRPr lang="en-US" b="1" i="1" dirty="0"/>
+          </a:p>
+        </p:txBody>
+      </p:sp>
+      <p:sp>
+        <p:nvSpPr>
+          <p:cNvPr id="9" name="TextBox 24"/>
+          <p:cNvSpPr txBox="1">
+            <a:spLocks noChangeArrowheads="1"/>
+          </p:cNvSpPr>
+          <p:nvPr/>
+        </p:nvSpPr>
+        <p:spPr bwMode="auto">
+          <a:xfrm>
+            <a:off x="5327650" y="1905000"/>
+            <a:ext cx="2279650" cy="366712"/>
+          </a:xfrm>
+          <a:prstGeom prst="rect">
+            <a:avLst/>
+          </a:prstGeom>
+          <a:noFill/>
+          <a:ln w="9525">
+            <a:noFill/>
+            <a:miter lim="800000"/>
+            <a:headEnd/>
+            <a:tailEnd/>
+          </a:ln>
+        </p:spPr>
+        <p:txBody>
+          <a:bodyPr wrap="none">
+            <a:spAutoFit/>
+          </a:bodyPr>
+          <a:lstStyle/>
+          <a:p>
+            <a:pPr algn="ctr"/>
+            <a:r>
+              <a:rPr lang="en-US" b="1" i="1"/>
+              <a:t>Trypanosoma cruzi</a:t>
+            </a:r>
+          </a:p>
+        </p:txBody>
+      </p:sp>
     </p:spTree>
   </p:cSld>
   <p:clrMapOvr>
@@ -12738,7 +12812,7 @@
 </file>
 
 <file path=ppt/slides/slide21.xml><?xml version="1.0" encoding="utf-8"?>
-<p:sld xmlns:a="http://schemas.openxmlformats.org/drawingml/2006/main" xmlns:r="http://schemas.openxmlformats.org/officeDocument/2006/relationships" xmlns:mc="http://schemas.openxmlformats.org/markup-compatibility/2006" xmlns:mv="urn:schemas-microsoft-com:mac:vml" xmlns:p="http://schemas.openxmlformats.org/presentationml/2006/main" mc:Ignorable="mv" mc:PreserveAttributes="mv:*">
+<p:sld xmlns:a="http://schemas.openxmlformats.org/drawingml/2006/main" xmlns:r="http://schemas.openxmlformats.org/officeDocument/2006/relationships" xmlns:p="http://schemas.openxmlformats.org/presentationml/2006/main">
   <p:cSld>
     <p:spTree>
       <p:nvGrpSpPr>
@@ -12904,7 +12978,7 @@
 </file>
 
 <file path=ppt/slides/slide22.xml><?xml version="1.0" encoding="utf-8"?>
-<p:sld xmlns:a="http://schemas.openxmlformats.org/drawingml/2006/main" xmlns:r="http://schemas.openxmlformats.org/officeDocument/2006/relationships" xmlns:mc="http://schemas.openxmlformats.org/markup-compatibility/2006" xmlns:mv="urn:schemas-microsoft-com:mac:vml" xmlns:p="http://schemas.openxmlformats.org/presentationml/2006/main" mc:Ignorable="mv" mc:PreserveAttributes="mv:*">
+<p:sld xmlns:a="http://schemas.openxmlformats.org/drawingml/2006/main" xmlns:r="http://schemas.openxmlformats.org/officeDocument/2006/relationships" xmlns:p="http://schemas.openxmlformats.org/presentationml/2006/main">
   <p:cSld>
     <p:spTree>
       <p:nvGrpSpPr>
@@ -12977,7 +13051,7 @@
 </file>
 
 <file path=ppt/slides/slide3.xml><?xml version="1.0" encoding="utf-8"?>
-<p:sld xmlns:a="http://schemas.openxmlformats.org/drawingml/2006/main" xmlns:r="http://schemas.openxmlformats.org/officeDocument/2006/relationships" xmlns:mc="http://schemas.openxmlformats.org/markup-compatibility/2006" xmlns:mv="urn:schemas-microsoft-com:mac:vml" xmlns:p="http://schemas.openxmlformats.org/presentationml/2006/main" mc:Ignorable="mv" mc:PreserveAttributes="mv:*">
+<p:sld xmlns:a="http://schemas.openxmlformats.org/drawingml/2006/main" xmlns:r="http://schemas.openxmlformats.org/officeDocument/2006/relationships" xmlns:p="http://schemas.openxmlformats.org/presentationml/2006/main">
   <p:cSld>
     <p:spTree>
       <p:nvGrpSpPr>
@@ -13063,7 +13137,7 @@
         </p:xfrm>
         <a:graphic>
           <a:graphicData uri="http://schemas.openxmlformats.org/presentationml/2006/ole">
-            <p:oleObj spid="_x0000_s114690" name="Worksheet" r:id="rId3" imgW="10375900" imgH="6781800" progId="Excel.Sheet.12">
+            <p:oleObj spid="_x0000_s114690" name="Worksheet" r:id="rId3" imgW="10399084" imgH="6787210" progId="Excel.Sheet.12">
               <p:embed/>
             </p:oleObj>
           </a:graphicData>
@@ -13083,7 +13157,7 @@
         </p:xfrm>
         <a:graphic>
           <a:graphicData uri="http://schemas.openxmlformats.org/presentationml/2006/ole">
-            <p:oleObj spid="_x0000_s114691" name="Worksheet" r:id="rId4" imgW="10566400" imgH="7670800" progId="Excel.Sheet.12">
+            <p:oleObj spid="_x0000_s114691" name="Worksheet" r:id="rId4" imgW="9782223" imgH="7096220" progId="Excel.Sheet.12">
               <p:embed/>
             </p:oleObj>
           </a:graphicData>
@@ -13468,7 +13542,7 @@
 </file>
 
 <file path=ppt/slides/slide4.xml><?xml version="1.0" encoding="utf-8"?>
-<p:sld xmlns:a="http://schemas.openxmlformats.org/drawingml/2006/main" xmlns:r="http://schemas.openxmlformats.org/officeDocument/2006/relationships" xmlns:mc="http://schemas.openxmlformats.org/markup-compatibility/2006" xmlns:mv="urn:schemas-microsoft-com:mac:vml" xmlns:p="http://schemas.openxmlformats.org/presentationml/2006/main" mc:Ignorable="mv" mc:PreserveAttributes="mv:*">
+<p:sld xmlns:a="http://schemas.openxmlformats.org/drawingml/2006/main" xmlns:r="http://schemas.openxmlformats.org/officeDocument/2006/relationships" xmlns:p="http://schemas.openxmlformats.org/presentationml/2006/main">
   <p:cSld>
     <p:spTree>
       <p:nvGrpSpPr>
@@ -13656,7 +13730,7 @@
 </file>
 
 <file path=ppt/slides/slide5.xml><?xml version="1.0" encoding="utf-8"?>
-<p:sld xmlns:a="http://schemas.openxmlformats.org/drawingml/2006/main" xmlns:r="http://schemas.openxmlformats.org/officeDocument/2006/relationships" xmlns:mc="http://schemas.openxmlformats.org/markup-compatibility/2006" xmlns:mv="urn:schemas-microsoft-com:mac:vml" xmlns:p="http://schemas.openxmlformats.org/presentationml/2006/main" mc:Ignorable="mv" mc:PreserveAttributes="mv:*">
+<p:sld xmlns:a="http://schemas.openxmlformats.org/drawingml/2006/main" xmlns:r="http://schemas.openxmlformats.org/officeDocument/2006/relationships" xmlns:p="http://schemas.openxmlformats.org/presentationml/2006/main">
   <p:cSld>
     <p:spTree>
       <p:nvGrpSpPr>
@@ -13908,7 +13982,7 @@
 </file>
 
 <file path=ppt/slides/slide6.xml><?xml version="1.0" encoding="utf-8"?>
-<p:sld xmlns:a="http://schemas.openxmlformats.org/drawingml/2006/main" xmlns:r="http://schemas.openxmlformats.org/officeDocument/2006/relationships" xmlns:mc="http://schemas.openxmlformats.org/markup-compatibility/2006" xmlns:mv="urn:schemas-microsoft-com:mac:vml" xmlns:p="http://schemas.openxmlformats.org/presentationml/2006/main" mc:Ignorable="mv" mc:PreserveAttributes="mv:*">
+<p:sld xmlns:a="http://schemas.openxmlformats.org/drawingml/2006/main" xmlns:r="http://schemas.openxmlformats.org/officeDocument/2006/relationships" xmlns:p="http://schemas.openxmlformats.org/presentationml/2006/main">
   <p:cSld>
     <p:spTree>
       <p:nvGrpSpPr>
@@ -14190,7 +14264,7 @@
 </file>
 
 <file path=ppt/slides/slide7.xml><?xml version="1.0" encoding="utf-8"?>
-<p:sld xmlns:a="http://schemas.openxmlformats.org/drawingml/2006/main" xmlns:r="http://schemas.openxmlformats.org/officeDocument/2006/relationships" xmlns:mc="http://schemas.openxmlformats.org/markup-compatibility/2006" xmlns:mv="urn:schemas-microsoft-com:mac:vml" xmlns:p="http://schemas.openxmlformats.org/presentationml/2006/main" mc:Ignorable="mv" mc:PreserveAttributes="mv:*">
+<p:sld xmlns:a="http://schemas.openxmlformats.org/drawingml/2006/main" xmlns:r="http://schemas.openxmlformats.org/officeDocument/2006/relationships" xmlns:p="http://schemas.openxmlformats.org/presentationml/2006/main">
   <p:cSld>
     <p:spTree>
       <p:nvGrpSpPr>
@@ -14246,101 +14320,13 @@
           <a:p>
             <a:r>
               <a:rPr lang="en-US" dirty="0" smtClean="0"/>
-              <a:t>Isolate:</a:t>
-            </a:r>
+              <a:t>Isolate: microorganisms (parasites) isolated froman environmental source (e.g.pool) or host material (e.g. human blood)</a:t>
+            </a:r>
+          </a:p>
+          <a:p>
             <a:r>
               <a:rPr lang="en-US" dirty="0" smtClean="0"/>
-              <a:t> microorganisms </a:t>
-            </a:r>
-            <a:r>
-              <a:rPr lang="en-US" dirty="0" smtClean="0"/>
-              <a:t>(</a:t>
-            </a:r>
-            <a:r>
-              <a:rPr lang="en-US" dirty="0" smtClean="0"/>
-              <a:t>parasites) </a:t>
-            </a:r>
-            <a:r>
-              <a:rPr lang="en-US" dirty="0" smtClean="0"/>
-              <a:t>isolated from</a:t>
-            </a:r>
-            <a:r>
-              <a:rPr lang="en-US" dirty="0" smtClean="0"/>
-              <a:t> </a:t>
-            </a:r>
-            <a:r>
-              <a:rPr lang="en-US" dirty="0" smtClean="0"/>
-              <a:t>an</a:t>
-            </a:r>
-            <a:r>
-              <a:rPr lang="en-US" dirty="0" smtClean="0"/>
-              <a:t> environmental source (e.g</a:t>
-            </a:r>
-            <a:r>
-              <a:rPr lang="en-US" dirty="0" smtClean="0"/>
-              <a:t>.</a:t>
-            </a:r>
-            <a:r>
-              <a:rPr lang="en-US" dirty="0" smtClean="0"/>
-              <a:t> </a:t>
-            </a:r>
-            <a:r>
-              <a:rPr lang="en-US" dirty="0" smtClean="0"/>
-              <a:t>pool</a:t>
-            </a:r>
-            <a:r>
-              <a:rPr lang="en-US" dirty="0" smtClean="0"/>
-              <a:t>) </a:t>
-            </a:r>
-            <a:r>
-              <a:rPr lang="en-US" dirty="0" smtClean="0"/>
-              <a:t>or host material (</a:t>
-            </a:r>
-            <a:r>
-              <a:rPr lang="en-US" dirty="0" smtClean="0"/>
-              <a:t>e.g</a:t>
-            </a:r>
-            <a:r>
-              <a:rPr lang="en-US" dirty="0" smtClean="0"/>
-              <a:t>. human blood)</a:t>
-            </a:r>
-          </a:p>
-          <a:p>
-            <a:r>
-              <a:rPr lang="en-US" dirty="0" smtClean="0"/>
-              <a:t>The</a:t>
-            </a:r>
-            <a:r>
-              <a:rPr lang="en-US" dirty="0" smtClean="0"/>
-              <a:t> genetic characteristics </a:t>
-            </a:r>
-            <a:r>
-              <a:rPr lang="en-US" dirty="0" smtClean="0"/>
-              <a:t>of</a:t>
-            </a:r>
-            <a:r>
-              <a:rPr lang="en-US" dirty="0" smtClean="0"/>
-              <a:t> an isolate </a:t>
-            </a:r>
-            <a:r>
-              <a:rPr lang="en-US" dirty="0" smtClean="0"/>
-              <a:t>can be </a:t>
-            </a:r>
-            <a:r>
-              <a:rPr lang="en-US" dirty="0" smtClean="0"/>
-              <a:t>identified </a:t>
-            </a:r>
-            <a:r>
-              <a:rPr lang="en-US" dirty="0" smtClean="0"/>
-              <a:t>through a</a:t>
-            </a:r>
-            <a:r>
-              <a:rPr lang="en-US" dirty="0" smtClean="0"/>
-              <a:t> </a:t>
-            </a:r>
-            <a:r>
-              <a:rPr lang="en-US" dirty="0" smtClean="0"/>
-              <a:t>genotyping assay</a:t>
+              <a:t>The genetic characteristics of an isolate can be identified through agenotyping assay</a:t>
             </a:r>
           </a:p>
           <a:p>
@@ -14697,10 +14683,6 @@
             <a:pPr algn="ctr"/>
             <a:r>
               <a:rPr lang="en-US" dirty="0" smtClean="0"/>
-              <a:t> </a:t>
-            </a:r>
-            <a:r>
-              <a:rPr lang="en-US" dirty="0" smtClean="0"/>
               <a:t>assay</a:t>
             </a:r>
             <a:endParaRPr lang="en-US" dirty="0"/>
@@ -14771,106 +14753,7 @@
                   </a:schemeClr>
                 </a:solidFill>
               </a:rPr>
-              <a:t>Which </a:t>
-            </a:r>
-            <a:r>
-              <a:rPr lang="en-US" dirty="0" smtClean="0">
-                <a:solidFill>
-                  <a:schemeClr val="accent1">
-                    <a:lumMod val="60000"/>
-                    <a:lumOff val="40000"/>
-                  </a:schemeClr>
-                </a:solidFill>
-              </a:rPr>
-              <a:t>type of parasite</a:t>
-            </a:r>
-            <a:r>
-              <a:rPr lang="en-US" dirty="0" smtClean="0">
-                <a:solidFill>
-                  <a:schemeClr val="accent1">
-                    <a:lumMod val="60000"/>
-                    <a:lumOff val="40000"/>
-                  </a:schemeClr>
-                </a:solidFill>
-              </a:rPr>
-              <a:t> </a:t>
-            </a:r>
-            <a:r>
-              <a:rPr lang="en-US" dirty="0" smtClean="0">
-                <a:solidFill>
-                  <a:schemeClr val="accent1">
-                    <a:lumMod val="60000"/>
-                    <a:lumOff val="40000"/>
-                  </a:schemeClr>
-                </a:solidFill>
-              </a:rPr>
-              <a:t>(</a:t>
-            </a:r>
-            <a:r>
-              <a:rPr lang="en-US" dirty="0" smtClean="0">
-                <a:solidFill>
-                  <a:schemeClr val="accent1">
-                    <a:lumMod val="60000"/>
-                    <a:lumOff val="40000"/>
-                  </a:schemeClr>
-                </a:solidFill>
-              </a:rPr>
-              <a:t>e.g</a:t>
-            </a:r>
-            <a:r>
-              <a:rPr lang="en-US" dirty="0" smtClean="0">
-                <a:solidFill>
-                  <a:schemeClr val="accent1">
-                    <a:lumMod val="60000"/>
-                    <a:lumOff val="40000"/>
-                  </a:schemeClr>
-                </a:solidFill>
-              </a:rPr>
-              <a:t>. species, subtype, strain, genotype</a:t>
-            </a:r>
-            <a:r>
-              <a:rPr lang="en-US" dirty="0" smtClean="0">
-                <a:solidFill>
-                  <a:schemeClr val="accent1">
-                    <a:lumMod val="60000"/>
-                    <a:lumOff val="40000"/>
-                  </a:schemeClr>
-                </a:solidFill>
-              </a:rPr>
-              <a:t>)</a:t>
-            </a:r>
-            <a:r>
-              <a:rPr lang="en-US" dirty="0" smtClean="0">
-                <a:solidFill>
-                  <a:schemeClr val="accent1">
-                    <a:lumMod val="60000"/>
-                    <a:lumOff val="40000"/>
-                  </a:schemeClr>
-                </a:solidFill>
-              </a:rPr>
-              <a:t> was</a:t>
-            </a:r>
-            <a:r>
-              <a:rPr lang="en-US" dirty="0" smtClean="0">
-                <a:solidFill>
-                  <a:schemeClr val="accent1">
-                    <a:lumMod val="60000"/>
-                    <a:lumOff val="40000"/>
-                  </a:schemeClr>
-                </a:solidFill>
-              </a:rPr>
-              <a:t> </a:t>
-            </a:r>
-            <a:r>
-              <a:rPr lang="en-US" dirty="0" smtClean="0">
-                <a:solidFill>
-                  <a:schemeClr val="accent1">
-                    <a:lumMod val="60000"/>
-                    <a:lumOff val="40000"/>
-                  </a:schemeClr>
-                </a:solidFill>
-              </a:rPr>
-              <a:t>in </a:t>
+              <a:t>Which type of parasite(e.g. species, subtype, strain, genotype) wasin </a:t>
             </a:r>
             <a:r>
               <a:rPr lang="en-US" smtClean="0">
@@ -14881,18 +14764,7 @@
                   </a:schemeClr>
                 </a:solidFill>
               </a:rPr>
-              <a:t>the</a:t>
-            </a:r>
-            <a:r>
-              <a:rPr lang="en-US" smtClean="0">
-                <a:solidFill>
-                  <a:schemeClr val="accent1">
-                    <a:lumMod val="60000"/>
-                    <a:lumOff val="40000"/>
-                  </a:schemeClr>
-                </a:solidFill>
-              </a:rPr>
-              <a:t> isolate specimen</a:t>
+              <a:t>the isolate specimen</a:t>
             </a:r>
             <a:r>
               <a:rPr lang="en-US" dirty="0" smtClean="0">
@@ -14925,7 +14797,7 @@
 </file>
 
 <file path=ppt/slides/slide8.xml><?xml version="1.0" encoding="utf-8"?>
-<p:sld xmlns:a="http://schemas.openxmlformats.org/drawingml/2006/main" xmlns:r="http://schemas.openxmlformats.org/officeDocument/2006/relationships" xmlns:mc="http://schemas.openxmlformats.org/markup-compatibility/2006" xmlns:mv="urn:schemas-microsoft-com:mac:vml" xmlns:p="http://schemas.openxmlformats.org/presentationml/2006/main" mc:Ignorable="mv" mc:PreserveAttributes="mv:*">
+<p:sld xmlns:a="http://schemas.openxmlformats.org/drawingml/2006/main" xmlns:r="http://schemas.openxmlformats.org/officeDocument/2006/relationships" xmlns:p="http://schemas.openxmlformats.org/presentationml/2006/main">
   <p:cSld>
     <p:spTree>
       <p:nvGrpSpPr>
@@ -15208,7 +15080,7 @@
 </file>
 
 <file path=ppt/slides/slide9.xml><?xml version="1.0" encoding="utf-8"?>
-<p:sld xmlns:a="http://schemas.openxmlformats.org/drawingml/2006/main" xmlns:r="http://schemas.openxmlformats.org/officeDocument/2006/relationships" xmlns:mc="http://schemas.openxmlformats.org/markup-compatibility/2006" xmlns:mv="urn:schemas-microsoft-com:mac:vml" xmlns:p="http://schemas.openxmlformats.org/presentationml/2006/main" mc:Ignorable="mv" mc:PreserveAttributes="mv:*">
+<p:sld xmlns:a="http://schemas.openxmlformats.org/drawingml/2006/main" xmlns:r="http://schemas.openxmlformats.org/officeDocument/2006/relationships" xmlns:p="http://schemas.openxmlformats.org/presentationml/2006/main">
   <p:cSld>
     <p:spTree>
       <p:nvGrpSpPr>
@@ -15397,7 +15269,7 @@
         </p:xfrm>
         <a:graphic>
           <a:graphicData uri="http://schemas.openxmlformats.org/presentationml/2006/ole">
-            <p:oleObj spid="_x0000_s3073" name="Worksheet" r:id="rId3" imgW="5448300" imgH="3263900" progId="Excel.Sheet.12">
+            <p:oleObj spid="_x0000_s3073" name="Worksheet" r:id="rId3" imgW="5458924" imgH="3263677" progId="Excel.Sheet.12">
               <p:embed/>
             </p:oleObj>
           </a:graphicData>

</xml_diff>

<commit_message>
Replace OPL example by OBI one
</commit_message>
<xml_diff>
--- a/docs/presentations/OBI tutorial July 2011 ICBO/EuPathDB.pptx
+++ b/docs/presentations/OBI tutorial July 2011 ICBO/EuPathDB.pptx
@@ -5,7 +5,7 @@
     <p:sldMasterId id="2147483960" r:id="rId1"/>
   </p:sldMasterIdLst>
   <p:notesMasterIdLst>
-    <p:notesMasterId r:id="rId24"/>
+    <p:notesMasterId r:id="rId21"/>
   </p:notesMasterIdLst>
   <p:sldIdLst>
     <p:sldId id="256" r:id="rId2"/>
@@ -24,12 +24,9 @@
     <p:sldId id="305" r:id="rId15"/>
     <p:sldId id="298" r:id="rId16"/>
     <p:sldId id="306" r:id="rId17"/>
-    <p:sldId id="280" r:id="rId18"/>
-    <p:sldId id="310" r:id="rId19"/>
-    <p:sldId id="307" r:id="rId20"/>
-    <p:sldId id="308" r:id="rId21"/>
-    <p:sldId id="295" r:id="rId22"/>
-    <p:sldId id="301" r:id="rId23"/>
+    <p:sldId id="310" r:id="rId18"/>
+    <p:sldId id="295" r:id="rId19"/>
+    <p:sldId id="301" r:id="rId20"/>
   </p:sldIdLst>
   <p:sldSz cx="9144000" cy="6858000" type="screen4x3"/>
   <p:notesSz cx="6858000" cy="9144000"/>
@@ -682,139 +679,6 @@
 </p:notes>
 </file>
 
-<file path=ppt/notesSlides/notesSlide10.xml><?xml version="1.0" encoding="utf-8"?>
-<p:notes xmlns:a="http://schemas.openxmlformats.org/drawingml/2006/main" xmlns:r="http://schemas.openxmlformats.org/officeDocument/2006/relationships" xmlns:p="http://schemas.openxmlformats.org/presentationml/2006/main">
-  <p:cSld>
-    <p:spTree>
-      <p:nvGrpSpPr>
-        <p:cNvPr id="1" name=""/>
-        <p:cNvGrpSpPr/>
-        <p:nvPr/>
-      </p:nvGrpSpPr>
-      <p:grpSpPr>
-        <a:xfrm>
-          <a:off x="0" y="0"/>
-          <a:ext cx="0" cy="0"/>
-          <a:chOff x="0" y="0"/>
-          <a:chExt cx="0" cy="0"/>
-        </a:xfrm>
-      </p:grpSpPr>
-      <p:sp>
-        <p:nvSpPr>
-          <p:cNvPr id="27649" name="Slide Image Placeholder 1"/>
-          <p:cNvSpPr>
-            <a:spLocks noGrp="1" noRot="1" noChangeAspect="1"/>
-          </p:cNvSpPr>
-          <p:nvPr>
-            <p:ph type="sldImg"/>
-          </p:nvPr>
-        </p:nvSpPr>
-        <p:spPr bwMode="auto">
-          <a:noFill/>
-          <a:ln>
-            <a:solidFill>
-              <a:srgbClr val="000000"/>
-            </a:solidFill>
-            <a:miter lim="800000"/>
-            <a:headEnd/>
-            <a:tailEnd/>
-          </a:ln>
-        </p:spPr>
-      </p:sp>
-      <p:sp>
-        <p:nvSpPr>
-          <p:cNvPr id="27650" name="Notes Placeholder 2"/>
-          <p:cNvSpPr>
-            <a:spLocks noGrp="1"/>
-          </p:cNvSpPr>
-          <p:nvPr>
-            <p:ph type="body" idx="1"/>
-          </p:nvPr>
-        </p:nvSpPr>
-        <p:spPr bwMode="auto">
-          <a:noFill/>
-        </p:spPr>
-        <p:txBody>
-          <a:bodyPr/>
-          <a:lstStyle/>
-          <a:p>
-            <a:pPr>
-              <a:spcBef>
-                <a:spcPct val="0"/>
-              </a:spcBef>
-            </a:pPr>
-            <a:r>
-              <a:rPr lang="en-US" sz="1800" smtClean="0">
-                <a:latin typeface="Trebuchet MS" pitchFamily="34" charset="0"/>
-                <a:cs typeface="Arial" pitchFamily="34" charset="0"/>
-              </a:rPr>
-              <a:t>EupathDB, data we want to collect and issues we have now</a:t>
-            </a:r>
-          </a:p>
-        </p:txBody>
-      </p:sp>
-      <p:sp>
-        <p:nvSpPr>
-          <p:cNvPr id="27651" name="Slide Number Placeholder 3"/>
-          <p:cNvSpPr>
-            <a:spLocks noGrp="1"/>
-          </p:cNvSpPr>
-          <p:nvPr>
-            <p:ph type="sldNum" sz="quarter" idx="5"/>
-          </p:nvPr>
-        </p:nvSpPr>
-        <p:spPr bwMode="auto">
-          <a:noFill/>
-          <a:ln>
-            <a:miter lim="800000"/>
-            <a:headEnd/>
-            <a:tailEnd/>
-          </a:ln>
-        </p:spPr>
-        <p:txBody>
-          <a:bodyPr wrap="square" numCol="1" anchorCtr="0" compatLnSpc="1">
-            <a:prstTxWarp prst="textNoShape">
-              <a:avLst/>
-            </a:prstTxWarp>
-          </a:bodyPr>
-          <a:lstStyle/>
-          <a:p>
-            <a:pPr fontAlgn="base">
-              <a:spcBef>
-                <a:spcPct val="0"/>
-              </a:spcBef>
-              <a:spcAft>
-                <a:spcPct val="0"/>
-              </a:spcAft>
-            </a:pPr>
-            <a:fld id="{DFD20FA0-9931-4FA5-9123-F27539B85481}" type="slidenum">
-              <a:rPr lang="en-US">
-                <a:cs typeface="Arial" pitchFamily="34" charset="0"/>
-              </a:rPr>
-              <a:pPr fontAlgn="base">
-                <a:spcBef>
-                  <a:spcPct val="0"/>
-                </a:spcBef>
-                <a:spcAft>
-                  <a:spcPct val="0"/>
-                </a:spcAft>
-              </a:pPr>
-              <a:t>21</a:t>
-            </a:fld>
-            <a:endParaRPr lang="en-US">
-              <a:cs typeface="Arial" pitchFamily="34" charset="0"/>
-            </a:endParaRPr>
-          </a:p>
-        </p:txBody>
-      </p:sp>
-    </p:spTree>
-  </p:cSld>
-  <p:clrMapOvr>
-    <a:masterClrMapping/>
-  </p:clrMapOvr>
-</p:notes>
-</file>
-
 <file path=ppt/notesSlides/notesSlide2.xml><?xml version="1.0" encoding="utf-8"?>
 <p:notes xmlns:a="http://schemas.openxmlformats.org/drawingml/2006/main" xmlns:r="http://schemas.openxmlformats.org/officeDocument/2006/relationships" xmlns:p="http://schemas.openxmlformats.org/presentationml/2006/main">
   <p:cSld>
@@ -1739,7 +1603,7 @@
       </p:grpSpPr>
       <p:sp>
         <p:nvSpPr>
-          <p:cNvPr id="2" name="Slide Image Placeholder 1"/>
+          <p:cNvPr id="27649" name="Slide Image Placeholder 1"/>
           <p:cNvSpPr>
             <a:spLocks noGrp="1" noRot="1" noChangeAspect="1"/>
           </p:cNvSpPr>
@@ -1747,11 +1611,21 @@
             <p:ph type="sldImg"/>
           </p:nvPr>
         </p:nvSpPr>
-        <p:spPr/>
-      </p:sp>
-      <p:sp>
-        <p:nvSpPr>
-          <p:cNvPr id="3" name="Notes Placeholder 2"/>
+        <p:spPr bwMode="auto">
+          <a:noFill/>
+          <a:ln>
+            <a:solidFill>
+              <a:srgbClr val="000000"/>
+            </a:solidFill>
+            <a:miter lim="800000"/>
+            <a:headEnd/>
+            <a:tailEnd/>
+          </a:ln>
+        </p:spPr>
+      </p:sp>
+      <p:sp>
+        <p:nvSpPr>
+          <p:cNvPr id="27650" name="Notes Placeholder 2"/>
           <p:cNvSpPr>
             <a:spLocks noGrp="1"/>
           </p:cNvSpPr>
@@ -1759,1159 +1633,79 @@
             <p:ph type="body" idx="1"/>
           </p:nvPr>
         </p:nvSpPr>
-        <p:spPr/>
-        <p:txBody>
-          <a:bodyPr>
-            <a:normAutofit/>
+        <p:spPr bwMode="auto">
+          <a:noFill/>
+        </p:spPr>
+        <p:txBody>
+          <a:bodyPr/>
+          <a:lstStyle/>
+          <a:p>
+            <a:pPr>
+              <a:spcBef>
+                <a:spcPct val="0"/>
+              </a:spcBef>
+            </a:pPr>
+            <a:r>
+              <a:rPr lang="en-US" sz="1800" smtClean="0">
+                <a:latin typeface="Trebuchet MS" pitchFamily="34" charset="0"/>
+                <a:cs typeface="Arial" pitchFamily="34" charset="0"/>
+              </a:rPr>
+              <a:t>EupathDB, data we want to collect and issues we have now</a:t>
+            </a:r>
+          </a:p>
+        </p:txBody>
+      </p:sp>
+      <p:sp>
+        <p:nvSpPr>
+          <p:cNvPr id="27651" name="Slide Number Placeholder 3"/>
+          <p:cNvSpPr>
+            <a:spLocks noGrp="1"/>
+          </p:cNvSpPr>
+          <p:nvPr>
+            <p:ph type="sldNum" sz="quarter" idx="5"/>
+          </p:nvPr>
+        </p:nvSpPr>
+        <p:spPr bwMode="auto">
+          <a:noFill/>
+          <a:ln>
+            <a:miter lim="800000"/>
+            <a:headEnd/>
+            <a:tailEnd/>
+          </a:ln>
+        </p:spPr>
+        <p:txBody>
+          <a:bodyPr wrap="square" numCol="1" anchorCtr="0" compatLnSpc="1">
+            <a:prstTxWarp prst="textNoShape">
+              <a:avLst/>
+            </a:prstTxWarp>
           </a:bodyPr>
           <a:lstStyle/>
           <a:p>
-            <a:r>
-              <a:rPr lang="en-US" sz="1200" kern="1200" dirty="0" smtClean="0">
-                <a:solidFill>
-                  <a:schemeClr val="tx1"/>
-                </a:solidFill>
-                <a:latin typeface="+mn-lt"/>
-                <a:ea typeface="+mn-ea"/>
-                <a:cs typeface="+mn-cs"/>
-              </a:rPr>
-              <a:t>identifying novel intervention targets</a:t>
-            </a:r>
-          </a:p>
-          <a:p>
-            <a:r>
-              <a:rPr lang="en-US" sz="1200" kern="1200" dirty="0" smtClean="0">
-                <a:solidFill>
-                  <a:schemeClr val="tx1"/>
-                </a:solidFill>
-                <a:latin typeface="+mn-lt"/>
-                <a:ea typeface="+mn-ea"/>
-                <a:cs typeface="+mn-cs"/>
-              </a:rPr>
-              <a:t>localization of a parasite within its host at each lifecycle stage</a:t>
-            </a:r>
-          </a:p>
-          <a:p>
-            <a:r>
-              <a:rPr lang="en-US" sz="1200" kern="1200" dirty="0" smtClean="0">
-                <a:solidFill>
-                  <a:schemeClr val="tx1"/>
-                </a:solidFill>
-                <a:latin typeface="+mn-lt"/>
-                <a:ea typeface="+mn-ea"/>
-                <a:cs typeface="+mn-cs"/>
-              </a:rPr>
-              <a:t>host and vector information of parasites </a:t>
-            </a:r>
-          </a:p>
-          <a:p>
-            <a:r>
-              <a:rPr lang="en-US" sz="1200" kern="1200" dirty="0" smtClean="0">
-                <a:solidFill>
-                  <a:schemeClr val="tx1"/>
-                </a:solidFill>
-                <a:latin typeface="+mn-lt"/>
-                <a:ea typeface="+mn-ea"/>
-                <a:cs typeface="+mn-cs"/>
-              </a:rPr>
-              <a:t>several parasitic organism genomes, namely </a:t>
-            </a:r>
-            <a:r>
-              <a:rPr lang="en-US" sz="1200" i="1" kern="1200" dirty="0" err="1" smtClean="0">
-                <a:solidFill>
-                  <a:schemeClr val="tx1"/>
-                </a:solidFill>
-                <a:latin typeface="+mn-lt"/>
-                <a:ea typeface="+mn-ea"/>
-                <a:cs typeface="+mn-cs"/>
-              </a:rPr>
-              <a:t>Trypanosomabrucei</a:t>
-            </a:r>
-            <a:r>
-              <a:rPr lang="en-US" sz="1200" kern="1200" dirty="0" smtClean="0">
-                <a:solidFill>
-                  <a:schemeClr val="tx1"/>
-                </a:solidFill>
-                <a:latin typeface="+mn-lt"/>
-                <a:ea typeface="+mn-ea"/>
-                <a:cs typeface="+mn-cs"/>
-              </a:rPr>
-              <a:t>, </a:t>
-            </a:r>
-            <a:r>
-              <a:rPr lang="en-US" sz="1200" i="1" kern="1200" dirty="0" err="1" smtClean="0">
-                <a:solidFill>
-                  <a:schemeClr val="tx1"/>
-                </a:solidFill>
-                <a:latin typeface="+mn-lt"/>
-                <a:ea typeface="+mn-ea"/>
-                <a:cs typeface="+mn-cs"/>
-              </a:rPr>
-              <a:t>Trypanosomacruzi</a:t>
-            </a:r>
-            <a:r>
-              <a:rPr lang="en-US" sz="1200" kern="1200" dirty="0" smtClean="0">
-                <a:solidFill>
-                  <a:schemeClr val="tx1"/>
-                </a:solidFill>
-                <a:latin typeface="+mn-lt"/>
-                <a:ea typeface="+mn-ea"/>
-                <a:cs typeface="+mn-cs"/>
-              </a:rPr>
-              <a:t>, </a:t>
-            </a:r>
-            <a:r>
-              <a:rPr lang="en-US" sz="1200" i="1" kern="1200" dirty="0" err="1" smtClean="0">
-                <a:solidFill>
-                  <a:schemeClr val="tx1"/>
-                </a:solidFill>
-                <a:latin typeface="+mn-lt"/>
-                <a:ea typeface="+mn-ea"/>
-                <a:cs typeface="+mn-cs"/>
-              </a:rPr>
-              <a:t>Leishmania</a:t>
-            </a:r>
-            <a:r>
-              <a:rPr lang="en-US" sz="1200" i="1" kern="1200" dirty="0" smtClean="0">
-                <a:solidFill>
-                  <a:schemeClr val="tx1"/>
-                </a:solidFill>
-                <a:latin typeface="+mn-lt"/>
-                <a:ea typeface="+mn-ea"/>
-                <a:cs typeface="+mn-cs"/>
-              </a:rPr>
-              <a:t> major</a:t>
-            </a:r>
-            <a:r>
-              <a:rPr lang="en-US" sz="1200" kern="1200" dirty="0" smtClean="0">
-                <a:solidFill>
-                  <a:schemeClr val="tx1"/>
-                </a:solidFill>
-                <a:latin typeface="+mn-lt"/>
-                <a:ea typeface="+mn-ea"/>
-                <a:cs typeface="+mn-cs"/>
-              </a:rPr>
-              <a:t>, </a:t>
-            </a:r>
-            <a:r>
-              <a:rPr lang="en-US" sz="1200" i="1" kern="1200" dirty="0" smtClean="0">
-                <a:solidFill>
-                  <a:schemeClr val="tx1"/>
-                </a:solidFill>
-                <a:latin typeface="+mn-lt"/>
-                <a:ea typeface="+mn-ea"/>
-                <a:cs typeface="+mn-cs"/>
-              </a:rPr>
-              <a:t>Plasmodium </a:t>
-            </a:r>
-            <a:r>
-              <a:rPr lang="en-US" sz="1200" i="1" kern="1200" dirty="0" err="1" smtClean="0">
-                <a:solidFill>
-                  <a:schemeClr val="tx1"/>
-                </a:solidFill>
-                <a:latin typeface="+mn-lt"/>
-                <a:ea typeface="+mn-ea"/>
-                <a:cs typeface="+mn-cs"/>
-              </a:rPr>
-              <a:t>falciparum</a:t>
-            </a:r>
-            <a:r>
-              <a:rPr lang="en-US" sz="1200" kern="1200" dirty="0" smtClean="0">
-                <a:solidFill>
-                  <a:schemeClr val="tx1"/>
-                </a:solidFill>
-                <a:latin typeface="+mn-lt"/>
-                <a:ea typeface="+mn-ea"/>
-                <a:cs typeface="+mn-cs"/>
-              </a:rPr>
-              <a:t>, and </a:t>
-            </a:r>
-            <a:r>
-              <a:rPr lang="en-US" sz="1200" i="1" kern="1200" dirty="0" err="1" smtClean="0">
-                <a:solidFill>
-                  <a:schemeClr val="tx1"/>
-                </a:solidFill>
-                <a:latin typeface="+mn-lt"/>
-                <a:ea typeface="+mn-ea"/>
-                <a:cs typeface="+mn-cs"/>
-              </a:rPr>
-              <a:t>Schistosomamansoni</a:t>
-            </a:r>
-            <a:r>
-              <a:rPr lang="en-US" sz="1200" kern="1200" dirty="0" smtClean="0">
-                <a:solidFill>
-                  <a:schemeClr val="tx1"/>
-                </a:solidFill>
-                <a:latin typeface="+mn-lt"/>
-                <a:ea typeface="+mn-ea"/>
-                <a:cs typeface="+mn-cs"/>
-              </a:rPr>
-              <a:t>.</a:t>
-            </a:r>
-          </a:p>
-          <a:p>
-            <a:r>
-              <a:rPr lang="en-US" sz="1200" kern="1200" dirty="0" smtClean="0">
-                <a:solidFill>
-                  <a:schemeClr val="tx1"/>
-                </a:solidFill>
-                <a:latin typeface="+mn-lt"/>
-                <a:ea typeface="+mn-ea"/>
-                <a:cs typeface="+mn-cs"/>
-              </a:rPr>
-              <a:t>Since the majority of experiments carried out in parasitic organisms are done in a single lifecycle stage, it is important to annotate phenotype data with this information to enable users to analyze the data appropriately.</a:t>
-            </a:r>
-          </a:p>
-          <a:p>
-            <a:pPr marL="0" marR="0" indent="0" algn="l" defTabSz="914400" rtl="0" eaLnBrk="1" fontAlgn="base" latinLnBrk="0" hangingPunct="1">
-              <a:lnSpc>
-                <a:spcPct val="100000"/>
-              </a:lnSpc>
+            <a:pPr fontAlgn="base">
               <a:spcBef>
-                <a:spcPct val="30000"/>
+                <a:spcPct val="0"/>
               </a:spcBef>
               <a:spcAft>
                 <a:spcPct val="0"/>
               </a:spcAft>
-              <a:buClrTx/>
-              <a:buSzTx/>
-              <a:buFontTx/>
-              <a:buNone/>
-              <a:tabLst/>
-              <a:defRPr/>
             </a:pPr>
-            <a:r>
-              <a:rPr lang="en-US" sz="1200" kern="1200" dirty="0" smtClean="0">
-                <a:solidFill>
-                  <a:schemeClr val="tx1"/>
-                </a:solidFill>
-                <a:latin typeface="+mn-lt"/>
-                <a:ea typeface="+mn-ea"/>
-                <a:cs typeface="+mn-cs"/>
+            <a:fld id="{DFD20FA0-9931-4FA5-9123-F27539B85481}" type="slidenum">
+              <a:rPr lang="en-US">
+                <a:cs typeface="Arial" pitchFamily="34" charset="0"/>
               </a:rPr>
-              <a:t>lethal during bloodstream stage</a:t>
-            </a:r>
-          </a:p>
-          <a:p>
-            <a:endParaRPr lang="en-US" dirty="0"/>
-          </a:p>
-        </p:txBody>
-      </p:sp>
-      <p:sp>
-        <p:nvSpPr>
-          <p:cNvPr id="4" name="Slide Number Placeholder 3"/>
-          <p:cNvSpPr>
-            <a:spLocks noGrp="1"/>
-          </p:cNvSpPr>
-          <p:nvPr>
-            <p:ph type="sldNum" sz="quarter" idx="10"/>
-          </p:nvPr>
-        </p:nvSpPr>
-        <p:spPr/>
-        <p:txBody>
-          <a:bodyPr/>
-          <a:lstStyle/>
-          <a:p>
-            <a:pPr>
-              <a:defRPr/>
-            </a:pPr>
-            <a:fld id="{3A96576D-D51A-4E67-8DA5-9A6D61B288F8}" type="slidenum">
-              <a:rPr lang="en-US" smtClean="0"/>
-              <a:pPr>
-                <a:defRPr/>
-              </a:pPr>
-              <a:t>17</a:t>
-            </a:fld>
-            <a:endParaRPr lang="en-US"/>
-          </a:p>
-        </p:txBody>
-      </p:sp>
-    </p:spTree>
-  </p:cSld>
-  <p:clrMapOvr>
-    <a:masterClrMapping/>
-  </p:clrMapOvr>
-</p:notes>
-</file>
-
-<file path=ppt/notesSlides/notesSlide8.xml><?xml version="1.0" encoding="utf-8"?>
-<p:notes xmlns:a="http://schemas.openxmlformats.org/drawingml/2006/main" xmlns:r="http://schemas.openxmlformats.org/officeDocument/2006/relationships" xmlns:p="http://schemas.openxmlformats.org/presentationml/2006/main">
-  <p:cSld>
-    <p:spTree>
-      <p:nvGrpSpPr>
-        <p:cNvPr id="1" name=""/>
-        <p:cNvGrpSpPr/>
-        <p:nvPr/>
-      </p:nvGrpSpPr>
-      <p:grpSpPr>
-        <a:xfrm>
-          <a:off x="0" y="0"/>
-          <a:ext cx="0" cy="0"/>
-          <a:chOff x="0" y="0"/>
-          <a:chExt cx="0" cy="0"/>
-        </a:xfrm>
-      </p:grpSpPr>
-      <p:sp>
-        <p:nvSpPr>
-          <p:cNvPr id="2" name="Slide Image Placeholder 1"/>
-          <p:cNvSpPr>
-            <a:spLocks noGrp="1" noRot="1" noChangeAspect="1"/>
-          </p:cNvSpPr>
-          <p:nvPr>
-            <p:ph type="sldImg"/>
-          </p:nvPr>
-        </p:nvSpPr>
-        <p:spPr/>
-      </p:sp>
-      <p:sp>
-        <p:nvSpPr>
-          <p:cNvPr id="3" name="Notes Placeholder 2"/>
-          <p:cNvSpPr>
-            <a:spLocks noGrp="1"/>
-          </p:cNvSpPr>
-          <p:nvPr>
-            <p:ph type="body" idx="1"/>
-          </p:nvPr>
-        </p:nvSpPr>
-        <p:spPr/>
-        <p:txBody>
-          <a:bodyPr>
-            <a:normAutofit fontScale="92500"/>
-          </a:bodyPr>
-          <a:lstStyle/>
-          <a:p>
-            <a:pPr marL="0" marR="0" indent="0" algn="l" defTabSz="914400" rtl="0" eaLnBrk="1" fontAlgn="base" latinLnBrk="0" hangingPunct="1">
-              <a:lnSpc>
-                <a:spcPct val="100000"/>
-              </a:lnSpc>
-              <a:spcBef>
-                <a:spcPct val="30000"/>
-              </a:spcBef>
-              <a:spcAft>
-                <a:spcPct val="0"/>
-              </a:spcAft>
-              <a:buClrTx/>
-              <a:buSzTx/>
-              <a:buFontTx/>
-              <a:buNone/>
-              <a:tabLst/>
-              <a:defRPr/>
-            </a:pPr>
-            <a:r>
-              <a:rPr lang="en-US" dirty="0" smtClean="0"/>
-              <a:t>There are many types of parasites, and each one has variations to its life cycle. There are, however, similarities among the life cycles of all parasites. The one thing that all parasites have in common is that they are opportunistic organisms that live off the blood of other living organisms. Parasites are dangerous for two reasons. The first is that they can infiltrate the host to the point of consuming all of the body's food, clogging vessels or organs and killing the host, and the other is that they can pass deadly diseases to host organisms.</a:t>
-            </a:r>
-            <a:r>
-              <a:rPr lang="en-US" sz="1200" u="none" strike="noStrike" kern="1200" dirty="0" smtClean="0">
-                <a:solidFill>
-                  <a:schemeClr val="tx1"/>
-                </a:solidFill>
-                <a:latin typeface="+mn-lt"/>
-                <a:ea typeface="+mn-ea"/>
-                <a:cs typeface="+mn-cs"/>
-              </a:rPr>
-              <a:t/>
-            </a:r>
-            <a:br>
-              <a:rPr lang="en-US" sz="1200" u="none" strike="noStrike" kern="1200" dirty="0" smtClean="0">
-                <a:solidFill>
-                  <a:schemeClr val="tx1"/>
-                </a:solidFill>
-                <a:latin typeface="+mn-lt"/>
-                <a:ea typeface="+mn-ea"/>
-                <a:cs typeface="+mn-cs"/>
-              </a:rPr>
-            </a:br>
-            <a:r>
-              <a:rPr lang="en-US" sz="1200" u="none" strike="noStrike" kern="1200" dirty="0" smtClean="0">
-                <a:solidFill>
-                  <a:schemeClr val="tx1"/>
-                </a:solidFill>
-                <a:latin typeface="+mn-lt"/>
-                <a:ea typeface="+mn-ea"/>
-                <a:cs typeface="+mn-cs"/>
-              </a:rPr>
-              <a:t>Read more: </a:t>
-            </a:r>
-            <a:r>
-              <a:rPr lang="en-US" sz="1200" u="none" strike="noStrike" kern="1200" dirty="0" smtClean="0">
-                <a:solidFill>
-                  <a:schemeClr val="tx1"/>
-                </a:solidFill>
-                <a:latin typeface="+mn-lt"/>
-                <a:ea typeface="+mn-ea"/>
-                <a:cs typeface="+mn-cs"/>
-                <a:hlinkClick r:id="rId3"/>
-              </a:rPr>
-              <a:t>Life Cycle of a Parasite | eHow.comhttp://www.ehow.com/about_5339802_life-cycle-parasite.html#ixzz1S1N345mM</a:t>
-            </a:r>
-            <a:endParaRPr lang="en-US" sz="1200" u="none" strike="noStrike" kern="1200" dirty="0" smtClean="0">
-              <a:solidFill>
-                <a:schemeClr val="tx1"/>
-              </a:solidFill>
-              <a:latin typeface="+mn-lt"/>
-              <a:ea typeface="+mn-ea"/>
-              <a:cs typeface="+mn-cs"/>
-            </a:endParaRPr>
-          </a:p>
-          <a:p>
-            <a:pPr marL="0" marR="0" indent="0" algn="l" defTabSz="914400" rtl="0" eaLnBrk="1" fontAlgn="base" latinLnBrk="0" hangingPunct="1">
-              <a:lnSpc>
-                <a:spcPct val="100000"/>
-              </a:lnSpc>
-              <a:spcBef>
-                <a:spcPct val="30000"/>
-              </a:spcBef>
-              <a:spcAft>
-                <a:spcPct val="0"/>
-              </a:spcAft>
-              <a:buClrTx/>
-              <a:buSzTx/>
-              <a:buFontTx/>
-              <a:buNone/>
-              <a:tabLst/>
-              <a:defRPr/>
-            </a:pPr>
-            <a:endParaRPr lang="en-US" sz="1200" u="none" strike="noStrike" kern="1200" dirty="0" smtClean="0">
-              <a:solidFill>
-                <a:schemeClr val="tx1"/>
-              </a:solidFill>
-              <a:latin typeface="+mn-lt"/>
-              <a:ea typeface="+mn-ea"/>
-              <a:cs typeface="+mn-cs"/>
-            </a:endParaRPr>
-          </a:p>
-          <a:p>
-            <a:pPr marL="0" marR="0" indent="0" algn="l" defTabSz="914400" rtl="0" eaLnBrk="1" fontAlgn="base" latinLnBrk="0" hangingPunct="1">
-              <a:lnSpc>
-                <a:spcPct val="100000"/>
-              </a:lnSpc>
-              <a:spcBef>
-                <a:spcPct val="30000"/>
-              </a:spcBef>
-              <a:spcAft>
-                <a:spcPct val="0"/>
-              </a:spcAft>
-              <a:buClrTx/>
-              <a:buSzTx/>
-              <a:buFontTx/>
-              <a:buNone/>
-              <a:tabLst/>
-              <a:defRPr/>
-            </a:pPr>
-            <a:r>
-              <a:rPr lang="en-US" sz="1200" u="none" strike="noStrike" kern="1200" dirty="0" smtClean="0">
-                <a:solidFill>
-                  <a:schemeClr val="tx1"/>
-                </a:solidFill>
-                <a:latin typeface="+mn-lt"/>
-                <a:ea typeface="+mn-ea"/>
-                <a:cs typeface="+mn-cs"/>
-              </a:rPr>
-              <a:t>http://www.dpd.cdc.gov/dpdx/HTML/TrypanosomiasisAfrican.htm</a:t>
-            </a:r>
-          </a:p>
-          <a:p>
-            <a:pPr marL="0" marR="0" indent="0" algn="l" defTabSz="914400" rtl="0" eaLnBrk="1" fontAlgn="base" latinLnBrk="0" hangingPunct="1">
-              <a:lnSpc>
-                <a:spcPct val="100000"/>
-              </a:lnSpc>
-              <a:spcBef>
-                <a:spcPct val="30000"/>
-              </a:spcBef>
-              <a:spcAft>
-                <a:spcPct val="0"/>
-              </a:spcAft>
-              <a:buClrTx/>
-              <a:buSzTx/>
-              <a:buFontTx/>
-              <a:buNone/>
-              <a:tabLst/>
-              <a:defRPr/>
-            </a:pPr>
-            <a:r>
-              <a:rPr lang="en-US" dirty="0" smtClean="0"/>
-              <a:t>During a blood meal on the mammalian host, an infected tsetse fly (genus </a:t>
-            </a:r>
-            <a:r>
-              <a:rPr lang="en-US" i="1" dirty="0" err="1" smtClean="0"/>
-              <a:t>Glossina</a:t>
-            </a:r>
-            <a:r>
-              <a:rPr lang="en-US" dirty="0" smtClean="0"/>
-              <a:t>) injects </a:t>
-            </a:r>
-            <a:r>
-              <a:rPr lang="en-US" dirty="0" err="1" smtClean="0"/>
-              <a:t>metacyclictrypomastigotes</a:t>
-            </a:r>
-            <a:r>
-              <a:rPr lang="en-US" dirty="0" smtClean="0"/>
-              <a:t> into skin tissue.  The parasites enter the lymphatic system and pass into the bloodstream (1) .  Inside the host, they transform into bloodstream </a:t>
-            </a:r>
-            <a:r>
-              <a:rPr lang="en-US" dirty="0" err="1" smtClean="0"/>
-              <a:t>trypomastigotes</a:t>
-            </a:r>
-            <a:r>
-              <a:rPr lang="en-US" dirty="0" smtClean="0"/>
-              <a:t>  (2), are carried to other sites throughout the body, reach other blood fluids (e.g., lymph, spinal fluid), and continue the replication by binary fission (3).  The entire life cycle of African Trypanosomes is represented by extracellular stages.  The tsetse fly becomes infected with bloodstream </a:t>
-            </a:r>
-            <a:r>
-              <a:rPr lang="en-US" dirty="0" err="1" smtClean="0"/>
-              <a:t>trypomastigotes</a:t>
-            </a:r>
-            <a:r>
-              <a:rPr lang="en-US" dirty="0" smtClean="0"/>
-              <a:t> when taking a blood meal on an infected mammalian host (4,5).  In the fly’s </a:t>
-            </a:r>
-            <a:r>
-              <a:rPr lang="en-US" dirty="0" err="1" smtClean="0"/>
-              <a:t>midgut</a:t>
-            </a:r>
-            <a:r>
-              <a:rPr lang="en-US" dirty="0" smtClean="0"/>
-              <a:t>, the parasites transform into </a:t>
-            </a:r>
-            <a:r>
-              <a:rPr lang="en-US" dirty="0" err="1" smtClean="0"/>
-              <a:t>procyclictrypomastigotes</a:t>
-            </a:r>
-            <a:r>
-              <a:rPr lang="en-US" dirty="0" smtClean="0"/>
-              <a:t>, multiply by binary fission (6), leave the </a:t>
-            </a:r>
-            <a:r>
-              <a:rPr lang="en-US" dirty="0" err="1" smtClean="0"/>
-              <a:t>midgut</a:t>
-            </a:r>
-            <a:r>
-              <a:rPr lang="en-US" dirty="0" smtClean="0"/>
-              <a:t>, and transform into </a:t>
-            </a:r>
-            <a:r>
-              <a:rPr lang="en-US" dirty="0" err="1" smtClean="0"/>
-              <a:t>epimastigotes</a:t>
-            </a:r>
-            <a:r>
-              <a:rPr lang="en-US" dirty="0" smtClean="0"/>
-              <a:t> (7).  The </a:t>
-            </a:r>
-            <a:r>
-              <a:rPr lang="en-US" dirty="0" err="1" smtClean="0"/>
-              <a:t>epimastigotes</a:t>
-            </a:r>
-            <a:r>
-              <a:rPr lang="en-US" dirty="0" smtClean="0"/>
-              <a:t> reach the fly’s salivary glands and continue multiplication by binary fission (8).  The cycle in the fly takes approximately 3 weeks.  Humans are the main reservoir for </a:t>
-            </a:r>
-            <a:r>
-              <a:rPr lang="en-US" i="1" dirty="0" err="1" smtClean="0"/>
-              <a:t>Trypanosomabruceigambiense</a:t>
-            </a:r>
-            <a:r>
-              <a:rPr lang="en-US" dirty="0" smtClean="0"/>
-              <a:t>, but this species can also be found in animals.  Wild game animals are the main reservoir of </a:t>
-            </a:r>
-            <a:r>
-              <a:rPr lang="en-US" i="1" dirty="0" smtClean="0"/>
-              <a:t>T. b. </a:t>
-            </a:r>
-            <a:r>
-              <a:rPr lang="en-US" i="1" dirty="0" err="1" smtClean="0"/>
-              <a:t>rhodesiense</a:t>
-            </a:r>
-            <a:r>
-              <a:rPr lang="en-US" dirty="0" smtClean="0"/>
-              <a:t>.</a:t>
-            </a:r>
-          </a:p>
-          <a:p>
-            <a:pPr marL="0" marR="0" indent="0" algn="l" defTabSz="914400" rtl="0" eaLnBrk="1" fontAlgn="base" latinLnBrk="0" hangingPunct="1">
-              <a:lnSpc>
-                <a:spcPct val="100000"/>
-              </a:lnSpc>
-              <a:spcBef>
-                <a:spcPct val="30000"/>
-              </a:spcBef>
-              <a:spcAft>
-                <a:spcPct val="0"/>
-              </a:spcAft>
-              <a:buClrTx/>
-              <a:buSzTx/>
-              <a:buFontTx/>
-              <a:buNone/>
-              <a:tabLst/>
-              <a:defRPr/>
-            </a:pPr>
-            <a:endParaRPr lang="en-US" sz="1200" u="none" strike="noStrike" kern="1200" dirty="0" smtClean="0">
-              <a:solidFill>
-                <a:schemeClr val="tx1"/>
-              </a:solidFill>
-              <a:latin typeface="+mn-lt"/>
-              <a:ea typeface="+mn-ea"/>
-              <a:cs typeface="+mn-cs"/>
-            </a:endParaRPr>
-          </a:p>
-          <a:p>
-            <a:pPr marL="0" marR="0" indent="0" algn="l" defTabSz="914400" rtl="0" eaLnBrk="1" fontAlgn="base" latinLnBrk="0" hangingPunct="1">
-              <a:lnSpc>
-                <a:spcPct val="100000"/>
-              </a:lnSpc>
-              <a:spcBef>
-                <a:spcPct val="30000"/>
-              </a:spcBef>
-              <a:spcAft>
-                <a:spcPct val="0"/>
-              </a:spcAft>
-              <a:buClrTx/>
-              <a:buSzTx/>
-              <a:buFontTx/>
-              <a:buNone/>
-              <a:tabLst/>
-              <a:defRPr/>
-            </a:pPr>
-            <a:r>
-              <a:rPr lang="en-US" sz="1200" kern="1200" dirty="0" smtClean="0">
-                <a:solidFill>
-                  <a:schemeClr val="tx1"/>
-                </a:solidFill>
-                <a:latin typeface="+mn-lt"/>
-                <a:ea typeface="+mn-ea"/>
-                <a:cs typeface="+mn-cs"/>
-              </a:rPr>
-              <a:t>To illustrate the complexity of parasite lifecycle stages we consider </a:t>
-            </a:r>
-            <a:r>
-              <a:rPr lang="en-US" sz="1200" kern="1200" dirty="0" err="1" smtClean="0">
-                <a:solidFill>
-                  <a:schemeClr val="tx1"/>
-                </a:solidFill>
-                <a:latin typeface="+mn-lt"/>
-                <a:ea typeface="+mn-ea"/>
-                <a:cs typeface="+mn-cs"/>
-              </a:rPr>
-              <a:t>the</a:t>
-            </a:r>
-            <a:r>
-              <a:rPr lang="en-US" sz="1200" i="1" kern="1200" dirty="0" err="1" smtClean="0">
-                <a:solidFill>
-                  <a:schemeClr val="tx1"/>
-                </a:solidFill>
-                <a:latin typeface="+mn-lt"/>
-                <a:ea typeface="+mn-ea"/>
-                <a:cs typeface="+mn-cs"/>
-              </a:rPr>
-              <a:t>Trypanosomacruzi</a:t>
-            </a:r>
-            <a:r>
-              <a:rPr lang="en-US" sz="1200" kern="1200" dirty="0" err="1" smtClean="0">
-                <a:solidFill>
-                  <a:schemeClr val="tx1"/>
-                </a:solidFill>
-                <a:latin typeface="+mn-lt"/>
-                <a:ea typeface="+mn-ea"/>
-                <a:cs typeface="+mn-cs"/>
-              </a:rPr>
-              <a:t>parasite</a:t>
-            </a:r>
-            <a:r>
-              <a:rPr lang="en-US" sz="1200" kern="1200" dirty="0" smtClean="0">
-                <a:solidFill>
-                  <a:schemeClr val="tx1"/>
-                </a:solidFill>
-                <a:latin typeface="+mn-lt"/>
-                <a:ea typeface="+mn-ea"/>
-                <a:cs typeface="+mn-cs"/>
-              </a:rPr>
-              <a:t>, which has three stages, namely </a:t>
-            </a:r>
-            <a:r>
-              <a:rPr lang="en-US" sz="1200" kern="1200" dirty="0" err="1" smtClean="0">
-                <a:solidFill>
-                  <a:schemeClr val="tx1"/>
-                </a:solidFill>
-                <a:latin typeface="+mn-lt"/>
-                <a:ea typeface="+mn-ea"/>
-                <a:cs typeface="+mn-cs"/>
-              </a:rPr>
-              <a:t>amastigote</a:t>
-            </a:r>
-            <a:r>
-              <a:rPr lang="en-US" sz="1200" kern="1200" dirty="0" smtClean="0">
-                <a:solidFill>
-                  <a:schemeClr val="tx1"/>
-                </a:solidFill>
-                <a:latin typeface="+mn-lt"/>
-                <a:ea typeface="+mn-ea"/>
-                <a:cs typeface="+mn-cs"/>
-              </a:rPr>
-              <a:t>, </a:t>
-            </a:r>
-            <a:r>
-              <a:rPr lang="en-US" sz="1200" kern="1200" dirty="0" err="1" smtClean="0">
-                <a:solidFill>
-                  <a:schemeClr val="tx1"/>
-                </a:solidFill>
-                <a:latin typeface="+mn-lt"/>
-                <a:ea typeface="+mn-ea"/>
-                <a:cs typeface="+mn-cs"/>
-              </a:rPr>
-              <a:t>epimastigote</a:t>
-            </a:r>
-            <a:r>
-              <a:rPr lang="en-US" sz="1200" kern="1200" dirty="0" smtClean="0">
-                <a:solidFill>
-                  <a:schemeClr val="tx1"/>
-                </a:solidFill>
-                <a:latin typeface="+mn-lt"/>
-                <a:ea typeface="+mn-ea"/>
-                <a:cs typeface="+mn-cs"/>
-              </a:rPr>
-              <a:t>, and </a:t>
-            </a:r>
-            <a:r>
-              <a:rPr lang="en-US" sz="1200" kern="1200" dirty="0" err="1" smtClean="0">
-                <a:solidFill>
-                  <a:schemeClr val="tx1"/>
-                </a:solidFill>
-                <a:latin typeface="+mn-lt"/>
-                <a:ea typeface="+mn-ea"/>
-                <a:cs typeface="+mn-cs"/>
-              </a:rPr>
-              <a:t>trypomastigote</a:t>
-            </a:r>
-            <a:r>
-              <a:rPr lang="en-US" sz="1200" kern="1200" dirty="0" smtClean="0">
-                <a:solidFill>
-                  <a:schemeClr val="tx1"/>
-                </a:solidFill>
-                <a:latin typeface="+mn-lt"/>
-                <a:ea typeface="+mn-ea"/>
-                <a:cs typeface="+mn-cs"/>
-              </a:rPr>
-              <a:t>.  The </a:t>
-            </a:r>
-            <a:r>
-              <a:rPr lang="en-US" sz="1200" kern="1200" dirty="0" err="1" smtClean="0">
-                <a:solidFill>
-                  <a:schemeClr val="tx1"/>
-                </a:solidFill>
-                <a:latin typeface="+mn-lt"/>
-                <a:ea typeface="+mn-ea"/>
-                <a:cs typeface="+mn-cs"/>
-              </a:rPr>
-              <a:t>amastigote</a:t>
-            </a:r>
-            <a:r>
-              <a:rPr lang="en-US" sz="1200" kern="1200" dirty="0" smtClean="0">
-                <a:solidFill>
-                  <a:schemeClr val="tx1"/>
-                </a:solidFill>
-                <a:latin typeface="+mn-lt"/>
-                <a:ea typeface="+mn-ea"/>
-                <a:cs typeface="+mn-cs"/>
-              </a:rPr>
-              <a:t> is an intracellular form that is found in humans/vertebrate hosts of the parasite, the </a:t>
-            </a:r>
-            <a:r>
-              <a:rPr lang="en-US" sz="1200" kern="1200" dirty="0" err="1" smtClean="0">
-                <a:solidFill>
-                  <a:schemeClr val="tx1"/>
-                </a:solidFill>
-                <a:latin typeface="+mn-lt"/>
-                <a:ea typeface="+mn-ea"/>
-                <a:cs typeface="+mn-cs"/>
-              </a:rPr>
-              <a:t>epimastigote</a:t>
-            </a:r>
-            <a:r>
-              <a:rPr lang="en-US" sz="1200" kern="1200" dirty="0" smtClean="0">
-                <a:solidFill>
-                  <a:schemeClr val="tx1"/>
-                </a:solidFill>
-                <a:latin typeface="+mn-lt"/>
-                <a:ea typeface="+mn-ea"/>
-                <a:cs typeface="+mn-cs"/>
-              </a:rPr>
-              <a:t> is found in the </a:t>
-            </a:r>
-            <a:r>
-              <a:rPr lang="en-US" sz="1200" kern="1200" dirty="0" err="1" smtClean="0">
-                <a:solidFill>
-                  <a:schemeClr val="tx1"/>
-                </a:solidFill>
-                <a:latin typeface="+mn-lt"/>
-                <a:ea typeface="+mn-ea"/>
-                <a:cs typeface="+mn-cs"/>
-              </a:rPr>
-              <a:t>midgut</a:t>
-            </a:r>
-            <a:r>
-              <a:rPr lang="en-US" sz="1200" kern="1200" dirty="0" smtClean="0">
-                <a:solidFill>
-                  <a:schemeClr val="tx1"/>
-                </a:solidFill>
-                <a:latin typeface="+mn-lt"/>
-                <a:ea typeface="+mn-ea"/>
-                <a:cs typeface="+mn-cs"/>
-              </a:rPr>
-              <a:t> of an insect vector and the </a:t>
-            </a:r>
-            <a:r>
-              <a:rPr lang="en-US" sz="1200" kern="1200" dirty="0" err="1" smtClean="0">
-                <a:solidFill>
-                  <a:schemeClr val="tx1"/>
-                </a:solidFill>
-                <a:latin typeface="+mn-lt"/>
-                <a:ea typeface="+mn-ea"/>
-                <a:cs typeface="+mn-cs"/>
-              </a:rPr>
-              <a:t>trypomastigote</a:t>
-            </a:r>
-            <a:r>
-              <a:rPr lang="en-US" sz="1200" kern="1200" dirty="0" smtClean="0">
-                <a:solidFill>
-                  <a:schemeClr val="tx1"/>
-                </a:solidFill>
-                <a:latin typeface="+mn-lt"/>
-                <a:ea typeface="+mn-ea"/>
-                <a:cs typeface="+mn-cs"/>
-              </a:rPr>
-              <a:t> is found in the bloodstream of a vertebrate host.  Further, the similar lifecycle stage in different organisms may have different locations and vectors.  For example, the </a:t>
-            </a:r>
-            <a:r>
-              <a:rPr lang="en-US" sz="1200" kern="1200" dirty="0" err="1" smtClean="0">
-                <a:solidFill>
-                  <a:schemeClr val="tx1"/>
-                </a:solidFill>
-                <a:latin typeface="+mn-lt"/>
-                <a:ea typeface="+mn-ea"/>
-                <a:cs typeface="+mn-cs"/>
-              </a:rPr>
-              <a:t>epimastigote</a:t>
-            </a:r>
-            <a:r>
-              <a:rPr lang="en-US" sz="1200" kern="1200" dirty="0" smtClean="0">
-                <a:solidFill>
-                  <a:schemeClr val="tx1"/>
-                </a:solidFill>
-                <a:latin typeface="+mn-lt"/>
-                <a:ea typeface="+mn-ea"/>
-                <a:cs typeface="+mn-cs"/>
-              </a:rPr>
-              <a:t> stage of </a:t>
-            </a:r>
-            <a:r>
-              <a:rPr lang="en-US" sz="1200" i="1" kern="1200" dirty="0" smtClean="0">
-                <a:solidFill>
-                  <a:schemeClr val="tx1"/>
-                </a:solidFill>
-                <a:latin typeface="+mn-lt"/>
-                <a:ea typeface="+mn-ea"/>
-                <a:cs typeface="+mn-cs"/>
-              </a:rPr>
-              <a:t>T. </a:t>
-            </a:r>
-            <a:r>
-              <a:rPr lang="en-US" sz="1200" i="1" kern="1200" dirty="0" err="1" smtClean="0">
-                <a:solidFill>
-                  <a:schemeClr val="tx1"/>
-                </a:solidFill>
-                <a:latin typeface="+mn-lt"/>
-                <a:ea typeface="+mn-ea"/>
-                <a:cs typeface="+mn-cs"/>
-              </a:rPr>
-              <a:t>cruzi</a:t>
-            </a:r>
-            <a:r>
-              <a:rPr lang="en-US" sz="1200" kern="1200" dirty="0" smtClean="0">
-                <a:solidFill>
-                  <a:schemeClr val="tx1"/>
-                </a:solidFill>
-                <a:latin typeface="+mn-lt"/>
-                <a:ea typeface="+mn-ea"/>
-                <a:cs typeface="+mn-cs"/>
-              </a:rPr>
-              <a:t> occurs in the </a:t>
-            </a:r>
-            <a:r>
-              <a:rPr lang="en-US" sz="1200" kern="1200" dirty="0" err="1" smtClean="0">
-                <a:solidFill>
-                  <a:schemeClr val="tx1"/>
-                </a:solidFill>
-                <a:latin typeface="+mn-lt"/>
-                <a:ea typeface="+mn-ea"/>
-                <a:cs typeface="+mn-cs"/>
-              </a:rPr>
-              <a:t>midgut</a:t>
-            </a:r>
-            <a:r>
-              <a:rPr lang="en-US" sz="1200" kern="1200" dirty="0" smtClean="0">
-                <a:solidFill>
-                  <a:schemeClr val="tx1"/>
-                </a:solidFill>
-                <a:latin typeface="+mn-lt"/>
-                <a:ea typeface="+mn-ea"/>
-                <a:cs typeface="+mn-cs"/>
-              </a:rPr>
-              <a:t> of the </a:t>
-            </a:r>
-            <a:r>
-              <a:rPr lang="en-US" sz="1200" kern="1200" dirty="0" err="1" smtClean="0">
-                <a:solidFill>
-                  <a:schemeClr val="tx1"/>
-                </a:solidFill>
-                <a:latin typeface="+mn-lt"/>
-                <a:ea typeface="+mn-ea"/>
-                <a:cs typeface="+mn-cs"/>
-              </a:rPr>
-              <a:t>triatomine</a:t>
-            </a:r>
-            <a:r>
-              <a:rPr lang="en-US" sz="1200" kern="1200" dirty="0" smtClean="0">
-                <a:solidFill>
-                  <a:schemeClr val="tx1"/>
-                </a:solidFill>
-                <a:latin typeface="+mn-lt"/>
-                <a:ea typeface="+mn-ea"/>
-                <a:cs typeface="+mn-cs"/>
-              </a:rPr>
-              <a:t> kissing bug, but in </a:t>
-            </a:r>
-            <a:r>
-              <a:rPr lang="en-US" sz="1200" i="1" kern="1200" dirty="0" smtClean="0">
-                <a:solidFill>
-                  <a:schemeClr val="tx1"/>
-                </a:solidFill>
-                <a:latin typeface="+mn-lt"/>
-                <a:ea typeface="+mn-ea"/>
-                <a:cs typeface="+mn-cs"/>
-              </a:rPr>
-              <a:t>T. </a:t>
-            </a:r>
-            <a:r>
-              <a:rPr lang="en-US" sz="1200" i="1" kern="1200" dirty="0" err="1" smtClean="0">
-                <a:solidFill>
-                  <a:schemeClr val="tx1"/>
-                </a:solidFill>
-                <a:latin typeface="+mn-lt"/>
-                <a:ea typeface="+mn-ea"/>
-                <a:cs typeface="+mn-cs"/>
-              </a:rPr>
-              <a:t>brucei</a:t>
-            </a:r>
-            <a:r>
-              <a:rPr lang="en-US" sz="1200" kern="1200" dirty="0" smtClean="0">
-                <a:solidFill>
-                  <a:schemeClr val="tx1"/>
-                </a:solidFill>
-                <a:latin typeface="+mn-lt"/>
-                <a:ea typeface="+mn-ea"/>
-                <a:cs typeface="+mn-cs"/>
-              </a:rPr>
-              <a:t> it occurs in the salivary gland of the tsetse fly, </a:t>
-            </a:r>
-            <a:r>
-              <a:rPr lang="en-US" sz="1200" i="1" kern="1200" dirty="0" err="1" smtClean="0">
-                <a:solidFill>
-                  <a:schemeClr val="tx1"/>
-                </a:solidFill>
-                <a:latin typeface="+mn-lt"/>
-                <a:ea typeface="+mn-ea"/>
-                <a:cs typeface="+mn-cs"/>
-              </a:rPr>
-              <a:t>Glossinamorsitans</a:t>
-            </a:r>
-            <a:r>
-              <a:rPr lang="en-US" sz="1200" kern="1200" dirty="0" smtClean="0">
-                <a:solidFill>
-                  <a:schemeClr val="tx1"/>
-                </a:solidFill>
-                <a:latin typeface="+mn-lt"/>
-                <a:ea typeface="+mn-ea"/>
-                <a:cs typeface="+mn-cs"/>
-              </a:rPr>
-              <a:t>.  </a:t>
-            </a:r>
-          </a:p>
-          <a:p>
-            <a:pPr marL="0" marR="0" indent="0" algn="l" defTabSz="914400" rtl="0" eaLnBrk="1" fontAlgn="base" latinLnBrk="0" hangingPunct="1">
-              <a:lnSpc>
-                <a:spcPct val="100000"/>
-              </a:lnSpc>
-              <a:spcBef>
-                <a:spcPct val="30000"/>
-              </a:spcBef>
-              <a:spcAft>
-                <a:spcPct val="0"/>
-              </a:spcAft>
-              <a:buClrTx/>
-              <a:buSzTx/>
-              <a:buFontTx/>
-              <a:buNone/>
-              <a:tabLst/>
-              <a:defRPr/>
-            </a:pPr>
-            <a:endParaRPr lang="en-US" sz="1200" kern="1200" dirty="0" smtClean="0">
-              <a:solidFill>
-                <a:schemeClr val="tx1"/>
-              </a:solidFill>
-              <a:latin typeface="+mn-lt"/>
-              <a:ea typeface="+mn-ea"/>
-              <a:cs typeface="+mn-cs"/>
-            </a:endParaRPr>
-          </a:p>
-          <a:p>
-            <a:pPr marL="0" marR="0" indent="0" algn="l" defTabSz="914400" rtl="0" eaLnBrk="1" fontAlgn="base" latinLnBrk="0" hangingPunct="1">
-              <a:lnSpc>
-                <a:spcPct val="100000"/>
-              </a:lnSpc>
-              <a:spcBef>
-                <a:spcPct val="30000"/>
-              </a:spcBef>
-              <a:spcAft>
-                <a:spcPct val="0"/>
-              </a:spcAft>
-              <a:buClrTx/>
-              <a:buSzTx/>
-              <a:buFontTx/>
-              <a:buNone/>
-              <a:tabLst/>
-              <a:defRPr/>
-            </a:pPr>
-            <a:endParaRPr lang="en-US" sz="1200" u="none" strike="noStrike" kern="1200" dirty="0" smtClean="0">
-              <a:solidFill>
-                <a:schemeClr val="tx1"/>
-              </a:solidFill>
-              <a:latin typeface="+mn-lt"/>
-              <a:ea typeface="+mn-ea"/>
-              <a:cs typeface="+mn-cs"/>
-            </a:endParaRPr>
-          </a:p>
-        </p:txBody>
-      </p:sp>
-      <p:sp>
-        <p:nvSpPr>
-          <p:cNvPr id="4" name="Slide Number Placeholder 3"/>
-          <p:cNvSpPr>
-            <a:spLocks noGrp="1"/>
-          </p:cNvSpPr>
-          <p:nvPr>
-            <p:ph type="sldNum" sz="quarter" idx="10"/>
-          </p:nvPr>
-        </p:nvSpPr>
-        <p:spPr/>
-        <p:txBody>
-          <a:bodyPr/>
-          <a:lstStyle/>
-          <a:p>
-            <a:pPr>
-              <a:defRPr/>
-            </a:pPr>
-            <a:fld id="{3A96576D-D51A-4E67-8DA5-9A6D61B288F8}" type="slidenum">
-              <a:rPr lang="en-US" smtClean="0"/>
-              <a:pPr>
-                <a:defRPr/>
+              <a:pPr fontAlgn="base">
+                <a:spcBef>
+                  <a:spcPct val="0"/>
+                </a:spcBef>
+                <a:spcAft>
+                  <a:spcPct val="0"/>
+                </a:spcAft>
               </a:pPr>
               <a:t>18</a:t>
             </a:fld>
-            <a:endParaRPr lang="en-US"/>
-          </a:p>
-        </p:txBody>
-      </p:sp>
-    </p:spTree>
-  </p:cSld>
-  <p:clrMapOvr>
-    <a:masterClrMapping/>
-  </p:clrMapOvr>
-</p:notes>
-</file>
-
-<file path=ppt/notesSlides/notesSlide9.xml><?xml version="1.0" encoding="utf-8"?>
-<p:notes xmlns:a="http://schemas.openxmlformats.org/drawingml/2006/main" xmlns:r="http://schemas.openxmlformats.org/officeDocument/2006/relationships" xmlns:p="http://schemas.openxmlformats.org/presentationml/2006/main">
-  <p:cSld>
-    <p:spTree>
-      <p:nvGrpSpPr>
-        <p:cNvPr id="1" name=""/>
-        <p:cNvGrpSpPr/>
-        <p:nvPr/>
-      </p:nvGrpSpPr>
-      <p:grpSpPr>
-        <a:xfrm>
-          <a:off x="0" y="0"/>
-          <a:ext cx="0" cy="0"/>
-          <a:chOff x="0" y="0"/>
-          <a:chExt cx="0" cy="0"/>
-        </a:xfrm>
-      </p:grpSpPr>
-      <p:sp>
-        <p:nvSpPr>
-          <p:cNvPr id="2" name="Slide Image Placeholder 1"/>
-          <p:cNvSpPr>
-            <a:spLocks noGrp="1" noRot="1" noChangeAspect="1"/>
-          </p:cNvSpPr>
-          <p:nvPr>
-            <p:ph type="sldImg"/>
-          </p:nvPr>
-        </p:nvSpPr>
-        <p:spPr/>
-      </p:sp>
-      <p:sp>
-        <p:nvSpPr>
-          <p:cNvPr id="3" name="Notes Placeholder 2"/>
-          <p:cNvSpPr>
-            <a:spLocks noGrp="1"/>
-          </p:cNvSpPr>
-          <p:nvPr>
-            <p:ph type="body" idx="1"/>
-          </p:nvPr>
-        </p:nvSpPr>
-        <p:spPr/>
-        <p:txBody>
-          <a:bodyPr>
-            <a:normAutofit/>
-          </a:bodyPr>
-          <a:lstStyle/>
-          <a:p>
-            <a:r>
-              <a:rPr lang="en-US" dirty="0" smtClean="0"/>
-              <a:t>Around</a:t>
-            </a:r>
-            <a:r>
-              <a:rPr lang="en-US" baseline="0" dirty="0" smtClean="0"/>
-              <a:t> 300 terms, parasite lifecycle stage, where it takes place, vector and host of specific parasite, etc.</a:t>
-            </a:r>
-            <a:endParaRPr lang="en-US" dirty="0"/>
-          </a:p>
-        </p:txBody>
-      </p:sp>
-      <p:sp>
-        <p:nvSpPr>
-          <p:cNvPr id="4" name="Slide Number Placeholder 3"/>
-          <p:cNvSpPr>
-            <a:spLocks noGrp="1"/>
-          </p:cNvSpPr>
-          <p:nvPr>
-            <p:ph type="sldNum" sz="quarter" idx="10"/>
-          </p:nvPr>
-        </p:nvSpPr>
-        <p:spPr/>
-        <p:txBody>
-          <a:bodyPr/>
-          <a:lstStyle/>
-          <a:p>
-            <a:pPr>
-              <a:defRPr/>
-            </a:pPr>
-            <a:fld id="{3A96576D-D51A-4E67-8DA5-9A6D61B288F8}" type="slidenum">
-              <a:rPr lang="en-US" smtClean="0"/>
-              <a:pPr>
-                <a:defRPr/>
-              </a:pPr>
-              <a:t>19</a:t>
-            </a:fld>
-            <a:endParaRPr lang="en-US"/>
+            <a:endParaRPr lang="en-US">
+              <a:cs typeface="Arial" pitchFamily="34" charset="0"/>
+            </a:endParaRPr>
           </a:p>
         </p:txBody>
       </p:sp>
@@ -10955,6 +9749,9 @@
             <a:off x="152400" y="5867400"/>
             <a:ext cx="8229600" cy="838200"/>
           </a:xfrm>
+          <a:solidFill>
+            <a:srgbClr val="0070C0"/>
+          </a:solidFill>
         </p:spPr>
         <p:txBody>
           <a:bodyPr/>
@@ -10974,24 +9771,33 @@
           <a:p>
             <a:r>
               <a:rPr lang="en-US" sz="2000" dirty="0" smtClean="0">
+                <a:solidFill>
+                  <a:schemeClr val="bg1">
+                    <a:lumMod val="95000"/>
+                  </a:schemeClr>
+                </a:solidFill>
                 <a:latin typeface="Century Schoolbook" pitchFamily="18" charset="0"/>
               </a:rPr>
-              <a:t>Support </a:t>
-            </a:r>
-            <a:r>
-              <a:rPr lang="en-US" sz="2000" dirty="0" smtClean="0">
-                <a:latin typeface="Century Schoolbook" pitchFamily="18" charset="0"/>
-              </a:rPr>
-              <a:t>multiple sequences submission to </a:t>
+              <a:t>Support multiple sequences submission to </a:t>
             </a:r>
             <a:r>
               <a:rPr lang="en-US" sz="2000" dirty="0" err="1" smtClean="0">
+                <a:solidFill>
+                  <a:schemeClr val="bg1">
+                    <a:lumMod val="95000"/>
+                  </a:schemeClr>
+                </a:solidFill>
                 <a:latin typeface="Century Schoolbook" pitchFamily="18" charset="0"/>
               </a:rPr>
               <a:t>GenBank</a:t>
             </a:r>
             <a:r>
               <a:rPr lang="en-US" sz="2000" dirty="0" smtClean="0">
+                <a:solidFill>
+                  <a:schemeClr val="bg1">
+                    <a:lumMod val="95000"/>
+                  </a:schemeClr>
+                </a:solidFill>
                 <a:latin typeface="Century Schoolbook" pitchFamily="18" charset="0"/>
               </a:rPr>
               <a:t> with a parser</a:t>
@@ -11432,30 +10238,20 @@
           <a:p>
             <a:r>
               <a:rPr lang="en-US" dirty="0" smtClean="0"/>
-              <a:t>Example:</a:t>
+              <a:t>Example</a:t>
+            </a:r>
+            <a:r>
+              <a:rPr lang="en-US" dirty="0" smtClean="0"/>
+              <a:t>:</a:t>
             </a:r>
           </a:p>
           <a:p>
             <a:pPr lvl="1"/>
             <a:r>
               <a:rPr lang="en-US" dirty="0" smtClean="0"/>
-              <a:t>Ontology for Parasite Lifecycle (OPL) used in the annotation of Gene Manipulation and Phenotype Data</a:t>
-            </a:r>
-          </a:p>
-          <a:p>
-            <a:pPr lvl="2"/>
-            <a:r>
-              <a:rPr lang="en-US" dirty="0" smtClean="0"/>
-              <a:t>Project with Omar </a:t>
-            </a:r>
-            <a:r>
-              <a:rPr lang="en-US" dirty="0" err="1" smtClean="0"/>
-              <a:t>Harb</a:t>
-            </a:r>
-            <a:r>
-              <a:rPr lang="en-US" dirty="0" smtClean="0"/>
-              <a:t> and Chris Stoeckert</a:t>
-            </a:r>
+              <a:t>Assay</a:t>
+            </a:r>
+            <a:endParaRPr lang="en-US" dirty="0" smtClean="0"/>
           </a:p>
         </p:txBody>
       </p:sp>
@@ -11530,163 +10326,22 @@
             <p:ph type="title"/>
           </p:nvPr>
         </p:nvSpPr>
-        <p:spPr>
-          <a:xfrm>
-            <a:off x="76200" y="304800"/>
-            <a:ext cx="8763000" cy="715963"/>
-          </a:xfrm>
-        </p:spPr>
-        <p:txBody>
-          <a:bodyPr wrap="square" lIns="91440" tIns="45720" rIns="91440" bIns="45720" numCol="1" anchorCtr="0" compatLnSpc="1">
-            <a:prstTxWarp prst="textNoShape">
-              <a:avLst/>
-            </a:prstTxWarp>
-            <a:normAutofit fontScale="90000"/>
-          </a:bodyPr>
-          <a:lstStyle/>
-          <a:p>
-            <a:r>
-              <a:rPr lang="en-US" smtClean="0">
-                <a:solidFill>
-                  <a:srgbClr val="595959"/>
-                </a:solidFill>
-                <a:latin typeface="Helvetica"/>
-              </a:rPr>
-              <a:t>Genetic Manipulation and Phenotype Submission Form</a:t>
-            </a:r>
-          </a:p>
-        </p:txBody>
-      </p:sp>
-      <p:sp>
-        <p:nvSpPr>
-          <p:cNvPr id="60418" name="Content Placeholder 2"/>
-          <p:cNvSpPr>
-            <a:spLocks noGrp="1"/>
-          </p:cNvSpPr>
-          <p:nvPr>
-            <p:ph sz="quarter" idx="1"/>
-          </p:nvPr>
-        </p:nvSpPr>
-        <p:spPr>
-          <a:xfrm>
-            <a:off x="457200" y="1143000"/>
-            <a:ext cx="7467600" cy="5330825"/>
-          </a:xfrm>
-        </p:spPr>
+        <p:spPr/>
         <p:txBody>
           <a:bodyPr/>
           <a:lstStyle/>
           <a:p>
             <a:r>
-              <a:rPr lang="en-US" dirty="0" smtClean="0">
-                <a:latin typeface="Century Schoolbook" pitchFamily="18" charset="0"/>
-              </a:rPr>
-              <a:t>Genetic Manipulation </a:t>
-            </a:r>
-          </a:p>
-          <a:p>
-            <a:pPr lvl="1"/>
-            <a:r>
-              <a:rPr lang="en-US" dirty="0" smtClean="0">
-                <a:latin typeface="Century Schoolbook" pitchFamily="18" charset="0"/>
-              </a:rPr>
-              <a:t>Mutation method</a:t>
-            </a:r>
-          </a:p>
-          <a:p>
-            <a:pPr lvl="1"/>
-            <a:r>
-              <a:rPr lang="en-US" dirty="0" smtClean="0">
-                <a:latin typeface="Century Schoolbook" pitchFamily="18" charset="0"/>
-              </a:rPr>
-              <a:t>Mutation type (effect on gene function)</a:t>
-            </a:r>
-          </a:p>
-          <a:p>
-            <a:r>
-              <a:rPr lang="en-US" dirty="0" smtClean="0">
-                <a:latin typeface="Century Schoolbook" pitchFamily="18" charset="0"/>
-              </a:rPr>
-              <a:t>Phenotype data – impact of genetic manipulation on four possible observed features:</a:t>
-            </a:r>
-          </a:p>
-          <a:p>
-            <a:pPr lvl="1"/>
-            <a:r>
-              <a:rPr lang="en-US" dirty="0" smtClean="0">
-                <a:latin typeface="Century Schoolbook" pitchFamily="18" charset="0"/>
-              </a:rPr>
-              <a:t>Quality of the organism</a:t>
-            </a:r>
-          </a:p>
-          <a:p>
-            <a:pPr lvl="1"/>
-            <a:r>
-              <a:rPr lang="en-US" dirty="0" smtClean="0">
-                <a:latin typeface="Century Schoolbook" pitchFamily="18" charset="0"/>
-              </a:rPr>
-              <a:t>Cellular location of gene product</a:t>
-            </a:r>
-          </a:p>
-          <a:p>
-            <a:pPr lvl="1"/>
-            <a:r>
-              <a:rPr lang="en-US" dirty="0" smtClean="0">
-                <a:latin typeface="Century Schoolbook" pitchFamily="18" charset="0"/>
-              </a:rPr>
-              <a:t>Molecular function of gene product</a:t>
-            </a:r>
-          </a:p>
-          <a:p>
-            <a:pPr lvl="1"/>
-            <a:r>
-              <a:rPr lang="en-US" dirty="0" smtClean="0">
-                <a:latin typeface="Century Schoolbook" pitchFamily="18" charset="0"/>
-              </a:rPr>
-              <a:t>Biological process of gene product </a:t>
-            </a:r>
-          </a:p>
-          <a:p>
-            <a:r>
-              <a:rPr lang="en-US" dirty="0" smtClean="0">
-                <a:latin typeface="Century Schoolbook" pitchFamily="18" charset="0"/>
-              </a:rPr>
-              <a:t>Lifecycle stage: phenotype observed generally associated with a specific parasite lifecycle stage</a:t>
-            </a:r>
-          </a:p>
-          <a:p>
-            <a:pPr>
-              <a:buNone/>
-            </a:pPr>
-            <a:r>
-              <a:rPr lang="en-US" dirty="0" smtClean="0">
-                <a:latin typeface="Century Schoolbook" pitchFamily="18" charset="0"/>
-              </a:rPr>
-              <a:t>	(</a:t>
-            </a:r>
-            <a:r>
-              <a:rPr lang="en-US" dirty="0" err="1" smtClean="0">
-                <a:latin typeface="Century Schoolbook" pitchFamily="18" charset="0"/>
-              </a:rPr>
-              <a:t>eg</a:t>
-            </a:r>
-            <a:r>
-              <a:rPr lang="en-US" dirty="0" smtClean="0">
-                <a:latin typeface="Century Schoolbook" pitchFamily="18" charset="0"/>
-              </a:rPr>
-              <a:t>. lethal during bloodstream stage)</a:t>
-            </a:r>
-          </a:p>
-          <a:p>
-            <a:endParaRPr lang="en-US" dirty="0" smtClean="0">
-              <a:latin typeface="Century Schoolbook" pitchFamily="18" charset="0"/>
-            </a:endParaRPr>
-          </a:p>
-        </p:txBody>
-      </p:sp>
-      <p:sp>
-        <p:nvSpPr>
-          <p:cNvPr id="60419" name="Slide Number Placeholder 3"/>
+              <a:rPr lang="en-US" dirty="0" smtClean="0"/>
+              <a:t>Examples: Assay</a:t>
+            </a:r>
+            <a:endParaRPr lang="en-US" dirty="0"/>
+          </a:p>
+        </p:txBody>
+      </p:sp>
+      <p:sp>
+        <p:nvSpPr>
+          <p:cNvPr id="4" name="Slide Number Placeholder 3"/>
           <p:cNvSpPr>
             <a:spLocks noGrp="1"/>
           </p:cNvSpPr>
@@ -11694,49 +10349,191 @@
             <p:ph type="sldNum" sz="quarter" idx="11"/>
           </p:nvPr>
         </p:nvSpPr>
+        <p:spPr/>
+        <p:txBody>
+          <a:bodyPr/>
+          <a:lstStyle/>
+          <a:p>
+            <a:pPr>
+              <a:defRPr/>
+            </a:pPr>
+            <a:fld id="{C6587C3C-6210-43A2-897D-BAD9F5F0EE9E}" type="slidenum">
+              <a:rPr lang="en-US" smtClean="0"/>
+              <a:pPr>
+                <a:defRPr/>
+              </a:pPr>
+              <a:t>17</a:t>
+            </a:fld>
+            <a:endParaRPr lang="en-US"/>
+          </a:p>
+        </p:txBody>
+      </p:sp>
+      <p:pic>
+        <p:nvPicPr>
+          <p:cNvPr id="136194" name="Picture 2"/>
+          <p:cNvPicPr>
+            <a:picLocks noGrp="1" noChangeAspect="1" noChangeArrowheads="1"/>
+          </p:cNvPicPr>
+          <p:nvPr>
+            <p:ph sz="quarter" idx="1"/>
+          </p:nvPr>
+        </p:nvPicPr>
+        <p:blipFill>
+          <a:blip r:embed="rId2"/>
+          <a:srcRect/>
+          <a:stretch>
+            <a:fillRect/>
+          </a:stretch>
+        </p:blipFill>
         <p:spPr bwMode="auto">
+          <a:xfrm>
+            <a:off x="533400" y="3276600"/>
+            <a:ext cx="3152775" cy="3095625"/>
+          </a:xfrm>
+          <a:prstGeom prst="rect">
+            <a:avLst/>
+          </a:prstGeom>
           <a:noFill/>
-          <a:ln>
+          <a:ln w="9525">
+            <a:noFill/>
             <a:miter lim="800000"/>
             <a:headEnd/>
             <a:tailEnd/>
           </a:ln>
-        </p:spPr>
-        <p:txBody>
-          <a:bodyPr wrap="square" lIns="91440" tIns="45720" rIns="91440" bIns="45720" numCol="1" anchorCtr="0" compatLnSpc="1">
-            <a:prstTxWarp prst="textNoShape">
-              <a:avLst/>
-            </a:prstTxWarp>
+          <a:effectLst/>
+        </p:spPr>
+      </p:pic>
+      <p:pic>
+        <p:nvPicPr>
+          <p:cNvPr id="136195" name="Picture 3"/>
+          <p:cNvPicPr>
+            <a:picLocks noChangeAspect="1" noChangeArrowheads="1"/>
+          </p:cNvPicPr>
+          <p:nvPr/>
+        </p:nvPicPr>
+        <p:blipFill>
+          <a:blip r:embed="rId3"/>
+          <a:srcRect/>
+          <a:stretch>
+            <a:fillRect/>
+          </a:stretch>
+        </p:blipFill>
+        <p:spPr bwMode="auto">
+          <a:xfrm>
+            <a:off x="4267200" y="2028825"/>
+            <a:ext cx="4057650" cy="4676775"/>
+          </a:xfrm>
+          <a:prstGeom prst="rect">
+            <a:avLst/>
+          </a:prstGeom>
+          <a:noFill/>
+          <a:ln w="9525">
+            <a:noFill/>
+            <a:miter lim="800000"/>
+            <a:headEnd/>
+            <a:tailEnd/>
+          </a:ln>
+          <a:effectLst/>
+        </p:spPr>
+      </p:pic>
+      <p:sp>
+        <p:nvSpPr>
+          <p:cNvPr id="7" name="TextBox 6"/>
+          <p:cNvSpPr txBox="1"/>
+          <p:nvPr/>
+        </p:nvSpPr>
+        <p:spPr>
+          <a:xfrm>
+            <a:off x="533400" y="1447800"/>
+            <a:ext cx="2800831" cy="923330"/>
+          </a:xfrm>
+          <a:prstGeom prst="rect">
+            <a:avLst/>
+          </a:prstGeom>
+          <a:noFill/>
+        </p:spPr>
+        <p:txBody>
+          <a:bodyPr wrap="none" rtlCol="0">
+            <a:spAutoFit/>
           </a:bodyPr>
           <a:lstStyle/>
           <a:p>
-            <a:pPr fontAlgn="base">
-              <a:spcBef>
-                <a:spcPct val="0"/>
-              </a:spcBef>
-              <a:spcAft>
-                <a:spcPct val="0"/>
-              </a:spcAft>
-            </a:pPr>
-            <a:fld id="{E30609C8-3460-4A5A-8F4B-77DEB4666211}" type="slidenum">
-              <a:rPr lang="en-US">
-                <a:latin typeface="Century Schoolbook" pitchFamily="18" charset="0"/>
-                <a:cs typeface="Arial" pitchFamily="34" charset="0"/>
-              </a:rPr>
-              <a:pPr fontAlgn="base">
-                <a:spcBef>
-                  <a:spcPct val="0"/>
-                </a:spcBef>
-                <a:spcAft>
-                  <a:spcPct val="0"/>
-                </a:spcAft>
-              </a:pPr>
-              <a:t>17</a:t>
-            </a:fld>
-            <a:endParaRPr lang="en-US">
-              <a:latin typeface="Century Schoolbook" pitchFamily="18" charset="0"/>
-              <a:cs typeface="Arial" pitchFamily="34" charset="0"/>
-            </a:endParaRPr>
+            <a:r>
+              <a:rPr lang="en-US" dirty="0" smtClean="0"/>
+              <a:t>OBI – 3433 classes</a:t>
+            </a:r>
+          </a:p>
+          <a:p>
+            <a:r>
+              <a:rPr lang="en-US" dirty="0" smtClean="0"/>
+              <a:t>OBI: Assay – 351 classes</a:t>
+            </a:r>
+          </a:p>
+          <a:p>
+            <a:r>
+              <a:rPr lang="en-US" dirty="0" smtClean="0"/>
+              <a:t>DNA related OBI – 14</a:t>
+            </a:r>
+          </a:p>
+        </p:txBody>
+      </p:sp>
+      <p:sp>
+        <p:nvSpPr>
+          <p:cNvPr id="8" name="TextBox 7"/>
+          <p:cNvSpPr txBox="1"/>
+          <p:nvPr/>
+        </p:nvSpPr>
+        <p:spPr>
+          <a:xfrm>
+            <a:off x="1524000" y="2895600"/>
+            <a:ext cx="813043" cy="369332"/>
+          </a:xfrm>
+          <a:prstGeom prst="rect">
+            <a:avLst/>
+          </a:prstGeom>
+          <a:noFill/>
+        </p:spPr>
+        <p:txBody>
+          <a:bodyPr wrap="none" rtlCol="0">
+            <a:spAutoFit/>
+          </a:bodyPr>
+          <a:lstStyle/>
+          <a:p>
+            <a:r>
+              <a:rPr lang="en-US" dirty="0" smtClean="0"/>
+              <a:t>Assay</a:t>
+            </a:r>
+            <a:endParaRPr lang="en-US" dirty="0"/>
+          </a:p>
+        </p:txBody>
+      </p:sp>
+      <p:sp>
+        <p:nvSpPr>
+          <p:cNvPr id="9" name="TextBox 8"/>
+          <p:cNvSpPr txBox="1"/>
+          <p:nvPr/>
+        </p:nvSpPr>
+        <p:spPr>
+          <a:xfrm>
+            <a:off x="5029200" y="1600200"/>
+            <a:ext cx="2544286" cy="369332"/>
+          </a:xfrm>
+          <a:prstGeom prst="rect">
+            <a:avLst/>
+          </a:prstGeom>
+          <a:noFill/>
+        </p:spPr>
+        <p:txBody>
+          <a:bodyPr wrap="none" rtlCol="0">
+            <a:spAutoFit/>
+          </a:bodyPr>
+          <a:lstStyle/>
+          <a:p>
+            <a:r>
+              <a:rPr lang="en-US" dirty="0" smtClean="0"/>
+              <a:t>Assay with input - DNA</a:t>
+            </a:r>
+            <a:endParaRPr lang="en-US" dirty="0"/>
           </a:p>
         </p:txBody>
       </p:sp>
@@ -11745,13 +10542,6 @@
   <p:clrMapOvr>
     <a:masterClrMapping/>
   </p:clrMapOvr>
-  <p:timing>
-    <p:tnLst>
-      <p:par>
-        <p:cTn id="1" dur="indefinite" restart="never" nodeType="tmRoot"/>
-      </p:par>
-    </p:tnLst>
-  </p:timing>
 </p:sld>
 </file>
 
@@ -11772,32 +10562,6 @@
           <a:chExt cx="0" cy="0"/>
         </a:xfrm>
       </p:grpSpPr>
-      <p:pic>
-        <p:nvPicPr>
-          <p:cNvPr id="12" name="Picture 12" descr="http://wiki.knoesis.org/images/0/0a/Trypanosoma_cruzi.gif"/>
-          <p:cNvPicPr>
-            <a:picLocks noChangeAspect="1" noChangeArrowheads="1"/>
-          </p:cNvPicPr>
-          <p:nvPr/>
-        </p:nvPicPr>
-        <p:blipFill>
-          <a:blip r:embed="rId3"/>
-          <a:srcRect/>
-          <a:stretch>
-            <a:fillRect/>
-          </a:stretch>
-        </p:blipFill>
-        <p:spPr bwMode="auto">
-          <a:xfrm>
-            <a:off x="4419600" y="2559050"/>
-            <a:ext cx="4343400" cy="3308350"/>
-          </a:xfrm>
-          <a:prstGeom prst="rect">
-            <a:avLst/>
-          </a:prstGeom>
-          <a:noFill/>
-        </p:spPr>
-      </p:pic>
       <p:sp>
         <p:nvSpPr>
           <p:cNvPr id="2" name="Title 1"/>
@@ -11810,14 +10574,18 @@
         </p:nvSpPr>
         <p:spPr/>
         <p:txBody>
-          <a:bodyPr>
-            <a:normAutofit/>
-          </a:bodyPr>
+          <a:bodyPr/>
           <a:lstStyle/>
           <a:p>
+            <a:pPr fontAlgn="auto">
+              <a:spcAft>
+                <a:spcPts val="0"/>
+              </a:spcAft>
+              <a:defRPr/>
+            </a:pPr>
             <a:r>
               <a:rPr lang="en-US" dirty="0" smtClean="0"/>
-              <a:t>Parasite Lifecycle Stage</a:t>
+              <a:t>Summary – lessons from this use case</a:t>
             </a:r>
             <a:endParaRPr lang="en-US" dirty="0"/>
           </a:p>
@@ -11825,7 +10593,7 @@
       </p:sp>
       <p:sp>
         <p:nvSpPr>
-          <p:cNvPr id="3" name="Content Placeholder 2"/>
+          <p:cNvPr id="26626" name="Content Placeholder 2"/>
           <p:cNvSpPr>
             <a:spLocks noGrp="1"/>
           </p:cNvSpPr>
@@ -11833,62 +10601,107 @@
             <p:ph sz="quarter" idx="1"/>
           </p:nvPr>
         </p:nvSpPr>
-        <p:spPr/>
+        <p:spPr>
+          <a:xfrm>
+            <a:off x="457200" y="1143000"/>
+            <a:ext cx="7467600" cy="5330825"/>
+          </a:xfrm>
+        </p:spPr>
         <p:txBody>
           <a:bodyPr/>
           <a:lstStyle/>
           <a:p>
             <a:r>
-              <a:rPr lang="en-US" sz="1800" dirty="0" smtClean="0"/>
-              <a:t>Complexity – parasites may have multiple hosts and lifecycle stages which differ between parasite species</a:t>
-            </a:r>
-          </a:p>
-          <a:p>
-            <a:r>
-              <a:rPr lang="en-US" sz="1800" dirty="0" smtClean="0"/>
-              <a:t>Example: </a:t>
-            </a:r>
-            <a:r>
-              <a:rPr lang="en-US" sz="1800" i="1" dirty="0" err="1" smtClean="0"/>
-              <a:t>Trypanosomabrucei</a:t>
-            </a:r>
-            <a:r>
-              <a:rPr lang="en-US" sz="1800" dirty="0" smtClean="0"/>
-              <a:t>(causes African sleeping sickness), </a:t>
-            </a:r>
-            <a:r>
-              <a:rPr lang="en-US" sz="1800" i="1" dirty="0" err="1" smtClean="0"/>
-              <a:t>Trypanosoma</a:t>
-            </a:r>
-            <a:r>
-              <a:rPr lang="en-US" sz="1800" i="1" dirty="0" smtClean="0"/>
-              <a:t> </a:t>
-            </a:r>
-            <a:r>
-              <a:rPr lang="en-US" sz="1800" i="1" dirty="0" err="1" smtClean="0"/>
-              <a:t>cruzi</a:t>
-            </a:r>
-            <a:r>
-              <a:rPr lang="en-US" sz="1800" dirty="0" smtClean="0"/>
-              <a:t> (causes </a:t>
-            </a:r>
-            <a:r>
-              <a:rPr lang="en-US" sz="1800" dirty="0" err="1" smtClean="0"/>
-              <a:t>Chagas</a:t>
-            </a:r>
-            <a:r>
-              <a:rPr lang="en-US" sz="1800" dirty="0" smtClean="0"/>
-              <a:t> disease) </a:t>
-            </a:r>
-          </a:p>
-          <a:p>
-            <a:endParaRPr lang="en-US" dirty="0"/>
-          </a:p>
-        </p:txBody>
-      </p:sp>
-      <p:sp>
-        <p:nvSpPr>
-          <p:cNvPr id="4" name="Slide Number Placeholder 3"/>
+              <a:rPr lang="en-US" sz="2800" dirty="0" smtClean="0">
+                <a:latin typeface="Century Schoolbook" pitchFamily="18" charset="0"/>
+              </a:rPr>
+              <a:t>How to design a data collection form based on an ontology model </a:t>
+            </a:r>
+          </a:p>
+          <a:p>
+            <a:r>
+              <a:rPr lang="en-US" sz="2800" dirty="0" smtClean="0">
+                <a:latin typeface="Century Schoolbook" pitchFamily="18" charset="0"/>
+              </a:rPr>
+              <a:t>How to choose </a:t>
+            </a:r>
+            <a:r>
+              <a:rPr lang="en-US" sz="2800" dirty="0" err="1" smtClean="0">
+                <a:latin typeface="Century Schoolbook" pitchFamily="18" charset="0"/>
+              </a:rPr>
+              <a:t>ontologies</a:t>
+            </a:r>
+            <a:r>
+              <a:rPr lang="en-US" sz="2800" dirty="0" smtClean="0">
+                <a:latin typeface="Century Schoolbook" pitchFamily="18" charset="0"/>
+              </a:rPr>
+              <a:t> to be used for annotations collected in the </a:t>
+            </a:r>
+            <a:r>
+              <a:rPr lang="en-US" sz="2800" dirty="0" smtClean="0">
+                <a:latin typeface="Century Schoolbook" pitchFamily="18" charset="0"/>
+              </a:rPr>
+              <a:t>forms</a:t>
+            </a:r>
+          </a:p>
+          <a:p>
+            <a:r>
+              <a:rPr lang="en-US" sz="2800" dirty="0" smtClean="0">
+                <a:latin typeface="Century Schoolbook" pitchFamily="18" charset="0"/>
+              </a:rPr>
+              <a:t>Reduce </a:t>
+            </a:r>
+            <a:r>
+              <a:rPr lang="en-US" sz="2800" dirty="0" smtClean="0">
+                <a:latin typeface="Century Schoolbook" pitchFamily="18" charset="0"/>
+              </a:rPr>
+              <a:t>user’s efforts </a:t>
+            </a:r>
+            <a:r>
+              <a:rPr lang="en-US" sz="2800" dirty="0" smtClean="0">
+                <a:latin typeface="Century Schoolbook" pitchFamily="18" charset="0"/>
+              </a:rPr>
+              <a:t>in </a:t>
+            </a:r>
+            <a:r>
+              <a:rPr lang="en-US" sz="2800" dirty="0" smtClean="0">
+                <a:latin typeface="Century Schoolbook" pitchFamily="18" charset="0"/>
+              </a:rPr>
+              <a:t>finding ontology terms for annotation </a:t>
+            </a:r>
+            <a:r>
+              <a:rPr lang="en-US" sz="2800" dirty="0" smtClean="0">
+                <a:latin typeface="Century Schoolbook" pitchFamily="18" charset="0"/>
+              </a:rPr>
+              <a:t>using </a:t>
+            </a:r>
+            <a:r>
+              <a:rPr lang="en-US" sz="2800" dirty="0" smtClean="0">
+                <a:latin typeface="Century Schoolbook" pitchFamily="18" charset="0"/>
+              </a:rPr>
+              <a:t>restrictions defined </a:t>
+            </a:r>
+            <a:r>
+              <a:rPr lang="en-US" sz="2800" dirty="0" smtClean="0">
+                <a:latin typeface="Century Schoolbook" pitchFamily="18" charset="0"/>
+              </a:rPr>
+              <a:t>in </a:t>
+            </a:r>
+            <a:r>
+              <a:rPr lang="en-US" sz="2800" dirty="0" smtClean="0">
+                <a:latin typeface="Century Schoolbook" pitchFamily="18" charset="0"/>
+              </a:rPr>
+              <a:t>the ontology</a:t>
+            </a:r>
+            <a:endParaRPr lang="en-US" sz="2800" dirty="0" smtClean="0">
+              <a:latin typeface="Century Schoolbook" pitchFamily="18" charset="0"/>
+            </a:endParaRPr>
+          </a:p>
+        </p:txBody>
+      </p:sp>
+      <p:sp>
+        <p:nvSpPr>
+          <p:cNvPr id="26627" name="Slide Number Placeholder 3"/>
           <p:cNvSpPr>
             <a:spLocks noGrp="1"/>
           </p:cNvSpPr>
@@ -11896,330 +10709,49 @@
             <p:ph type="sldNum" sz="quarter" idx="11"/>
           </p:nvPr>
         </p:nvSpPr>
-        <p:spPr/>
-        <p:txBody>
-          <a:bodyPr/>
-          <a:lstStyle/>
-          <a:p>
-            <a:pPr>
-              <a:defRPr/>
-            </a:pPr>
-            <a:fld id="{C6587C3C-6210-43A2-897D-BAD9F5F0EE9E}" type="slidenum">
-              <a:rPr lang="en-US" smtClean="0"/>
-              <a:pPr>
-                <a:defRPr/>
-              </a:pPr>
-              <a:t>18</a:t>
-            </a:fld>
-            <a:endParaRPr lang="en-US"/>
-          </a:p>
-        </p:txBody>
-      </p:sp>
-      <p:grpSp>
-        <p:nvGrpSpPr>
-          <p:cNvPr id="19" name="Group 18"/>
-          <p:cNvGrpSpPr/>
-          <p:nvPr/>
-        </p:nvGrpSpPr>
-        <p:grpSpPr>
-          <a:xfrm>
-            <a:off x="152400" y="2635250"/>
-            <a:ext cx="4038600" cy="3124200"/>
-            <a:chOff x="1066800" y="2181225"/>
-            <a:chExt cx="5715000" cy="4143375"/>
-          </a:xfrm>
-        </p:grpSpPr>
-        <p:pic>
-          <p:nvPicPr>
-            <p:cNvPr id="147460" name="Picture 4"/>
-            <p:cNvPicPr>
-              <a:picLocks noChangeAspect="1" noChangeArrowheads="1"/>
-            </p:cNvPicPr>
-            <p:nvPr/>
-          </p:nvPicPr>
-          <p:blipFill>
-            <a:blip r:embed="rId4"/>
-            <a:srcRect/>
-            <a:stretch>
-              <a:fillRect/>
-            </a:stretch>
-          </p:blipFill>
-          <p:spPr bwMode="auto">
-            <a:xfrm>
-              <a:off x="1076325" y="2181225"/>
-              <a:ext cx="5705475" cy="4143375"/>
-            </a:xfrm>
-            <a:prstGeom prst="rect">
-              <a:avLst/>
-            </a:prstGeom>
-            <a:noFill/>
-            <a:ln w="9525">
-              <a:noFill/>
-              <a:miter lim="800000"/>
-              <a:headEnd/>
-              <a:tailEnd/>
-            </a:ln>
-            <a:effectLst/>
-          </p:spPr>
-        </p:pic>
-        <p:cxnSp>
-          <p:nvCxnSpPr>
-            <p:cNvPr id="9" name="Straight Connector 8"/>
-            <p:cNvCxnSpPr/>
-            <p:nvPr/>
-          </p:nvCxnSpPr>
-          <p:spPr>
-            <a:xfrm>
-              <a:off x="1219200" y="2514600"/>
-              <a:ext cx="609600" cy="1588"/>
-            </a:xfrm>
-            <a:prstGeom prst="line">
-              <a:avLst/>
-            </a:prstGeom>
-            <a:ln>
-              <a:solidFill>
-                <a:srgbClr val="C00000"/>
-              </a:solidFill>
-            </a:ln>
-          </p:spPr>
-          <p:style>
-            <a:lnRef idx="1">
-              <a:schemeClr val="accent1"/>
-            </a:lnRef>
-            <a:fillRef idx="0">
-              <a:schemeClr val="accent1"/>
-            </a:fillRef>
-            <a:effectRef idx="0">
-              <a:schemeClr val="accent1"/>
-            </a:effectRef>
-            <a:fontRef idx="minor">
-              <a:schemeClr val="tx1"/>
-            </a:fontRef>
-          </p:style>
-        </p:cxnSp>
-        <p:cxnSp>
-          <p:nvCxnSpPr>
-            <p:cNvPr id="11" name="Straight Connector 10"/>
-            <p:cNvCxnSpPr/>
-            <p:nvPr/>
-          </p:nvCxnSpPr>
-          <p:spPr>
-            <a:xfrm flipV="1">
-              <a:off x="1066800" y="4209854"/>
-              <a:ext cx="1066799" cy="1"/>
-            </a:xfrm>
-            <a:prstGeom prst="line">
-              <a:avLst/>
-            </a:prstGeom>
-            <a:ln>
-              <a:solidFill>
-                <a:srgbClr val="C00000"/>
-              </a:solidFill>
-            </a:ln>
-          </p:spPr>
-          <p:style>
-            <a:lnRef idx="1">
-              <a:schemeClr val="accent1"/>
-            </a:lnRef>
-            <a:fillRef idx="0">
-              <a:schemeClr val="accent1"/>
-            </a:fillRef>
-            <a:effectRef idx="0">
-              <a:schemeClr val="accent1"/>
-            </a:effectRef>
-            <a:fontRef idx="minor">
-              <a:schemeClr val="tx1"/>
-            </a:fontRef>
-          </p:style>
-        </p:cxnSp>
-        <p:cxnSp>
-          <p:nvCxnSpPr>
-            <p:cNvPr id="14" name="Straight Connector 13"/>
-            <p:cNvCxnSpPr/>
-            <p:nvPr/>
-          </p:nvCxnSpPr>
-          <p:spPr>
-            <a:xfrm>
-              <a:off x="1066800" y="5429838"/>
-              <a:ext cx="1295400" cy="1588"/>
-            </a:xfrm>
-            <a:prstGeom prst="line">
-              <a:avLst/>
-            </a:prstGeom>
-            <a:ln>
-              <a:solidFill>
-                <a:srgbClr val="C00000"/>
-              </a:solidFill>
-            </a:ln>
-          </p:spPr>
-          <p:style>
-            <a:lnRef idx="1">
-              <a:schemeClr val="accent1"/>
-            </a:lnRef>
-            <a:fillRef idx="0">
-              <a:schemeClr val="accent1"/>
-            </a:fillRef>
-            <a:effectRef idx="0">
-              <a:schemeClr val="accent1"/>
-            </a:effectRef>
-            <a:fontRef idx="minor">
-              <a:schemeClr val="tx1"/>
-            </a:fontRef>
-          </p:style>
-        </p:cxnSp>
-        <p:cxnSp>
-          <p:nvCxnSpPr>
-            <p:cNvPr id="16" name="Straight Connector 15"/>
-            <p:cNvCxnSpPr/>
-            <p:nvPr/>
-          </p:nvCxnSpPr>
-          <p:spPr>
-            <a:xfrm>
-              <a:off x="5791200" y="2648146"/>
-              <a:ext cx="457200" cy="1588"/>
-            </a:xfrm>
-            <a:prstGeom prst="line">
-              <a:avLst/>
-            </a:prstGeom>
-            <a:ln>
-              <a:solidFill>
-                <a:srgbClr val="C00000"/>
-              </a:solidFill>
-            </a:ln>
-          </p:spPr>
-          <p:style>
-            <a:lnRef idx="1">
-              <a:schemeClr val="accent1"/>
-            </a:lnRef>
-            <a:fillRef idx="0">
-              <a:schemeClr val="accent1"/>
-            </a:fillRef>
-            <a:effectRef idx="0">
-              <a:schemeClr val="accent1"/>
-            </a:effectRef>
-            <a:fontRef idx="minor">
-              <a:schemeClr val="tx1"/>
-            </a:fontRef>
-          </p:style>
-        </p:cxnSp>
-        <p:cxnSp>
-          <p:nvCxnSpPr>
-            <p:cNvPr id="18" name="Straight Connector 17"/>
-            <p:cNvCxnSpPr/>
-            <p:nvPr/>
-          </p:nvCxnSpPr>
-          <p:spPr>
-            <a:xfrm>
-              <a:off x="5429054" y="2762054"/>
-              <a:ext cx="685800" cy="1588"/>
-            </a:xfrm>
-            <a:prstGeom prst="line">
-              <a:avLst/>
-            </a:prstGeom>
-            <a:ln>
-              <a:solidFill>
-                <a:srgbClr val="C00000"/>
-              </a:solidFill>
-            </a:ln>
-          </p:spPr>
-          <p:style>
-            <a:lnRef idx="1">
-              <a:schemeClr val="accent1"/>
-            </a:lnRef>
-            <a:fillRef idx="0">
-              <a:schemeClr val="accent1"/>
-            </a:fillRef>
-            <a:effectRef idx="0">
-              <a:schemeClr val="accent1"/>
-            </a:effectRef>
-            <a:fontRef idx="minor">
-              <a:schemeClr val="tx1"/>
-            </a:fontRef>
-          </p:style>
-        </p:cxnSp>
-      </p:grpSp>
-      <p:sp>
-        <p:nvSpPr>
-          <p:cNvPr id="13" name="TextBox 24"/>
-          <p:cNvSpPr txBox="1">
-            <a:spLocks noChangeArrowheads="1"/>
-          </p:cNvSpPr>
-          <p:nvPr/>
-        </p:nvSpPr>
         <p:spPr bwMode="auto">
-          <a:xfrm>
-            <a:off x="920750" y="6034088"/>
-            <a:ext cx="2432050" cy="366712"/>
-          </a:xfrm>
-          <a:prstGeom prst="rect">
-            <a:avLst/>
-          </a:prstGeom>
           <a:noFill/>
-          <a:ln w="9525">
-            <a:noFill/>
+          <a:ln>
             <a:miter lim="800000"/>
             <a:headEnd/>
             <a:tailEnd/>
           </a:ln>
         </p:spPr>
         <p:txBody>
-          <a:bodyPr wrap="none">
-            <a:spAutoFit/>
+          <a:bodyPr wrap="square" lIns="91440" tIns="45720" rIns="91440" bIns="45720" numCol="1" anchorCtr="0" compatLnSpc="1">
+            <a:prstTxWarp prst="textNoShape">
+              <a:avLst/>
+            </a:prstTxWarp>
           </a:bodyPr>
           <a:lstStyle/>
           <a:p>
-            <a:pPr algn="ctr"/>
-            <a:r>
-              <a:rPr lang="en-US" b="1" i="1" dirty="0" err="1"/>
-              <a:t>Trypanosoma</a:t>
-            </a:r>
-            <a:r>
-              <a:rPr lang="en-US" b="1" i="1" dirty="0"/>
-              <a:t> </a:t>
-            </a:r>
-            <a:r>
-              <a:rPr lang="en-US" b="1" i="1" dirty="0" err="1"/>
-              <a:t>brucei</a:t>
-            </a:r>
-            <a:endParaRPr lang="en-US" b="1" i="1" dirty="0"/>
-          </a:p>
-        </p:txBody>
-      </p:sp>
-      <p:sp>
-        <p:nvSpPr>
-          <p:cNvPr id="15" name="TextBox 24"/>
-          <p:cNvSpPr txBox="1">
-            <a:spLocks noChangeArrowheads="1"/>
-          </p:cNvSpPr>
-          <p:nvPr/>
-        </p:nvSpPr>
-        <p:spPr bwMode="auto">
-          <a:xfrm>
-            <a:off x="5257800" y="6034088"/>
-            <a:ext cx="2279650" cy="366712"/>
-          </a:xfrm>
-          <a:prstGeom prst="rect">
-            <a:avLst/>
-          </a:prstGeom>
-          <a:noFill/>
-          <a:ln w="9525">
-            <a:noFill/>
-            <a:miter lim="800000"/>
-            <a:headEnd/>
-            <a:tailEnd/>
-          </a:ln>
-        </p:spPr>
-        <p:txBody>
-          <a:bodyPr wrap="none">
-            <a:spAutoFit/>
-          </a:bodyPr>
-          <a:lstStyle/>
-          <a:p>
-            <a:pPr algn="ctr"/>
-            <a:r>
-              <a:rPr lang="en-US" b="1" i="1"/>
-              <a:t>Trypanosoma cruzi</a:t>
-            </a:r>
+            <a:pPr fontAlgn="base">
+              <a:spcBef>
+                <a:spcPct val="0"/>
+              </a:spcBef>
+              <a:spcAft>
+                <a:spcPct val="0"/>
+              </a:spcAft>
+            </a:pPr>
+            <a:fld id="{1080BBD3-ED29-4DC8-81CF-7B96B60A5DB7}" type="slidenum">
+              <a:rPr lang="en-US">
+                <a:latin typeface="Century Schoolbook" pitchFamily="18" charset="0"/>
+                <a:cs typeface="Arial" pitchFamily="34" charset="0"/>
+              </a:rPr>
+              <a:pPr fontAlgn="base">
+                <a:spcBef>
+                  <a:spcPct val="0"/>
+                </a:spcBef>
+                <a:spcAft>
+                  <a:spcPct val="0"/>
+                </a:spcAft>
+              </a:pPr>
+              <a:t>18</a:t>
+            </a:fld>
+            <a:endParaRPr lang="en-US">
+              <a:latin typeface="Century Schoolbook" pitchFamily="18" charset="0"/>
+              <a:cs typeface="Arial" pitchFamily="34" charset="0"/>
+            </a:endParaRPr>
           </a:p>
         </p:txBody>
       </p:sp>
@@ -12262,157 +10794,40 @@
             <a:spLocks noGrp="1"/>
           </p:cNvSpPr>
           <p:nvPr>
-            <p:ph type="title"/>
+            <p:ph type="ctrTitle" idx="4294967295"/>
           </p:nvPr>
         </p:nvSpPr>
-        <p:spPr/>
-        <p:txBody>
-          <a:bodyPr>
-            <a:normAutofit fontScale="90000"/>
+        <p:spPr>
+          <a:xfrm>
+            <a:off x="2057400" y="1981200"/>
+            <a:ext cx="6019800" cy="2362200"/>
+          </a:xfrm>
+        </p:spPr>
+        <p:txBody>
+          <a:bodyPr wrap="square" lIns="91440" tIns="45720" rIns="91440" bIns="45720" numCol="1" anchor="t" anchorCtr="0" compatLnSpc="1">
+            <a:prstTxWarp prst="textNoShape">
+              <a:avLst/>
+            </a:prstTxWarp>
           </a:bodyPr>
           <a:lstStyle/>
           <a:p>
-            <a:r>
-              <a:rPr lang="en-US" sz="2400" dirty="0" smtClean="0"/>
-              <a:t>OPL: </a:t>
-            </a:r>
-            <a:r>
-              <a:rPr lang="en-US" sz="2000" b="0" dirty="0" err="1" smtClean="0"/>
-              <a:t>Priti</a:t>
-            </a:r>
-            <a:r>
-              <a:rPr lang="en-US" sz="2000" b="0" dirty="0" smtClean="0"/>
-              <a:t> Parikh, </a:t>
-            </a:r>
-            <a:r>
-              <a:rPr lang="en-US" sz="2000" b="0" dirty="0" err="1" smtClean="0"/>
-              <a:t>JieZheng</a:t>
-            </a:r>
-            <a:r>
-              <a:rPr lang="en-US" sz="2000" b="0" dirty="0" smtClean="0"/>
-              <a:t>, Flora Logan-</a:t>
-            </a:r>
-            <a:r>
-              <a:rPr lang="en-US" sz="2000" b="0" dirty="0" err="1" smtClean="0"/>
-              <a:t>Klumper</a:t>
-            </a:r>
-            <a:r>
-              <a:rPr lang="en-US" sz="2000" b="0" dirty="0" smtClean="0"/>
-              <a:t>, Christos Louis, Christian </a:t>
-            </a:r>
-            <a:r>
-              <a:rPr lang="en-US" sz="2000" b="0" dirty="0" err="1" smtClean="0"/>
-              <a:t>Stoeckert</a:t>
-            </a:r>
-            <a:r>
-              <a:rPr lang="en-US" sz="2000" b="0" dirty="0" smtClean="0"/>
-              <a:t>, </a:t>
-            </a:r>
-            <a:r>
-              <a:rPr lang="en-US" sz="2000" b="0" dirty="0" err="1" smtClean="0"/>
-              <a:t>AmitSheth</a:t>
-            </a:r>
-            <a:r>
-              <a:rPr lang="en-US" sz="2000" b="0" dirty="0" smtClean="0"/>
-              <a:t>, and </a:t>
-            </a:r>
-            <a:r>
-              <a:rPr lang="en-US" sz="2000" b="0" dirty="0" err="1" smtClean="0"/>
-              <a:t>Satya</a:t>
-            </a:r>
-            <a:r>
-              <a:rPr lang="en-US" sz="2000" b="0" dirty="0" smtClean="0"/>
-              <a:t> S. </a:t>
-            </a:r>
-            <a:r>
-              <a:rPr lang="en-US" sz="2000" b="0" dirty="0" err="1" smtClean="0"/>
-              <a:t>Sahoo</a:t>
-            </a:r>
-            <a:endParaRPr lang="en-US" sz="2000" b="0" dirty="0"/>
-          </a:p>
-        </p:txBody>
-      </p:sp>
-      <p:sp>
-        <p:nvSpPr>
-          <p:cNvPr id="3" name="Content Placeholder 2"/>
-          <p:cNvSpPr>
-            <a:spLocks noGrp="1"/>
-          </p:cNvSpPr>
-          <p:nvPr>
-            <p:ph sz="quarter" idx="1"/>
-          </p:nvPr>
-        </p:nvSpPr>
-        <p:spPr/>
-        <p:txBody>
-          <a:bodyPr/>
-          <a:lstStyle/>
-          <a:p>
-            <a:endParaRPr lang="en-US"/>
-          </a:p>
-        </p:txBody>
-      </p:sp>
-      <p:sp>
-        <p:nvSpPr>
-          <p:cNvPr id="4" name="Slide Number Placeholder 3"/>
-          <p:cNvSpPr>
-            <a:spLocks noGrp="1"/>
-          </p:cNvSpPr>
-          <p:nvPr>
-            <p:ph type="sldNum" sz="quarter" idx="11"/>
-          </p:nvPr>
-        </p:nvSpPr>
-        <p:spPr/>
-        <p:txBody>
-          <a:bodyPr/>
-          <a:lstStyle/>
-          <a:p>
-            <a:pPr>
-              <a:defRPr/>
+            <a:pPr algn="ctr">
+              <a:lnSpc>
+                <a:spcPct val="150000"/>
+              </a:lnSpc>
             </a:pPr>
-            <a:fld id="{C6587C3C-6210-43A2-897D-BAD9F5F0EE9E}" type="slidenum">
-              <a:rPr lang="en-US" smtClean="0"/>
-              <a:pPr>
-                <a:defRPr/>
-              </a:pPr>
-              <a:t>19</a:t>
-            </a:fld>
-            <a:endParaRPr lang="en-US"/>
-          </a:p>
-        </p:txBody>
-      </p:sp>
-      <p:pic>
-        <p:nvPicPr>
-          <p:cNvPr id="136195" name="Picture 3"/>
-          <p:cNvPicPr>
-            <a:picLocks noChangeAspect="1" noChangeArrowheads="1"/>
-          </p:cNvPicPr>
-          <p:nvPr/>
-        </p:nvPicPr>
-        <p:blipFill>
-          <a:blip r:embed="rId3"/>
-          <a:srcRect/>
-          <a:stretch>
-            <a:fillRect/>
-          </a:stretch>
-        </p:blipFill>
-        <p:spPr bwMode="auto">
-          <a:xfrm>
-            <a:off x="457200" y="1143000"/>
-            <a:ext cx="7991475" cy="5514975"/>
-          </a:xfrm>
-          <a:prstGeom prst="rect">
-            <a:avLst/>
-          </a:prstGeom>
-          <a:noFill/>
-          <a:ln w="9525">
-            <a:noFill/>
-            <a:miter lim="800000"/>
-            <a:headEnd/>
-            <a:tailEnd/>
-          </a:ln>
-          <a:effectLst/>
-        </p:spPr>
-      </p:pic>
+            <a:r>
+              <a:rPr lang="en-US" sz="4400" b="1" cap="none" smtClean="0">
+                <a:solidFill>
+                  <a:schemeClr val="accent1"/>
+                </a:solidFill>
+                <a:latin typeface="Geneva"/>
+              </a:rPr>
+              <a:t>Questions?</a:t>
+            </a:r>
+          </a:p>
+        </p:txBody>
+      </p:sp>
     </p:spTree>
   </p:cSld>
   <p:clrMapOvr>
@@ -12531,507 +10946,6 @@
               <a:t>2</a:t>
             </a:fld>
             <a:endParaRPr lang="en-US"/>
-          </a:p>
-        </p:txBody>
-      </p:sp>
-    </p:spTree>
-  </p:cSld>
-  <p:clrMapOvr>
-    <a:masterClrMapping/>
-  </p:clrMapOvr>
-  <p:timing>
-    <p:tnLst>
-      <p:par>
-        <p:cTn id="1" dur="indefinite" restart="never" nodeType="tmRoot"/>
-      </p:par>
-    </p:tnLst>
-  </p:timing>
-</p:sld>
-</file>
-
-<file path=ppt/slides/slide20.xml><?xml version="1.0" encoding="utf-8"?>
-<p:sld xmlns:a="http://schemas.openxmlformats.org/drawingml/2006/main" xmlns:r="http://schemas.openxmlformats.org/officeDocument/2006/relationships" xmlns:p="http://schemas.openxmlformats.org/presentationml/2006/main">
-  <p:cSld>
-    <p:spTree>
-      <p:nvGrpSpPr>
-        <p:cNvPr id="1" name=""/>
-        <p:cNvGrpSpPr/>
-        <p:nvPr/>
-      </p:nvGrpSpPr>
-      <p:grpSpPr>
-        <a:xfrm>
-          <a:off x="0" y="0"/>
-          <a:ext cx="0" cy="0"/>
-          <a:chOff x="0" y="0"/>
-          <a:chExt cx="0" cy="0"/>
-        </a:xfrm>
-      </p:grpSpPr>
-      <p:sp>
-        <p:nvSpPr>
-          <p:cNvPr id="2" name="Title 1"/>
-          <p:cNvSpPr>
-            <a:spLocks noGrp="1"/>
-          </p:cNvSpPr>
-          <p:nvPr>
-            <p:ph type="title"/>
-          </p:nvPr>
-        </p:nvSpPr>
-        <p:spPr/>
-        <p:txBody>
-          <a:bodyPr/>
-          <a:lstStyle/>
-          <a:p>
-            <a:r>
-              <a:rPr lang="en-US" dirty="0" smtClean="0"/>
-              <a:t>Lifecycle Stages for a Specific Parasite</a:t>
-            </a:r>
-            <a:endParaRPr lang="en-US" dirty="0"/>
-          </a:p>
-        </p:txBody>
-      </p:sp>
-      <p:sp>
-        <p:nvSpPr>
-          <p:cNvPr id="3" name="Content Placeholder 2"/>
-          <p:cNvSpPr>
-            <a:spLocks noGrp="1"/>
-          </p:cNvSpPr>
-          <p:nvPr>
-            <p:ph sz="quarter" idx="1"/>
-          </p:nvPr>
-        </p:nvSpPr>
-        <p:spPr/>
-        <p:txBody>
-          <a:bodyPr/>
-          <a:lstStyle/>
-          <a:p>
-            <a:r>
-              <a:rPr lang="en-US" dirty="0" smtClean="0"/>
-              <a:t>Over 100 terms -&gt; </a:t>
-            </a:r>
-            <a:r>
-              <a:rPr lang="en-US" dirty="0" smtClean="0"/>
-              <a:t>less than 10 terms</a:t>
-            </a:r>
-            <a:endParaRPr lang="en-US" dirty="0"/>
-          </a:p>
-        </p:txBody>
-      </p:sp>
-      <p:sp>
-        <p:nvSpPr>
-          <p:cNvPr id="4" name="Slide Number Placeholder 3"/>
-          <p:cNvSpPr>
-            <a:spLocks noGrp="1"/>
-          </p:cNvSpPr>
-          <p:nvPr>
-            <p:ph type="sldNum" sz="quarter" idx="11"/>
-          </p:nvPr>
-        </p:nvSpPr>
-        <p:spPr/>
-        <p:txBody>
-          <a:bodyPr/>
-          <a:lstStyle/>
-          <a:p>
-            <a:pPr>
-              <a:defRPr/>
-            </a:pPr>
-            <a:fld id="{C6587C3C-6210-43A2-897D-BAD9F5F0EE9E}" type="slidenum">
-              <a:rPr lang="en-US" smtClean="0"/>
-              <a:pPr>
-                <a:defRPr/>
-              </a:pPr>
-              <a:t>20</a:t>
-            </a:fld>
-            <a:endParaRPr lang="en-US"/>
-          </a:p>
-        </p:txBody>
-      </p:sp>
-      <p:pic>
-        <p:nvPicPr>
-          <p:cNvPr id="136194" name="Picture 2"/>
-          <p:cNvPicPr>
-            <a:picLocks noChangeAspect="1" noChangeArrowheads="1"/>
-          </p:cNvPicPr>
-          <p:nvPr/>
-        </p:nvPicPr>
-        <p:blipFill>
-          <a:blip r:embed="rId2"/>
-          <a:srcRect/>
-          <a:stretch>
-            <a:fillRect/>
-          </a:stretch>
-        </p:blipFill>
-        <p:spPr bwMode="auto">
-          <a:xfrm>
-            <a:off x="152400" y="2514600"/>
-            <a:ext cx="4283242" cy="3657600"/>
-          </a:xfrm>
-          <a:prstGeom prst="rect">
-            <a:avLst/>
-          </a:prstGeom>
-          <a:noFill/>
-          <a:ln w="9525">
-            <a:noFill/>
-            <a:miter lim="800000"/>
-            <a:headEnd/>
-            <a:tailEnd/>
-          </a:ln>
-          <a:effectLst/>
-        </p:spPr>
-      </p:pic>
-      <p:pic>
-        <p:nvPicPr>
-          <p:cNvPr id="136195" name="Picture 3"/>
-          <p:cNvPicPr>
-            <a:picLocks noChangeAspect="1" noChangeArrowheads="1"/>
-          </p:cNvPicPr>
-          <p:nvPr/>
-        </p:nvPicPr>
-        <p:blipFill>
-          <a:blip r:embed="rId3"/>
-          <a:srcRect/>
-          <a:stretch>
-            <a:fillRect/>
-          </a:stretch>
-        </p:blipFill>
-        <p:spPr bwMode="auto">
-          <a:xfrm>
-            <a:off x="4495800" y="2514600"/>
-            <a:ext cx="4150206" cy="3657600"/>
-          </a:xfrm>
-          <a:prstGeom prst="rect">
-            <a:avLst/>
-          </a:prstGeom>
-          <a:noFill/>
-          <a:ln w="9525">
-            <a:noFill/>
-            <a:miter lim="800000"/>
-            <a:headEnd/>
-            <a:tailEnd/>
-          </a:ln>
-          <a:effectLst/>
-        </p:spPr>
-      </p:pic>
-      <p:sp>
-        <p:nvSpPr>
-          <p:cNvPr id="8" name="TextBox 24"/>
-          <p:cNvSpPr txBox="1">
-            <a:spLocks noChangeArrowheads="1"/>
-          </p:cNvSpPr>
-          <p:nvPr/>
-        </p:nvSpPr>
-        <p:spPr bwMode="auto">
-          <a:xfrm>
-            <a:off x="990600" y="1905000"/>
-            <a:ext cx="2432050" cy="366712"/>
-          </a:xfrm>
-          <a:prstGeom prst="rect">
-            <a:avLst/>
-          </a:prstGeom>
-          <a:noFill/>
-          <a:ln w="9525">
-            <a:noFill/>
-            <a:miter lim="800000"/>
-            <a:headEnd/>
-            <a:tailEnd/>
-          </a:ln>
-        </p:spPr>
-        <p:txBody>
-          <a:bodyPr wrap="none">
-            <a:spAutoFit/>
-          </a:bodyPr>
-          <a:lstStyle/>
-          <a:p>
-            <a:pPr algn="ctr"/>
-            <a:r>
-              <a:rPr lang="en-US" b="1" i="1" dirty="0" err="1"/>
-              <a:t>Trypanosoma</a:t>
-            </a:r>
-            <a:r>
-              <a:rPr lang="en-US" b="1" i="1" dirty="0"/>
-              <a:t> </a:t>
-            </a:r>
-            <a:r>
-              <a:rPr lang="en-US" b="1" i="1" dirty="0" err="1"/>
-              <a:t>brucei</a:t>
-            </a:r>
-            <a:endParaRPr lang="en-US" b="1" i="1" dirty="0"/>
-          </a:p>
-        </p:txBody>
-      </p:sp>
-      <p:sp>
-        <p:nvSpPr>
-          <p:cNvPr id="9" name="TextBox 24"/>
-          <p:cNvSpPr txBox="1">
-            <a:spLocks noChangeArrowheads="1"/>
-          </p:cNvSpPr>
-          <p:nvPr/>
-        </p:nvSpPr>
-        <p:spPr bwMode="auto">
-          <a:xfrm>
-            <a:off x="5327650" y="1905000"/>
-            <a:ext cx="2279650" cy="366712"/>
-          </a:xfrm>
-          <a:prstGeom prst="rect">
-            <a:avLst/>
-          </a:prstGeom>
-          <a:noFill/>
-          <a:ln w="9525">
-            <a:noFill/>
-            <a:miter lim="800000"/>
-            <a:headEnd/>
-            <a:tailEnd/>
-          </a:ln>
-        </p:spPr>
-        <p:txBody>
-          <a:bodyPr wrap="none">
-            <a:spAutoFit/>
-          </a:bodyPr>
-          <a:lstStyle/>
-          <a:p>
-            <a:pPr algn="ctr"/>
-            <a:r>
-              <a:rPr lang="en-US" b="1" i="1"/>
-              <a:t>Trypanosoma cruzi</a:t>
-            </a:r>
-          </a:p>
-        </p:txBody>
-      </p:sp>
-    </p:spTree>
-  </p:cSld>
-  <p:clrMapOvr>
-    <a:masterClrMapping/>
-  </p:clrMapOvr>
-  <p:timing>
-    <p:tnLst>
-      <p:par>
-        <p:cTn id="1" dur="indefinite" restart="never" nodeType="tmRoot"/>
-      </p:par>
-    </p:tnLst>
-  </p:timing>
-</p:sld>
-</file>
-
-<file path=ppt/slides/slide21.xml><?xml version="1.0" encoding="utf-8"?>
-<p:sld xmlns:a="http://schemas.openxmlformats.org/drawingml/2006/main" xmlns:r="http://schemas.openxmlformats.org/officeDocument/2006/relationships" xmlns:p="http://schemas.openxmlformats.org/presentationml/2006/main">
-  <p:cSld>
-    <p:spTree>
-      <p:nvGrpSpPr>
-        <p:cNvPr id="1" name=""/>
-        <p:cNvGrpSpPr/>
-        <p:nvPr/>
-      </p:nvGrpSpPr>
-      <p:grpSpPr>
-        <a:xfrm>
-          <a:off x="0" y="0"/>
-          <a:ext cx="0" cy="0"/>
-          <a:chOff x="0" y="0"/>
-          <a:chExt cx="0" cy="0"/>
-        </a:xfrm>
-      </p:grpSpPr>
-      <p:sp>
-        <p:nvSpPr>
-          <p:cNvPr id="2" name="Title 1"/>
-          <p:cNvSpPr>
-            <a:spLocks noGrp="1"/>
-          </p:cNvSpPr>
-          <p:nvPr>
-            <p:ph type="title"/>
-          </p:nvPr>
-        </p:nvSpPr>
-        <p:spPr/>
-        <p:txBody>
-          <a:bodyPr/>
-          <a:lstStyle/>
-          <a:p>
-            <a:pPr fontAlgn="auto">
-              <a:spcAft>
-                <a:spcPts val="0"/>
-              </a:spcAft>
-              <a:defRPr/>
-            </a:pPr>
-            <a:r>
-              <a:rPr lang="en-US" dirty="0" smtClean="0"/>
-              <a:t>Summary – lessons from this use case</a:t>
-            </a:r>
-            <a:endParaRPr lang="en-US" dirty="0"/>
-          </a:p>
-        </p:txBody>
-      </p:sp>
-      <p:sp>
-        <p:nvSpPr>
-          <p:cNvPr id="26626" name="Content Placeholder 2"/>
-          <p:cNvSpPr>
-            <a:spLocks noGrp="1"/>
-          </p:cNvSpPr>
-          <p:nvPr>
-            <p:ph sz="quarter" idx="1"/>
-          </p:nvPr>
-        </p:nvSpPr>
-        <p:spPr>
-          <a:xfrm>
-            <a:off x="457200" y="1143000"/>
-            <a:ext cx="7467600" cy="5330825"/>
-          </a:xfrm>
-        </p:spPr>
-        <p:txBody>
-          <a:bodyPr/>
-          <a:lstStyle/>
-          <a:p>
-            <a:r>
-              <a:rPr lang="en-US" sz="2800" dirty="0" smtClean="0">
-                <a:latin typeface="Century Schoolbook" pitchFamily="18" charset="0"/>
-              </a:rPr>
-              <a:t>How to design a data collection form based on an ontology model </a:t>
-            </a:r>
-          </a:p>
-          <a:p>
-            <a:r>
-              <a:rPr lang="en-US" sz="2800" dirty="0" smtClean="0">
-                <a:latin typeface="Century Schoolbook" pitchFamily="18" charset="0"/>
-              </a:rPr>
-              <a:t>How to choose </a:t>
-            </a:r>
-            <a:r>
-              <a:rPr lang="en-US" sz="2800" dirty="0" err="1" smtClean="0">
-                <a:latin typeface="Century Schoolbook" pitchFamily="18" charset="0"/>
-              </a:rPr>
-              <a:t>ontologies</a:t>
-            </a:r>
-            <a:r>
-              <a:rPr lang="en-US" sz="2800" dirty="0" smtClean="0">
-                <a:latin typeface="Century Schoolbook" pitchFamily="18" charset="0"/>
-              </a:rPr>
-              <a:t> to be used for annotations collected in the forms</a:t>
-            </a:r>
-          </a:p>
-        </p:txBody>
-      </p:sp>
-      <p:sp>
-        <p:nvSpPr>
-          <p:cNvPr id="26627" name="Slide Number Placeholder 3"/>
-          <p:cNvSpPr>
-            <a:spLocks noGrp="1"/>
-          </p:cNvSpPr>
-          <p:nvPr>
-            <p:ph type="sldNum" sz="quarter" idx="11"/>
-          </p:nvPr>
-        </p:nvSpPr>
-        <p:spPr bwMode="auto">
-          <a:noFill/>
-          <a:ln>
-            <a:miter lim="800000"/>
-            <a:headEnd/>
-            <a:tailEnd/>
-          </a:ln>
-        </p:spPr>
-        <p:txBody>
-          <a:bodyPr wrap="square" lIns="91440" tIns="45720" rIns="91440" bIns="45720" numCol="1" anchorCtr="0" compatLnSpc="1">
-            <a:prstTxWarp prst="textNoShape">
-              <a:avLst/>
-            </a:prstTxWarp>
-          </a:bodyPr>
-          <a:lstStyle/>
-          <a:p>
-            <a:pPr fontAlgn="base">
-              <a:spcBef>
-                <a:spcPct val="0"/>
-              </a:spcBef>
-              <a:spcAft>
-                <a:spcPct val="0"/>
-              </a:spcAft>
-            </a:pPr>
-            <a:fld id="{1080BBD3-ED29-4DC8-81CF-7B96B60A5DB7}" type="slidenum">
-              <a:rPr lang="en-US">
-                <a:latin typeface="Century Schoolbook" pitchFamily="18" charset="0"/>
-                <a:cs typeface="Arial" pitchFamily="34" charset="0"/>
-              </a:rPr>
-              <a:pPr fontAlgn="base">
-                <a:spcBef>
-                  <a:spcPct val="0"/>
-                </a:spcBef>
-                <a:spcAft>
-                  <a:spcPct val="0"/>
-                </a:spcAft>
-              </a:pPr>
-              <a:t>21</a:t>
-            </a:fld>
-            <a:endParaRPr lang="en-US">
-              <a:latin typeface="Century Schoolbook" pitchFamily="18" charset="0"/>
-              <a:cs typeface="Arial" pitchFamily="34" charset="0"/>
-            </a:endParaRPr>
-          </a:p>
-        </p:txBody>
-      </p:sp>
-    </p:spTree>
-  </p:cSld>
-  <p:clrMapOvr>
-    <a:masterClrMapping/>
-  </p:clrMapOvr>
-  <p:timing>
-    <p:tnLst>
-      <p:par>
-        <p:cTn id="1" dur="indefinite" restart="never" nodeType="tmRoot"/>
-      </p:par>
-    </p:tnLst>
-  </p:timing>
-</p:sld>
-</file>
-
-<file path=ppt/slides/slide22.xml><?xml version="1.0" encoding="utf-8"?>
-<p:sld xmlns:a="http://schemas.openxmlformats.org/drawingml/2006/main" xmlns:r="http://schemas.openxmlformats.org/officeDocument/2006/relationships" xmlns:p="http://schemas.openxmlformats.org/presentationml/2006/main">
-  <p:cSld>
-    <p:spTree>
-      <p:nvGrpSpPr>
-        <p:cNvPr id="1" name=""/>
-        <p:cNvGrpSpPr/>
-        <p:nvPr/>
-      </p:nvGrpSpPr>
-      <p:grpSpPr>
-        <a:xfrm>
-          <a:off x="0" y="0"/>
-          <a:ext cx="0" cy="0"/>
-          <a:chOff x="0" y="0"/>
-          <a:chExt cx="0" cy="0"/>
-        </a:xfrm>
-      </p:grpSpPr>
-      <p:sp>
-        <p:nvSpPr>
-          <p:cNvPr id="2" name="Title 1"/>
-          <p:cNvSpPr>
-            <a:spLocks noGrp="1"/>
-          </p:cNvSpPr>
-          <p:nvPr>
-            <p:ph type="ctrTitle" idx="4294967295"/>
-          </p:nvPr>
-        </p:nvSpPr>
-        <p:spPr>
-          <a:xfrm>
-            <a:off x="2057400" y="1981200"/>
-            <a:ext cx="6019800" cy="2362200"/>
-          </a:xfrm>
-        </p:spPr>
-        <p:txBody>
-          <a:bodyPr wrap="square" lIns="91440" tIns="45720" rIns="91440" bIns="45720" numCol="1" anchor="t" anchorCtr="0" compatLnSpc="1">
-            <a:prstTxWarp prst="textNoShape">
-              <a:avLst/>
-            </a:prstTxWarp>
-          </a:bodyPr>
-          <a:lstStyle/>
-          <a:p>
-            <a:pPr algn="ctr">
-              <a:lnSpc>
-                <a:spcPct val="150000"/>
-              </a:lnSpc>
-            </a:pPr>
-            <a:r>
-              <a:rPr lang="en-US" sz="4400" b="1" cap="none" smtClean="0">
-                <a:solidFill>
-                  <a:schemeClr val="accent1"/>
-                </a:solidFill>
-                <a:latin typeface="Geneva"/>
-              </a:rPr>
-              <a:t>Questions?</a:t>
-            </a:r>
           </a:p>
         </p:txBody>
       </p:sp>

</xml_diff>